<commit_message>
Add template slides for Matt
</commit_message>
<xml_diff>
--- a/docs/Matt_Farrow_Megan_Ball_DS6306_EDA.pptx
+++ b/docs/Matt_Farrow_Megan_Ball_DS6306_EDA.pptx
@@ -6,10 +6,12 @@
   </p:sldMasterIdLst>
   <p:sldIdLst>
     <p:sldId id="256" r:id="rId2"/>
-    <p:sldId id="257" r:id="rId3"/>
-    <p:sldId id="258" r:id="rId4"/>
-    <p:sldId id="259" r:id="rId5"/>
-    <p:sldId id="260" r:id="rId6"/>
+    <p:sldId id="261" r:id="rId3"/>
+    <p:sldId id="262" r:id="rId4"/>
+    <p:sldId id="257" r:id="rId5"/>
+    <p:sldId id="258" r:id="rId6"/>
+    <p:sldId id="259" r:id="rId7"/>
+    <p:sldId id="260" r:id="rId8"/>
   </p:sldIdLst>
   <p:sldSz cx="12192000" cy="6858000"/>
   <p:notesSz cx="6858000" cy="9144000"/>
@@ -108,6 +110,11 @@
       </a:defRPr>
     </a:lvl9pPr>
   </p:defaultTextStyle>
+  <p:extLst>
+    <p:ext uri="{EFAFB233-063F-42B5-8137-9DF3F51BA10A}">
+      <p15:sldGuideLst xmlns:p15="http://schemas.microsoft.com/office/powerpoint/2012/main"/>
+    </p:ext>
+  </p:extLst>
 </p:presentation>
 </file>
 
@@ -1333,7 +1340,7 @@
           <a:p>
             <a:fld id="{1160EA64-D806-43AC-9DF2-F8C432F32B4C}" type="datetimeFigureOut">
               <a:rPr lang="en-US" smtClean="0"/>
-              <a:t>10/9/2020</a:t>
+              <a:t>10/11/20</a:t>
             </a:fld>
             <a:endParaRPr lang="en-US" dirty="0"/>
           </a:p>
@@ -1577,7 +1584,7 @@
           <a:p>
             <a:fld id="{E9F9C37B-1D36-470B-8223-D6C91242EC14}" type="datetimeFigureOut">
               <a:rPr lang="en-US" smtClean="0"/>
-              <a:t>10/9/2020</a:t>
+              <a:t>10/11/20</a:t>
             </a:fld>
             <a:endParaRPr lang="en-US" dirty="0"/>
           </a:p>
@@ -1757,7 +1764,7 @@
           <a:p>
             <a:fld id="{67C6F52A-A82B-47A2-A83A-8C4C91F2D59F}" type="datetimeFigureOut">
               <a:rPr lang="en-US" smtClean="0"/>
-              <a:t>10/9/2020</a:t>
+              <a:t>10/11/20</a:t>
             </a:fld>
             <a:endParaRPr lang="en-US" dirty="0"/>
           </a:p>
@@ -1927,7 +1934,7 @@
           <a:p>
             <a:fld id="{F070A7B3-6521-4DCA-87E5-044747A908C1}" type="datetimeFigureOut">
               <a:rPr lang="en-US" smtClean="0"/>
-              <a:t>10/9/2020</a:t>
+              <a:t>10/11/20</a:t>
             </a:fld>
             <a:endParaRPr lang="en-US" dirty="0"/>
           </a:p>
@@ -2207,7 +2214,7 @@
           <a:p>
             <a:fld id="{1160EA64-D806-43AC-9DF2-F8C432F32B4C}" type="datetimeFigureOut">
               <a:rPr lang="en-US" smtClean="0"/>
-              <a:t>10/9/2020</a:t>
+              <a:t>10/11/20</a:t>
             </a:fld>
             <a:endParaRPr lang="en-US" dirty="0"/>
           </a:p>
@@ -3409,7 +3416,7 @@
           <a:p>
             <a:fld id="{AB134690-1557-4C89-A502-4959FE7FAD70}" type="datetimeFigureOut">
               <a:rPr lang="en-US" smtClean="0"/>
-              <a:t>10/9/2020</a:t>
+              <a:t>10/11/20</a:t>
             </a:fld>
             <a:endParaRPr lang="en-US" dirty="0"/>
           </a:p>
@@ -3805,7 +3812,7 @@
           <a:p>
             <a:fld id="{1160EA64-D806-43AC-9DF2-F8C432F32B4C}" type="datetimeFigureOut">
               <a:rPr lang="en-US" smtClean="0"/>
-              <a:t>10/9/2020</a:t>
+              <a:t>10/11/20</a:t>
             </a:fld>
             <a:endParaRPr lang="en-US" dirty="0"/>
           </a:p>
@@ -3930,7 +3937,7 @@
           <a:p>
             <a:fld id="{E1037C31-9E7A-4F99-8774-A0E530DE1A42}" type="datetimeFigureOut">
               <a:rPr lang="en-US" smtClean="0"/>
-              <a:t>10/9/2020</a:t>
+              <a:t>10/11/20</a:t>
             </a:fld>
             <a:endParaRPr lang="en-US" dirty="0"/>
           </a:p>
@@ -4025,7 +4032,7 @@
           <a:p>
             <a:fld id="{C278504F-A551-4DE0-9316-4DCD1D8CC752}" type="datetimeFigureOut">
               <a:rPr lang="en-US" smtClean="0"/>
-              <a:t>10/9/2020</a:t>
+              <a:t>10/11/20</a:t>
             </a:fld>
             <a:endParaRPr lang="en-US" dirty="0"/>
           </a:p>
@@ -4791,7 +4798,7 @@
           <a:p>
             <a:fld id="{D1BE4249-C0D0-4B06-8692-E8BB871AF643}" type="datetimeFigureOut">
               <a:rPr lang="en-US" smtClean="0"/>
-              <a:t>10/9/2020</a:t>
+              <a:t>10/11/20</a:t>
             </a:fld>
             <a:endParaRPr lang="en-US" dirty="0"/>
           </a:p>
@@ -5634,7 +5641,7 @@
           <a:p>
             <a:fld id="{042B0DB6-F5C7-45FB-8CF3-31B45F9C2DAC}" type="datetimeFigureOut">
               <a:rPr lang="en-US" smtClean="0"/>
-              <a:t>10/9/2020</a:t>
+              <a:t>10/11/20</a:t>
             </a:fld>
             <a:endParaRPr lang="en-US" dirty="0"/>
           </a:p>
@@ -5861,7 +5868,7 @@
           <a:p>
             <a:fld id="{1160EA64-D806-43AC-9DF2-F8C432F32B4C}" type="datetimeFigureOut">
               <a:rPr lang="en-US" smtClean="0"/>
-              <a:t>10/9/2020</a:t>
+              <a:t>10/11/20</a:t>
             </a:fld>
             <a:endParaRPr lang="en-US" dirty="0"/>
           </a:p>
@@ -6964,10 +6971,10 @@
       </p:grpSpPr>
       <p:sp>
         <p:nvSpPr>
-          <p:cNvPr id="4" name="Title 3">
+          <p:cNvPr id="2" name="Title 1">
             <a:extLst>
               <a:ext uri="{FF2B5EF4-FFF2-40B4-BE49-F238E27FC236}">
-                <a16:creationId xmlns:a16="http://schemas.microsoft.com/office/drawing/2014/main" id="{4C3134FF-79B4-42CA-A2F5-91CC95A961A7}"/>
+                <a16:creationId xmlns:a16="http://schemas.microsoft.com/office/drawing/2014/main" id="{4DDC225C-F2E3-7244-B66C-495FB35B41D0}"/>
               </a:ext>
             </a:extLst>
           </p:cNvPr>
@@ -6985,17 +6992,17 @@
           <a:p>
             <a:r>
               <a:rPr lang="en-US" dirty="0"/>
-              <a:t>Breweries by state</a:t>
+              <a:t>Data Description</a:t>
             </a:r>
           </a:p>
         </p:txBody>
       </p:sp>
       <p:sp>
         <p:nvSpPr>
-          <p:cNvPr id="5" name="Content Placeholder 4">
+          <p:cNvPr id="3" name="Content Placeholder 2">
             <a:extLst>
               <a:ext uri="{FF2B5EF4-FFF2-40B4-BE49-F238E27FC236}">
-                <a16:creationId xmlns:a16="http://schemas.microsoft.com/office/drawing/2014/main" id="{B7ACF7BF-27A0-4D9E-B849-059E32A7DADE}"/>
+                <a16:creationId xmlns:a16="http://schemas.microsoft.com/office/drawing/2014/main" id="{FD2E9094-C586-8C4A-9C85-1942711D6692}"/>
               </a:ext>
             </a:extLst>
           </p:cNvPr>
@@ -7003,7 +7010,7 @@
             <a:spLocks noGrp="1"/>
           </p:cNvSpPr>
           <p:nvPr>
-            <p:ph sz="half" idx="1"/>
+            <p:ph idx="1"/>
           </p:nvPr>
         </p:nvSpPr>
         <p:spPr/>
@@ -7011,96 +7018,14 @@
           <a:bodyPr/>
           <a:lstStyle/>
           <a:p>
-            <a:r>
-              <a:rPr lang="en-US" dirty="0"/>
-              <a:t>First – let’s take a look at which states have the highest concentration of breweries</a:t>
-            </a:r>
-          </a:p>
-          <a:p>
-            <a:r>
-              <a:rPr lang="en-US" dirty="0"/>
-              <a:t>We have a clear outlier in Colorado with a total of 47 breweries!</a:t>
-            </a:r>
-          </a:p>
-          <a:p>
-            <a:r>
-              <a:rPr lang="en-US" dirty="0"/>
-              <a:t>North Dakota, South Dakota, West Virginia, and Washington, D.C. all tie with only one brewery per ‘state’</a:t>
-            </a:r>
-          </a:p>
-        </p:txBody>
-      </p:sp>
-      <p:pic>
-        <p:nvPicPr>
-          <p:cNvPr id="10" name="Content Placeholder 9">
-            <a:extLst>
-              <a:ext uri="{FF2B5EF4-FFF2-40B4-BE49-F238E27FC236}">
-                <a16:creationId xmlns:a16="http://schemas.microsoft.com/office/drawing/2014/main" id="{D2D24557-9DBB-4A4D-9596-11EB6148ABF7}"/>
-              </a:ext>
-            </a:extLst>
-          </p:cNvPr>
-          <p:cNvPicPr>
-            <a:picLocks noGrp="1" noChangeAspect="1"/>
-          </p:cNvPicPr>
-          <p:nvPr>
-            <p:ph sz="half" idx="2"/>
-          </p:nvPr>
-        </p:nvPicPr>
-        <p:blipFill>
-          <a:blip r:embed="rId2"/>
-          <a:stretch>
-            <a:fillRect/>
-          </a:stretch>
-        </p:blipFill>
-        <p:spPr>
-          <a:xfrm>
-            <a:off x="6648450" y="2608160"/>
-            <a:ext cx="4800600" cy="2975180"/>
-          </a:xfrm>
-          <a:prstGeom prst="rect">
-            <a:avLst/>
-          </a:prstGeom>
-        </p:spPr>
-      </p:pic>
-      <p:sp>
-        <p:nvSpPr>
-          <p:cNvPr id="11" name="TextBox 10">
-            <a:extLst>
-              <a:ext uri="{FF2B5EF4-FFF2-40B4-BE49-F238E27FC236}">
-                <a16:creationId xmlns:a16="http://schemas.microsoft.com/office/drawing/2014/main" id="{B45924E8-2A37-4EC0-A032-AB4926B4B6AD}"/>
-              </a:ext>
-            </a:extLst>
-          </p:cNvPr>
-          <p:cNvSpPr txBox="1"/>
-          <p:nvPr/>
-        </p:nvSpPr>
-        <p:spPr>
-          <a:xfrm>
-            <a:off x="7968343" y="1539551"/>
-            <a:ext cx="2593910" cy="646331"/>
-          </a:xfrm>
-          <a:prstGeom prst="rect">
-            <a:avLst/>
-          </a:prstGeom>
-          <a:noFill/>
-        </p:spPr>
-        <p:txBody>
-          <a:bodyPr wrap="square" rtlCol="0">
-            <a:spAutoFit/>
-          </a:bodyPr>
-          <a:lstStyle/>
-          <a:p>
-            <a:r>
-              <a:rPr lang="en-US" dirty="0"/>
-              <a:t>MB comment: map or top 10 table? </a:t>
-            </a:r>
+            <a:endParaRPr lang="en-US"/>
           </a:p>
         </p:txBody>
       </p:sp>
     </p:spTree>
     <p:extLst>
       <p:ext uri="{BB962C8B-B14F-4D97-AF65-F5344CB8AC3E}">
-        <p14:creationId xmlns:p14="http://schemas.microsoft.com/office/powerpoint/2010/main" val="4163052339"/>
+        <p14:creationId xmlns:p14="http://schemas.microsoft.com/office/powerpoint/2010/main" val="411140790"/>
       </p:ext>
     </p:extLst>
   </p:cSld>
@@ -7132,6 +7057,254 @@
           <p:cNvPr id="2" name="Title 1">
             <a:extLst>
               <a:ext uri="{FF2B5EF4-FFF2-40B4-BE49-F238E27FC236}">
+                <a16:creationId xmlns:a16="http://schemas.microsoft.com/office/drawing/2014/main" id="{84DFDDF1-2AA6-444D-9D15-0448526AA144}"/>
+              </a:ext>
+            </a:extLst>
+          </p:cNvPr>
+          <p:cNvSpPr>
+            <a:spLocks noGrp="1"/>
+          </p:cNvSpPr>
+          <p:nvPr>
+            <p:ph type="title"/>
+          </p:nvPr>
+        </p:nvSpPr>
+        <p:spPr/>
+        <p:txBody>
+          <a:bodyPr/>
+          <a:lstStyle/>
+          <a:p>
+            <a:r>
+              <a:rPr lang="en-US" dirty="0"/>
+              <a:t>Handling Missing Values</a:t>
+            </a:r>
+          </a:p>
+        </p:txBody>
+      </p:sp>
+      <p:sp>
+        <p:nvSpPr>
+          <p:cNvPr id="3" name="Content Placeholder 2">
+            <a:extLst>
+              <a:ext uri="{FF2B5EF4-FFF2-40B4-BE49-F238E27FC236}">
+                <a16:creationId xmlns:a16="http://schemas.microsoft.com/office/drawing/2014/main" id="{1B0C74A9-7FE5-5C47-BF80-18F466EA8D93}"/>
+              </a:ext>
+            </a:extLst>
+          </p:cNvPr>
+          <p:cNvSpPr>
+            <a:spLocks noGrp="1"/>
+          </p:cNvSpPr>
+          <p:nvPr>
+            <p:ph idx="1"/>
+          </p:nvPr>
+        </p:nvSpPr>
+        <p:spPr/>
+        <p:txBody>
+          <a:bodyPr/>
+          <a:lstStyle/>
+          <a:p>
+            <a:endParaRPr lang="en-US"/>
+          </a:p>
+        </p:txBody>
+      </p:sp>
+    </p:spTree>
+    <p:extLst>
+      <p:ext uri="{BB962C8B-B14F-4D97-AF65-F5344CB8AC3E}">
+        <p14:creationId xmlns:p14="http://schemas.microsoft.com/office/powerpoint/2010/main" val="4064351903"/>
+      </p:ext>
+    </p:extLst>
+  </p:cSld>
+  <p:clrMapOvr>
+    <a:masterClrMapping/>
+  </p:clrMapOvr>
+</p:sld>
+</file>
+
+<file path=ppt/slides/slide4.xml><?xml version="1.0" encoding="utf-8"?>
+<p:sld xmlns:a="http://schemas.openxmlformats.org/drawingml/2006/main" xmlns:r="http://schemas.openxmlformats.org/officeDocument/2006/relationships" xmlns:p="http://schemas.openxmlformats.org/presentationml/2006/main">
+  <p:cSld>
+    <p:spTree>
+      <p:nvGrpSpPr>
+        <p:cNvPr id="1" name=""/>
+        <p:cNvGrpSpPr/>
+        <p:nvPr/>
+      </p:nvGrpSpPr>
+      <p:grpSpPr>
+        <a:xfrm>
+          <a:off x="0" y="0"/>
+          <a:ext cx="0" cy="0"/>
+          <a:chOff x="0" y="0"/>
+          <a:chExt cx="0" cy="0"/>
+        </a:xfrm>
+      </p:grpSpPr>
+      <p:sp>
+        <p:nvSpPr>
+          <p:cNvPr id="4" name="Title 3">
+            <a:extLst>
+              <a:ext uri="{FF2B5EF4-FFF2-40B4-BE49-F238E27FC236}">
+                <a16:creationId xmlns:a16="http://schemas.microsoft.com/office/drawing/2014/main" id="{4C3134FF-79B4-42CA-A2F5-91CC95A961A7}"/>
+              </a:ext>
+            </a:extLst>
+          </p:cNvPr>
+          <p:cNvSpPr>
+            <a:spLocks noGrp="1"/>
+          </p:cNvSpPr>
+          <p:nvPr>
+            <p:ph type="title"/>
+          </p:nvPr>
+        </p:nvSpPr>
+        <p:spPr/>
+        <p:txBody>
+          <a:bodyPr/>
+          <a:lstStyle/>
+          <a:p>
+            <a:r>
+              <a:rPr lang="en-US" dirty="0"/>
+              <a:t>Breweries by state</a:t>
+            </a:r>
+          </a:p>
+        </p:txBody>
+      </p:sp>
+      <p:sp>
+        <p:nvSpPr>
+          <p:cNvPr id="5" name="Content Placeholder 4">
+            <a:extLst>
+              <a:ext uri="{FF2B5EF4-FFF2-40B4-BE49-F238E27FC236}">
+                <a16:creationId xmlns:a16="http://schemas.microsoft.com/office/drawing/2014/main" id="{B7ACF7BF-27A0-4D9E-B849-059E32A7DADE}"/>
+              </a:ext>
+            </a:extLst>
+          </p:cNvPr>
+          <p:cNvSpPr>
+            <a:spLocks noGrp="1"/>
+          </p:cNvSpPr>
+          <p:nvPr>
+            <p:ph sz="half" idx="1"/>
+          </p:nvPr>
+        </p:nvSpPr>
+        <p:spPr/>
+        <p:txBody>
+          <a:bodyPr/>
+          <a:lstStyle/>
+          <a:p>
+            <a:r>
+              <a:rPr lang="en-US" dirty="0"/>
+              <a:t>First – let’s take a look at which states have the highest concentration of breweries</a:t>
+            </a:r>
+          </a:p>
+          <a:p>
+            <a:r>
+              <a:rPr lang="en-US" dirty="0"/>
+              <a:t>We have a clear outlier in Colorado with a total of 47 breweries!</a:t>
+            </a:r>
+          </a:p>
+          <a:p>
+            <a:r>
+              <a:rPr lang="en-US" dirty="0"/>
+              <a:t>North Dakota, South Dakota, West Virginia, and Washington, D.C. all tie with only one brewery per ‘state’</a:t>
+            </a:r>
+          </a:p>
+        </p:txBody>
+      </p:sp>
+      <p:pic>
+        <p:nvPicPr>
+          <p:cNvPr id="10" name="Content Placeholder 9">
+            <a:extLst>
+              <a:ext uri="{FF2B5EF4-FFF2-40B4-BE49-F238E27FC236}">
+                <a16:creationId xmlns:a16="http://schemas.microsoft.com/office/drawing/2014/main" id="{D2D24557-9DBB-4A4D-9596-11EB6148ABF7}"/>
+              </a:ext>
+            </a:extLst>
+          </p:cNvPr>
+          <p:cNvPicPr>
+            <a:picLocks noGrp="1" noChangeAspect="1"/>
+          </p:cNvPicPr>
+          <p:nvPr>
+            <p:ph sz="half" idx="2"/>
+          </p:nvPr>
+        </p:nvPicPr>
+        <p:blipFill>
+          <a:blip r:embed="rId2"/>
+          <a:stretch>
+            <a:fillRect/>
+          </a:stretch>
+        </p:blipFill>
+        <p:spPr>
+          <a:xfrm>
+            <a:off x="6648450" y="2608160"/>
+            <a:ext cx="4800600" cy="2975180"/>
+          </a:xfrm>
+          <a:prstGeom prst="rect">
+            <a:avLst/>
+          </a:prstGeom>
+        </p:spPr>
+      </p:pic>
+      <p:sp>
+        <p:nvSpPr>
+          <p:cNvPr id="11" name="TextBox 10">
+            <a:extLst>
+              <a:ext uri="{FF2B5EF4-FFF2-40B4-BE49-F238E27FC236}">
+                <a16:creationId xmlns:a16="http://schemas.microsoft.com/office/drawing/2014/main" id="{B45924E8-2A37-4EC0-A032-AB4926B4B6AD}"/>
+              </a:ext>
+            </a:extLst>
+          </p:cNvPr>
+          <p:cNvSpPr txBox="1"/>
+          <p:nvPr/>
+        </p:nvSpPr>
+        <p:spPr>
+          <a:xfrm>
+            <a:off x="7968343" y="1539551"/>
+            <a:ext cx="2593910" cy="646331"/>
+          </a:xfrm>
+          <a:prstGeom prst="rect">
+            <a:avLst/>
+          </a:prstGeom>
+          <a:noFill/>
+        </p:spPr>
+        <p:txBody>
+          <a:bodyPr wrap="square" rtlCol="0">
+            <a:spAutoFit/>
+          </a:bodyPr>
+          <a:lstStyle/>
+          <a:p>
+            <a:r>
+              <a:rPr lang="en-US" dirty="0"/>
+              <a:t>MB comment: map or top 10 table? </a:t>
+            </a:r>
+          </a:p>
+        </p:txBody>
+      </p:sp>
+    </p:spTree>
+    <p:extLst>
+      <p:ext uri="{BB962C8B-B14F-4D97-AF65-F5344CB8AC3E}">
+        <p14:creationId xmlns:p14="http://schemas.microsoft.com/office/powerpoint/2010/main" val="4163052339"/>
+      </p:ext>
+    </p:extLst>
+  </p:cSld>
+  <p:clrMapOvr>
+    <a:masterClrMapping/>
+  </p:clrMapOvr>
+</p:sld>
+</file>
+
+<file path=ppt/slides/slide5.xml><?xml version="1.0" encoding="utf-8"?>
+<p:sld xmlns:a="http://schemas.openxmlformats.org/drawingml/2006/main" xmlns:r="http://schemas.openxmlformats.org/officeDocument/2006/relationships" xmlns:p="http://schemas.openxmlformats.org/presentationml/2006/main">
+  <p:cSld>
+    <p:spTree>
+      <p:nvGrpSpPr>
+        <p:cNvPr id="1" name=""/>
+        <p:cNvGrpSpPr/>
+        <p:nvPr/>
+      </p:nvGrpSpPr>
+      <p:grpSpPr>
+        <a:xfrm>
+          <a:off x="0" y="0"/>
+          <a:ext cx="0" cy="0"/>
+          <a:chOff x="0" y="0"/>
+          <a:chExt cx="0" cy="0"/>
+        </a:xfrm>
+      </p:grpSpPr>
+      <p:sp>
+        <p:nvSpPr>
+          <p:cNvPr id="2" name="Title 1">
+            <a:extLst>
+              <a:ext uri="{FF2B5EF4-FFF2-40B4-BE49-F238E27FC236}">
                 <a16:creationId xmlns:a16="http://schemas.microsoft.com/office/drawing/2014/main" id="{B868ACA7-936D-410D-90FB-62EF258F7CA9}"/>
               </a:ext>
             </a:extLst>
@@ -7238,7 +7411,7 @@
 </p:sld>
 </file>
 
-<file path=ppt/slides/slide4.xml><?xml version="1.0" encoding="utf-8"?>
+<file path=ppt/slides/slide6.xml><?xml version="1.0" encoding="utf-8"?>
 <p:sld xmlns:a="http://schemas.openxmlformats.org/drawingml/2006/main" xmlns:r="http://schemas.openxmlformats.org/officeDocument/2006/relationships" xmlns:p="http://schemas.openxmlformats.org/presentationml/2006/main">
   <p:cSld>
     <p:spTree>
@@ -7407,7 +7580,7 @@
 </p:sld>
 </file>
 
-<file path=ppt/slides/slide5.xml><?xml version="1.0" encoding="utf-8"?>
+<file path=ppt/slides/slide7.xml><?xml version="1.0" encoding="utf-8"?>
 <p:sld xmlns:a="http://schemas.openxmlformats.org/drawingml/2006/main" xmlns:r="http://schemas.openxmlformats.org/officeDocument/2006/relationships" xmlns:p="http://schemas.openxmlformats.org/presentationml/2006/main">
   <p:cSld>
     <p:spTree>

</xml_diff>

<commit_message>
Update ppt with data dictionary, impute/missing, table of breweries by state
</commit_message>
<xml_diff>
--- a/docs/Matt_Farrow_Megan_Ball_DS6306_EDA.pptx
+++ b/docs/Matt_Farrow_Megan_Ball_DS6306_EDA.pptx
@@ -1330,7 +1330,7 @@
           <a:p>
             <a:fld id="{1160EA64-D806-43AC-9DF2-F8C432F32B4C}" type="datetimeFigureOut">
               <a:rPr lang="en-US" smtClean="0"/>
-              <a:t>10/11/2020</a:t>
+              <a:t>10/11/20</a:t>
             </a:fld>
             <a:endParaRPr lang="en-US" dirty="0"/>
           </a:p>
@@ -1569,7 +1569,7 @@
           <a:p>
             <a:fld id="{E9F9C37B-1D36-470B-8223-D6C91242EC14}" type="datetimeFigureOut">
               <a:rPr lang="en-US" smtClean="0"/>
-              <a:t>10/11/2020</a:t>
+              <a:t>10/11/20</a:t>
             </a:fld>
             <a:endParaRPr lang="en-US" dirty="0"/>
           </a:p>
@@ -1749,7 +1749,7 @@
           <a:p>
             <a:fld id="{67C6F52A-A82B-47A2-A83A-8C4C91F2D59F}" type="datetimeFigureOut">
               <a:rPr lang="en-US" smtClean="0"/>
-              <a:t>10/11/2020</a:t>
+              <a:t>10/11/20</a:t>
             </a:fld>
             <a:endParaRPr lang="en-US" dirty="0"/>
           </a:p>
@@ -1919,7 +1919,7 @@
           <a:p>
             <a:fld id="{F070A7B3-6521-4DCA-87E5-044747A908C1}" type="datetimeFigureOut">
               <a:rPr lang="en-US" smtClean="0"/>
-              <a:t>10/11/2020</a:t>
+              <a:t>10/11/20</a:t>
             </a:fld>
             <a:endParaRPr lang="en-US" dirty="0"/>
           </a:p>
@@ -2193,7 +2193,7 @@
           <a:p>
             <a:fld id="{1160EA64-D806-43AC-9DF2-F8C432F32B4C}" type="datetimeFigureOut">
               <a:rPr lang="en-US" smtClean="0"/>
-              <a:t>10/11/2020</a:t>
+              <a:t>10/11/20</a:t>
             </a:fld>
             <a:endParaRPr lang="en-US" dirty="0"/>
           </a:p>
@@ -3395,7 +3395,7 @@
           <a:p>
             <a:fld id="{AB134690-1557-4C89-A502-4959FE7FAD70}" type="datetimeFigureOut">
               <a:rPr lang="en-US" smtClean="0"/>
-              <a:t>10/11/2020</a:t>
+              <a:t>10/11/20</a:t>
             </a:fld>
             <a:endParaRPr lang="en-US" dirty="0"/>
           </a:p>
@@ -3785,7 +3785,7 @@
           <a:p>
             <a:fld id="{1160EA64-D806-43AC-9DF2-F8C432F32B4C}" type="datetimeFigureOut">
               <a:rPr lang="en-US" smtClean="0"/>
-              <a:t>10/11/2020</a:t>
+              <a:t>10/11/20</a:t>
             </a:fld>
             <a:endParaRPr lang="en-US" dirty="0"/>
           </a:p>
@@ -3910,7 +3910,7 @@
           <a:p>
             <a:fld id="{E1037C31-9E7A-4F99-8774-A0E530DE1A42}" type="datetimeFigureOut">
               <a:rPr lang="en-US" smtClean="0"/>
-              <a:t>10/11/2020</a:t>
+              <a:t>10/11/20</a:t>
             </a:fld>
             <a:endParaRPr lang="en-US" dirty="0"/>
           </a:p>
@@ -4005,7 +4005,7 @@
           <a:p>
             <a:fld id="{C278504F-A551-4DE0-9316-4DCD1D8CC752}" type="datetimeFigureOut">
               <a:rPr lang="en-US" smtClean="0"/>
-              <a:t>10/11/2020</a:t>
+              <a:t>10/11/20</a:t>
             </a:fld>
             <a:endParaRPr lang="en-US" dirty="0"/>
           </a:p>
@@ -4768,7 +4768,7 @@
           <a:p>
             <a:fld id="{D1BE4249-C0D0-4B06-8692-E8BB871AF643}" type="datetimeFigureOut">
               <a:rPr lang="en-US" smtClean="0"/>
-              <a:t>10/11/2020</a:t>
+              <a:t>10/11/20</a:t>
             </a:fld>
             <a:endParaRPr lang="en-US" dirty="0"/>
           </a:p>
@@ -5608,7 +5608,7 @@
           <a:p>
             <a:fld id="{042B0DB6-F5C7-45FB-8CF3-31B45F9C2DAC}" type="datetimeFigureOut">
               <a:rPr lang="en-US" smtClean="0"/>
-              <a:t>10/11/2020</a:t>
+              <a:t>10/11/20</a:t>
             </a:fld>
             <a:endParaRPr lang="en-US" dirty="0"/>
           </a:p>
@@ -5835,7 +5835,7 @@
           <a:p>
             <a:fld id="{1160EA64-D806-43AC-9DF2-F8C432F32B4C}" type="datetimeFigureOut">
               <a:rPr lang="en-US" smtClean="0"/>
-              <a:t>10/11/2020</a:t>
+              <a:t>10/11/20</a:t>
             </a:fld>
             <a:endParaRPr lang="en-US" dirty="0"/>
           </a:p>
@@ -6953,17 +6953,17 @@
           <a:p>
             <a:r>
               <a:rPr lang="en-US" dirty="0"/>
-              <a:t>Data Description</a:t>
+              <a:t>Data Dictionary</a:t>
             </a:r>
           </a:p>
         </p:txBody>
       </p:sp>
       <p:sp>
         <p:nvSpPr>
-          <p:cNvPr id="3" name="Content Placeholder 2">
+          <p:cNvPr id="4" name="Content Placeholder 3">
             <a:extLst>
               <a:ext uri="{FF2B5EF4-FFF2-40B4-BE49-F238E27FC236}">
-                <a16:creationId xmlns:a16="http://schemas.microsoft.com/office/drawing/2014/main" id="{FD2E9094-C586-8C4A-9C85-1942711D6692}"/>
+                <a16:creationId xmlns:a16="http://schemas.microsoft.com/office/drawing/2014/main" id="{34064BCA-7119-E348-8710-899A90E305A3}"/>
               </a:ext>
             </a:extLst>
           </p:cNvPr>
@@ -6971,7 +6971,7 @@
             <a:spLocks noGrp="1"/>
           </p:cNvSpPr>
           <p:nvPr>
-            <p:ph idx="1"/>
+            <p:ph sz="half" idx="1"/>
           </p:nvPr>
         </p:nvSpPr>
         <p:spPr/>
@@ -6979,7 +6979,225 @@
           <a:bodyPr/>
           <a:lstStyle/>
           <a:p>
-            <a:endParaRPr lang="en-US"/>
+            <a:r>
+              <a:rPr lang="en-US" dirty="0"/>
+              <a:t>Name </a:t>
+            </a:r>
+            <a:r>
+              <a:rPr lang="en-US" sz="1400" i="1" dirty="0">
+                <a:solidFill>
+                  <a:schemeClr val="tx1">
+                    <a:lumMod val="50000"/>
+                    <a:lumOff val="50000"/>
+                  </a:schemeClr>
+                </a:solidFill>
+              </a:rPr>
+              <a:t>(beer name)</a:t>
+            </a:r>
+            <a:endParaRPr lang="en-US" i="1" dirty="0">
+              <a:solidFill>
+                <a:schemeClr val="tx1">
+                  <a:lumMod val="50000"/>
+                  <a:lumOff val="50000"/>
+                </a:schemeClr>
+              </a:solidFill>
+            </a:endParaRPr>
+          </a:p>
+          <a:p>
+            <a:r>
+              <a:rPr lang="en-US" dirty="0"/>
+              <a:t>Beer ID</a:t>
+            </a:r>
+          </a:p>
+          <a:p>
+            <a:r>
+              <a:rPr lang="en-US" dirty="0"/>
+              <a:t>ABV</a:t>
+            </a:r>
+            <a:r>
+              <a:rPr lang="en-US" sz="1400" i="1" dirty="0">
+                <a:solidFill>
+                  <a:schemeClr val="tx1">
+                    <a:lumMod val="50000"/>
+                    <a:lumOff val="50000"/>
+                  </a:schemeClr>
+                </a:solidFill>
+              </a:rPr>
+              <a:t> (alcohol by volume)</a:t>
+            </a:r>
+            <a:endParaRPr lang="en-US" dirty="0"/>
+          </a:p>
+          <a:p>
+            <a:r>
+              <a:rPr lang="en-US" dirty="0"/>
+              <a:t>IBU </a:t>
+            </a:r>
+            <a:r>
+              <a:rPr lang="en-US" sz="1400" i="1" dirty="0">
+                <a:solidFill>
+                  <a:schemeClr val="tx1">
+                    <a:lumMod val="50000"/>
+                    <a:lumOff val="50000"/>
+                  </a:schemeClr>
+                </a:solidFill>
+              </a:rPr>
+              <a:t>(international bitterness units)</a:t>
+            </a:r>
+            <a:endParaRPr lang="en-US" dirty="0"/>
+          </a:p>
+          <a:p>
+            <a:r>
+              <a:rPr lang="en-US" dirty="0"/>
+              <a:t>Brewery ID</a:t>
+            </a:r>
+          </a:p>
+          <a:p>
+            <a:r>
+              <a:rPr lang="en-US" dirty="0"/>
+              <a:t>Style</a:t>
+            </a:r>
+          </a:p>
+          <a:p>
+            <a:r>
+              <a:rPr lang="en-US" dirty="0"/>
+              <a:t>Ounces</a:t>
+            </a:r>
+          </a:p>
+        </p:txBody>
+      </p:sp>
+      <p:sp>
+        <p:nvSpPr>
+          <p:cNvPr id="5" name="Content Placeholder 4">
+            <a:extLst>
+              <a:ext uri="{FF2B5EF4-FFF2-40B4-BE49-F238E27FC236}">
+                <a16:creationId xmlns:a16="http://schemas.microsoft.com/office/drawing/2014/main" id="{6D243D89-E04D-3744-AE63-12BE302BC932}"/>
+              </a:ext>
+            </a:extLst>
+          </p:cNvPr>
+          <p:cNvSpPr>
+            <a:spLocks noGrp="1"/>
+          </p:cNvSpPr>
+          <p:nvPr>
+            <p:ph sz="half" idx="2"/>
+          </p:nvPr>
+        </p:nvSpPr>
+        <p:spPr/>
+        <p:txBody>
+          <a:bodyPr/>
+          <a:lstStyle/>
+          <a:p>
+            <a:r>
+              <a:rPr lang="en-US" dirty="0"/>
+              <a:t>Brew ID</a:t>
+            </a:r>
+          </a:p>
+          <a:p>
+            <a:r>
+              <a:rPr lang="en-US" dirty="0"/>
+              <a:t>Name</a:t>
+            </a:r>
+            <a:r>
+              <a:rPr lang="en-US" sz="1400" dirty="0"/>
+              <a:t> </a:t>
+            </a:r>
+            <a:r>
+              <a:rPr lang="en-US" sz="1400" i="1" dirty="0">
+                <a:solidFill>
+                  <a:schemeClr val="tx1">
+                    <a:lumMod val="50000"/>
+                    <a:lumOff val="50000"/>
+                  </a:schemeClr>
+                </a:solidFill>
+              </a:rPr>
+              <a:t>(brewery name)</a:t>
+            </a:r>
+            <a:endParaRPr lang="en-US" dirty="0"/>
+          </a:p>
+          <a:p>
+            <a:r>
+              <a:rPr lang="en-US" dirty="0"/>
+              <a:t>City</a:t>
+            </a:r>
+          </a:p>
+          <a:p>
+            <a:r>
+              <a:rPr lang="en-US" dirty="0"/>
+              <a:t>State</a:t>
+            </a:r>
+          </a:p>
+        </p:txBody>
+      </p:sp>
+      <p:sp>
+        <p:nvSpPr>
+          <p:cNvPr id="6" name="TextBox 5">
+            <a:extLst>
+              <a:ext uri="{FF2B5EF4-FFF2-40B4-BE49-F238E27FC236}">
+                <a16:creationId xmlns:a16="http://schemas.microsoft.com/office/drawing/2014/main" id="{44BC01CE-7F06-654C-90D4-2E55E3CAD3F8}"/>
+              </a:ext>
+            </a:extLst>
+          </p:cNvPr>
+          <p:cNvSpPr txBox="1"/>
+          <p:nvPr/>
+        </p:nvSpPr>
+        <p:spPr>
+          <a:xfrm>
+            <a:off x="1251678" y="1688757"/>
+            <a:ext cx="1048685" cy="523220"/>
+          </a:xfrm>
+          <a:prstGeom prst="rect">
+            <a:avLst/>
+          </a:prstGeom>
+          <a:noFill/>
+        </p:spPr>
+        <p:txBody>
+          <a:bodyPr wrap="none" rtlCol="0">
+            <a:spAutoFit/>
+          </a:bodyPr>
+          <a:lstStyle/>
+          <a:p>
+            <a:r>
+              <a:rPr lang="en-US" sz="2800" dirty="0">
+                <a:latin typeface="+mj-lt"/>
+              </a:rPr>
+              <a:t>Beers</a:t>
+            </a:r>
+          </a:p>
+        </p:txBody>
+      </p:sp>
+      <p:sp>
+        <p:nvSpPr>
+          <p:cNvPr id="7" name="TextBox 6">
+            <a:extLst>
+              <a:ext uri="{FF2B5EF4-FFF2-40B4-BE49-F238E27FC236}">
+                <a16:creationId xmlns:a16="http://schemas.microsoft.com/office/drawing/2014/main" id="{A4094C26-9DDB-0D4D-A72D-4092B7D99EB5}"/>
+              </a:ext>
+            </a:extLst>
+          </p:cNvPr>
+          <p:cNvSpPr txBox="1"/>
+          <p:nvPr/>
+        </p:nvSpPr>
+        <p:spPr>
+          <a:xfrm>
+            <a:off x="6647796" y="1688757"/>
+            <a:ext cx="1699504" cy="523220"/>
+          </a:xfrm>
+          <a:prstGeom prst="rect">
+            <a:avLst/>
+          </a:prstGeom>
+          <a:noFill/>
+        </p:spPr>
+        <p:txBody>
+          <a:bodyPr wrap="none" rtlCol="0">
+            <a:spAutoFit/>
+          </a:bodyPr>
+          <a:lstStyle/>
+          <a:p>
+            <a:r>
+              <a:rPr lang="en-US" sz="2800" dirty="0">
+                <a:latin typeface="+mj-lt"/>
+              </a:rPr>
+              <a:t>Breweries</a:t>
+            </a:r>
           </a:p>
         </p:txBody>
       </p:sp>
@@ -7043,25 +7261,459 @@
       </p:sp>
       <p:sp>
         <p:nvSpPr>
-          <p:cNvPr id="3" name="Content Placeholder 2">
+          <p:cNvPr id="4" name="TextBox 3">
             <a:extLst>
               <a:ext uri="{FF2B5EF4-FFF2-40B4-BE49-F238E27FC236}">
-                <a16:creationId xmlns:a16="http://schemas.microsoft.com/office/drawing/2014/main" id="{1B0C74A9-7FE5-5C47-BF80-18F466EA8D93}"/>
+                <a16:creationId xmlns:a16="http://schemas.microsoft.com/office/drawing/2014/main" id="{65BE2C23-529D-3A46-BC28-5E48CF7A408A}"/>
               </a:ext>
             </a:extLst>
           </p:cNvPr>
-          <p:cNvSpPr>
-            <a:spLocks noGrp="1"/>
-          </p:cNvSpPr>
-          <p:nvPr>
-            <p:ph idx="1"/>
-          </p:nvPr>
+          <p:cNvSpPr txBox="1"/>
+          <p:nvPr/>
         </p:nvSpPr>
-        <p:spPr/>
+        <p:spPr>
+          <a:xfrm>
+            <a:off x="1449859" y="1771136"/>
+            <a:ext cx="3010761" cy="461665"/>
+          </a:xfrm>
+          <a:prstGeom prst="rect">
+            <a:avLst/>
+          </a:prstGeom>
+          <a:noFill/>
+        </p:spPr>
         <p:txBody>
-          <a:bodyPr/>
+          <a:bodyPr wrap="none" rtlCol="0">
+            <a:spAutoFit/>
+          </a:bodyPr>
           <a:lstStyle/>
           <a:p>
+            <a:r>
+              <a:rPr lang="en-US" sz="2400" spc="300" dirty="0">
+                <a:latin typeface="+mj-lt"/>
+              </a:rPr>
+              <a:t>Many Missing IBU</a:t>
+            </a:r>
+          </a:p>
+        </p:txBody>
+      </p:sp>
+      <p:sp>
+        <p:nvSpPr>
+          <p:cNvPr id="5" name="TextBox 4">
+            <a:extLst>
+              <a:ext uri="{FF2B5EF4-FFF2-40B4-BE49-F238E27FC236}">
+                <a16:creationId xmlns:a16="http://schemas.microsoft.com/office/drawing/2014/main" id="{F86C0642-7456-694E-90CD-DB7CB8A9BB2C}"/>
+              </a:ext>
+            </a:extLst>
+          </p:cNvPr>
+          <p:cNvSpPr txBox="1"/>
+          <p:nvPr/>
+        </p:nvSpPr>
+        <p:spPr>
+          <a:xfrm>
+            <a:off x="3991232" y="3059668"/>
+            <a:ext cx="4488473" cy="461665"/>
+          </a:xfrm>
+          <a:prstGeom prst="rect">
+            <a:avLst/>
+          </a:prstGeom>
+          <a:noFill/>
+        </p:spPr>
+        <p:txBody>
+          <a:bodyPr wrap="none" rtlCol="0">
+            <a:spAutoFit/>
+          </a:bodyPr>
+          <a:lstStyle/>
+          <a:p>
+            <a:r>
+              <a:rPr lang="en-US" sz="2400" spc="300" dirty="0">
+                <a:latin typeface="+mj-lt"/>
+              </a:rPr>
+              <a:t>Impute Mean by Beer Style</a:t>
+            </a:r>
+          </a:p>
+        </p:txBody>
+      </p:sp>
+      <p:sp>
+        <p:nvSpPr>
+          <p:cNvPr id="6" name="TextBox 5">
+            <a:extLst>
+              <a:ext uri="{FF2B5EF4-FFF2-40B4-BE49-F238E27FC236}">
+                <a16:creationId xmlns:a16="http://schemas.microsoft.com/office/drawing/2014/main" id="{CF27BFAF-8456-EC48-9858-5D4569227B60}"/>
+              </a:ext>
+            </a:extLst>
+          </p:cNvPr>
+          <p:cNvSpPr txBox="1"/>
+          <p:nvPr/>
+        </p:nvSpPr>
+        <p:spPr>
+          <a:xfrm>
+            <a:off x="7046031" y="4290985"/>
+            <a:ext cx="4148893" cy="830997"/>
+          </a:xfrm>
+          <a:prstGeom prst="rect">
+            <a:avLst/>
+          </a:prstGeom>
+          <a:noFill/>
+        </p:spPr>
+        <p:txBody>
+          <a:bodyPr wrap="none" rtlCol="0">
+            <a:spAutoFit/>
+          </a:bodyPr>
+          <a:lstStyle/>
+          <a:p>
+            <a:pPr algn="ctr"/>
+            <a:r>
+              <a:rPr lang="en-US" sz="2400" spc="300" dirty="0">
+                <a:latin typeface="+mj-lt"/>
+              </a:rPr>
+              <a:t>Remove Remaining Rows</a:t>
+            </a:r>
+          </a:p>
+          <a:p>
+            <a:pPr algn="ctr"/>
+            <a:r>
+              <a:rPr lang="en-US" sz="2400" spc="300" dirty="0">
+                <a:latin typeface="+mj-lt"/>
+              </a:rPr>
+              <a:t>Containing NAs</a:t>
+            </a:r>
+          </a:p>
+        </p:txBody>
+      </p:sp>
+      <p:sp>
+        <p:nvSpPr>
+          <p:cNvPr id="7" name="Freeform 6">
+            <a:extLst>
+              <a:ext uri="{FF2B5EF4-FFF2-40B4-BE49-F238E27FC236}">
+                <a16:creationId xmlns:a16="http://schemas.microsoft.com/office/drawing/2014/main" id="{9DEA09A5-27CE-7846-B4C4-050FAB370C54}"/>
+              </a:ext>
+            </a:extLst>
+          </p:cNvPr>
+          <p:cNvSpPr/>
+          <p:nvPr/>
+        </p:nvSpPr>
+        <p:spPr>
+          <a:xfrm>
+            <a:off x="2031926" y="2248930"/>
+            <a:ext cx="1922236" cy="1150498"/>
+          </a:xfrm>
+          <a:custGeom>
+            <a:avLst/>
+            <a:gdLst>
+              <a:gd name="connsiteX0" fmla="*/ 579469 w 1922236"/>
+              <a:gd name="connsiteY0" fmla="*/ 0 h 1150498"/>
+              <a:gd name="connsiteX1" fmla="*/ 35771 w 1922236"/>
+              <a:gd name="connsiteY1" fmla="*/ 774356 h 1150498"/>
+              <a:gd name="connsiteX2" fmla="*/ 1477393 w 1922236"/>
+              <a:gd name="connsiteY2" fmla="*/ 337751 h 1150498"/>
+              <a:gd name="connsiteX3" fmla="*/ 1230258 w 1922236"/>
+              <a:gd name="connsiteY3" fmla="*/ 1079156 h 1150498"/>
+              <a:gd name="connsiteX4" fmla="*/ 1922236 w 1922236"/>
+              <a:gd name="connsiteY4" fmla="*/ 1079156 h 1150498"/>
+            </a:gdLst>
+            <a:ahLst/>
+            <a:cxnLst>
+              <a:cxn ang="0">
+                <a:pos x="connsiteX0" y="connsiteY0"/>
+              </a:cxn>
+              <a:cxn ang="0">
+                <a:pos x="connsiteX1" y="connsiteY1"/>
+              </a:cxn>
+              <a:cxn ang="0">
+                <a:pos x="connsiteX2" y="connsiteY2"/>
+              </a:cxn>
+              <a:cxn ang="0">
+                <a:pos x="connsiteX3" y="connsiteY3"/>
+              </a:cxn>
+              <a:cxn ang="0">
+                <a:pos x="connsiteX4" y="connsiteY4"/>
+              </a:cxn>
+            </a:cxnLst>
+            <a:rect l="l" t="t" r="r" b="b"/>
+            <a:pathLst>
+              <a:path w="1922236" h="1150498" extrusionOk="0">
+                <a:moveTo>
+                  <a:pt x="579469" y="0"/>
+                </a:moveTo>
+                <a:cubicBezTo>
+                  <a:pt x="223334" y="391947"/>
+                  <a:pt x="-102885" y="713089"/>
+                  <a:pt x="35771" y="774356"/>
+                </a:cubicBezTo>
+                <a:cubicBezTo>
+                  <a:pt x="204002" y="803439"/>
+                  <a:pt x="1288522" y="283562"/>
+                  <a:pt x="1477393" y="337751"/>
+                </a:cubicBezTo>
+                <a:cubicBezTo>
+                  <a:pt x="1682198" y="399588"/>
+                  <a:pt x="1175075" y="950808"/>
+                  <a:pt x="1230258" y="1079156"/>
+                </a:cubicBezTo>
+                <a:cubicBezTo>
+                  <a:pt x="1279123" y="1135058"/>
+                  <a:pt x="1609104" y="1189343"/>
+                  <a:pt x="1922236" y="1079156"/>
+                </a:cubicBezTo>
+              </a:path>
+            </a:pathLst>
+          </a:custGeom>
+          <a:noFill/>
+          <a:ln w="38100">
+            <a:headEnd type="none" w="med" len="med"/>
+            <a:tailEnd type="arrow" w="med" len="med"/>
+            <a:extLst>
+              <a:ext uri="{C807C97D-BFC1-408E-A445-0C87EB9F89A2}">
+                <ask:lineSketchStyleProps xmlns:ask="http://schemas.microsoft.com/office/drawing/2018/sketchyshapes" sd="1435683001">
+                  <a:custGeom>
+                    <a:avLst/>
+                    <a:gdLst>
+                      <a:gd name="connsiteX0" fmla="*/ 579469 w 1922236"/>
+                      <a:gd name="connsiteY0" fmla="*/ 0 h 1150498"/>
+                      <a:gd name="connsiteX1" fmla="*/ 35771 w 1922236"/>
+                      <a:gd name="connsiteY1" fmla="*/ 774356 h 1150498"/>
+                      <a:gd name="connsiteX2" fmla="*/ 1477393 w 1922236"/>
+                      <a:gd name="connsiteY2" fmla="*/ 337751 h 1150498"/>
+                      <a:gd name="connsiteX3" fmla="*/ 1230258 w 1922236"/>
+                      <a:gd name="connsiteY3" fmla="*/ 1079156 h 1150498"/>
+                      <a:gd name="connsiteX4" fmla="*/ 1922236 w 1922236"/>
+                      <a:gd name="connsiteY4" fmla="*/ 1079156 h 1150498"/>
+                    </a:gdLst>
+                    <a:ahLst/>
+                    <a:cxnLst>
+                      <a:cxn ang="0">
+                        <a:pos x="connsiteX0" y="connsiteY0"/>
+                      </a:cxn>
+                      <a:cxn ang="0">
+                        <a:pos x="connsiteX1" y="connsiteY1"/>
+                      </a:cxn>
+                      <a:cxn ang="0">
+                        <a:pos x="connsiteX2" y="connsiteY2"/>
+                      </a:cxn>
+                      <a:cxn ang="0">
+                        <a:pos x="connsiteX3" y="connsiteY3"/>
+                      </a:cxn>
+                      <a:cxn ang="0">
+                        <a:pos x="connsiteX4" y="connsiteY4"/>
+                      </a:cxn>
+                    </a:cxnLst>
+                    <a:rect l="l" t="t" r="r" b="b"/>
+                    <a:pathLst>
+                      <a:path w="1922236" h="1150498">
+                        <a:moveTo>
+                          <a:pt x="579469" y="0"/>
+                        </a:moveTo>
+                        <a:cubicBezTo>
+                          <a:pt x="232793" y="359032"/>
+                          <a:pt x="-113883" y="718064"/>
+                          <a:pt x="35771" y="774356"/>
+                        </a:cubicBezTo>
+                        <a:cubicBezTo>
+                          <a:pt x="185425" y="830648"/>
+                          <a:pt x="1278312" y="286951"/>
+                          <a:pt x="1477393" y="337751"/>
+                        </a:cubicBezTo>
+                        <a:cubicBezTo>
+                          <a:pt x="1676474" y="388551"/>
+                          <a:pt x="1156118" y="955589"/>
+                          <a:pt x="1230258" y="1079156"/>
+                        </a:cubicBezTo>
+                        <a:cubicBezTo>
+                          <a:pt x="1304399" y="1202724"/>
+                          <a:pt x="1613317" y="1140940"/>
+                          <a:pt x="1922236" y="1079156"/>
+                        </a:cubicBezTo>
+                      </a:path>
+                    </a:pathLst>
+                  </a:custGeom>
+                  <ask:type>
+                    <ask:lineSketchFreehand/>
+                  </ask:type>
+                </ask:lineSketchStyleProps>
+              </a:ext>
+            </a:extLst>
+          </a:ln>
+        </p:spPr>
+        <p:style>
+          <a:lnRef idx="2">
+            <a:schemeClr val="accent1">
+              <a:shade val="50000"/>
+            </a:schemeClr>
+          </a:lnRef>
+          <a:fillRef idx="1">
+            <a:schemeClr val="accent1"/>
+          </a:fillRef>
+          <a:effectRef idx="0">
+            <a:schemeClr val="accent1"/>
+          </a:effectRef>
+          <a:fontRef idx="minor">
+            <a:schemeClr val="lt1"/>
+          </a:fontRef>
+        </p:style>
+        <p:txBody>
+          <a:bodyPr rtlCol="0" anchor="ctr"/>
+          <a:lstStyle/>
+          <a:p>
+            <a:pPr algn="ctr"/>
+            <a:endParaRPr lang="en-US"/>
+          </a:p>
+        </p:txBody>
+      </p:sp>
+      <p:sp>
+        <p:nvSpPr>
+          <p:cNvPr id="9" name="Freeform 8">
+            <a:extLst>
+              <a:ext uri="{FF2B5EF4-FFF2-40B4-BE49-F238E27FC236}">
+                <a16:creationId xmlns:a16="http://schemas.microsoft.com/office/drawing/2014/main" id="{5516A77B-726C-C142-910F-ACD607B7F8E4}"/>
+              </a:ext>
+            </a:extLst>
+          </p:cNvPr>
+          <p:cNvSpPr/>
+          <p:nvPr/>
+        </p:nvSpPr>
+        <p:spPr>
+          <a:xfrm>
+            <a:off x="8517924" y="3081341"/>
+            <a:ext cx="1690142" cy="1152908"/>
+          </a:xfrm>
+          <a:custGeom>
+            <a:avLst/>
+            <a:gdLst>
+              <a:gd name="connsiteX0" fmla="*/ 0 w 1690142"/>
+              <a:gd name="connsiteY0" fmla="*/ 213794 h 1152908"/>
+              <a:gd name="connsiteX1" fmla="*/ 1688757 w 1690142"/>
+              <a:gd name="connsiteY1" fmla="*/ 32562 h 1152908"/>
+              <a:gd name="connsiteX2" fmla="*/ 288325 w 1690142"/>
+              <a:gd name="connsiteY2" fmla="*/ 798681 h 1152908"/>
+              <a:gd name="connsiteX3" fmla="*/ 296562 w 1690142"/>
+              <a:gd name="connsiteY3" fmla="*/ 1152908 h 1152908"/>
+            </a:gdLst>
+            <a:ahLst/>
+            <a:cxnLst>
+              <a:cxn ang="0">
+                <a:pos x="connsiteX0" y="connsiteY0"/>
+              </a:cxn>
+              <a:cxn ang="0">
+                <a:pos x="connsiteX1" y="connsiteY1"/>
+              </a:cxn>
+              <a:cxn ang="0">
+                <a:pos x="connsiteX2" y="connsiteY2"/>
+              </a:cxn>
+              <a:cxn ang="0">
+                <a:pos x="connsiteX3" y="connsiteY3"/>
+              </a:cxn>
+            </a:cxnLst>
+            <a:rect l="l" t="t" r="r" b="b"/>
+            <a:pathLst>
+              <a:path w="1690142" h="1152908" extrusionOk="0">
+                <a:moveTo>
+                  <a:pt x="0" y="213794"/>
+                </a:moveTo>
+                <a:cubicBezTo>
+                  <a:pt x="798830" y="61162"/>
+                  <a:pt x="1632752" y="-61935"/>
+                  <a:pt x="1688757" y="32562"/>
+                </a:cubicBezTo>
+                <a:cubicBezTo>
+                  <a:pt x="1789682" y="141174"/>
+                  <a:pt x="478476" y="613289"/>
+                  <a:pt x="288325" y="798681"/>
+                </a:cubicBezTo>
+                <a:cubicBezTo>
+                  <a:pt x="52139" y="989460"/>
+                  <a:pt x="175367" y="1075017"/>
+                  <a:pt x="296562" y="1152908"/>
+                </a:cubicBezTo>
+              </a:path>
+            </a:pathLst>
+          </a:custGeom>
+          <a:noFill/>
+          <a:ln w="38100">
+            <a:headEnd type="none" w="med" len="med"/>
+            <a:tailEnd type="arrow" w="med" len="med"/>
+            <a:extLst>
+              <a:ext uri="{C807C97D-BFC1-408E-A445-0C87EB9F89A2}">
+                <ask:lineSketchStyleProps xmlns:ask="http://schemas.microsoft.com/office/drawing/2018/sketchyshapes" sd="1219033472">
+                  <a:custGeom>
+                    <a:avLst/>
+                    <a:gdLst>
+                      <a:gd name="connsiteX0" fmla="*/ 0 w 1690142"/>
+                      <a:gd name="connsiteY0" fmla="*/ 213794 h 1152908"/>
+                      <a:gd name="connsiteX1" fmla="*/ 1688757 w 1690142"/>
+                      <a:gd name="connsiteY1" fmla="*/ 32562 h 1152908"/>
+                      <a:gd name="connsiteX2" fmla="*/ 288325 w 1690142"/>
+                      <a:gd name="connsiteY2" fmla="*/ 798681 h 1152908"/>
+                      <a:gd name="connsiteX3" fmla="*/ 296562 w 1690142"/>
+                      <a:gd name="connsiteY3" fmla="*/ 1152908 h 1152908"/>
+                    </a:gdLst>
+                    <a:ahLst/>
+                    <a:cxnLst>
+                      <a:cxn ang="0">
+                        <a:pos x="connsiteX0" y="connsiteY0"/>
+                      </a:cxn>
+                      <a:cxn ang="0">
+                        <a:pos x="connsiteX1" y="connsiteY1"/>
+                      </a:cxn>
+                      <a:cxn ang="0">
+                        <a:pos x="connsiteX2" y="connsiteY2"/>
+                      </a:cxn>
+                      <a:cxn ang="0">
+                        <a:pos x="connsiteX3" y="connsiteY3"/>
+                      </a:cxn>
+                    </a:cxnLst>
+                    <a:rect l="l" t="t" r="r" b="b"/>
+                    <a:pathLst>
+                      <a:path w="1690142" h="1152908">
+                        <a:moveTo>
+                          <a:pt x="0" y="213794"/>
+                        </a:moveTo>
+                        <a:cubicBezTo>
+                          <a:pt x="820351" y="74437"/>
+                          <a:pt x="1640703" y="-64919"/>
+                          <a:pt x="1688757" y="32562"/>
+                        </a:cubicBezTo>
+                        <a:cubicBezTo>
+                          <a:pt x="1736811" y="130043"/>
+                          <a:pt x="520358" y="611957"/>
+                          <a:pt x="288325" y="798681"/>
+                        </a:cubicBezTo>
+                        <a:cubicBezTo>
+                          <a:pt x="56292" y="985405"/>
+                          <a:pt x="176427" y="1069156"/>
+                          <a:pt x="296562" y="1152908"/>
+                        </a:cubicBezTo>
+                      </a:path>
+                    </a:pathLst>
+                  </a:custGeom>
+                  <ask:type>
+                    <ask:lineSketchFreehand/>
+                  </ask:type>
+                </ask:lineSketchStyleProps>
+              </a:ext>
+            </a:extLst>
+          </a:ln>
+        </p:spPr>
+        <p:style>
+          <a:lnRef idx="2">
+            <a:schemeClr val="accent1">
+              <a:shade val="50000"/>
+            </a:schemeClr>
+          </a:lnRef>
+          <a:fillRef idx="1">
+            <a:schemeClr val="accent1"/>
+          </a:fillRef>
+          <a:effectRef idx="0">
+            <a:schemeClr val="accent1"/>
+          </a:effectRef>
+          <a:fontRef idx="minor">
+            <a:schemeClr val="lt1"/>
+          </a:fontRef>
+        </p:style>
+        <p:txBody>
+          <a:bodyPr rtlCol="0" anchor="ctr"/>
+          <a:lstStyle/>
+          <a:p>
+            <a:pPr algn="ctr"/>
             <a:endParaRPr lang="en-US"/>
           </a:p>
         </p:txBody>
@@ -7140,9 +7792,16 @@
             <p:ph sz="half" idx="1"/>
           </p:nvPr>
         </p:nvSpPr>
-        <p:spPr/>
+        <p:spPr>
+          <a:xfrm>
+            <a:off x="1295399" y="1219069"/>
+            <a:ext cx="6338337" cy="2438533"/>
+          </a:xfrm>
+        </p:spPr>
         <p:txBody>
-          <a:bodyPr/>
+          <a:bodyPr>
+            <a:normAutofit/>
+          </a:bodyPr>
           <a:lstStyle/>
           <a:p>
             <a:r>
@@ -7188,14 +7847,96 @@
         </p:blipFill>
         <p:spPr>
           <a:xfrm>
-            <a:off x="6648450" y="2608160"/>
-            <a:ext cx="4800600" cy="2975180"/>
+            <a:off x="1663465" y="3730625"/>
+            <a:ext cx="5602203" cy="2975180"/>
           </a:xfrm>
           <a:prstGeom prst="rect">
             <a:avLst/>
           </a:prstGeom>
         </p:spPr>
       </p:pic>
+      <p:pic>
+        <p:nvPicPr>
+          <p:cNvPr id="6" name="Picture 5">
+            <a:extLst>
+              <a:ext uri="{FF2B5EF4-FFF2-40B4-BE49-F238E27FC236}">
+                <a16:creationId xmlns:a16="http://schemas.microsoft.com/office/drawing/2014/main" id="{F81219B6-27E8-A741-AC1B-D5CB72BACBA3}"/>
+              </a:ext>
+            </a:extLst>
+          </p:cNvPr>
+          <p:cNvPicPr>
+            <a:picLocks noChangeAspect="1"/>
+          </p:cNvPicPr>
+          <p:nvPr/>
+        </p:nvPicPr>
+        <p:blipFill>
+          <a:blip r:embed="rId3"/>
+          <a:stretch>
+            <a:fillRect/>
+          </a:stretch>
+        </p:blipFill>
+        <p:spPr>
+          <a:xfrm>
+            <a:off x="7782018" y="985635"/>
+            <a:ext cx="3796263" cy="5489980"/>
+          </a:xfrm>
+          <a:prstGeom prst="rect">
+            <a:avLst/>
+          </a:prstGeom>
+        </p:spPr>
+      </p:pic>
+      <p:sp>
+        <p:nvSpPr>
+          <p:cNvPr id="2" name="Rectangle 1">
+            <a:extLst>
+              <a:ext uri="{FF2B5EF4-FFF2-40B4-BE49-F238E27FC236}">
+                <a16:creationId xmlns:a16="http://schemas.microsoft.com/office/drawing/2014/main" id="{9C7746F5-CD45-A840-8B27-0ED4D4D2BA1E}"/>
+              </a:ext>
+            </a:extLst>
+          </p:cNvPr>
+          <p:cNvSpPr/>
+          <p:nvPr/>
+        </p:nvSpPr>
+        <p:spPr>
+          <a:xfrm>
+            <a:off x="10181968" y="6170141"/>
+            <a:ext cx="1248032" cy="214183"/>
+          </a:xfrm>
+          <a:prstGeom prst="rect">
+            <a:avLst/>
+          </a:prstGeom>
+          <a:solidFill>
+            <a:schemeClr val="bg1"/>
+          </a:solidFill>
+          <a:ln>
+            <a:noFill/>
+          </a:ln>
+        </p:spPr>
+        <p:style>
+          <a:lnRef idx="2">
+            <a:schemeClr val="accent1">
+              <a:shade val="50000"/>
+            </a:schemeClr>
+          </a:lnRef>
+          <a:fillRef idx="1">
+            <a:schemeClr val="accent1"/>
+          </a:fillRef>
+          <a:effectRef idx="0">
+            <a:schemeClr val="accent1"/>
+          </a:effectRef>
+          <a:fontRef idx="minor">
+            <a:schemeClr val="lt1"/>
+          </a:fontRef>
+        </p:style>
+        <p:txBody>
+          <a:bodyPr rtlCol="0" anchor="ctr"/>
+          <a:lstStyle/>
+          <a:p>
+            <a:pPr algn="ctr"/>
+            <a:endParaRPr lang="en-US"/>
+          </a:p>
+        </p:txBody>
+      </p:sp>
     </p:spTree>
     <p:extLst>
       <p:ext uri="{BB962C8B-B14F-4D97-AF65-F5344CB8AC3E}">

</xml_diff>

<commit_message>
updated maps with imputed values. added animation to ppt
</commit_message>
<xml_diff>
--- a/docs/Matt_Farrow_Megan_Ball_DS6306_EDA.pptx
+++ b/docs/Matt_Farrow_Megan_Ball_DS6306_EDA.pptx
@@ -1330,7 +1330,7 @@
           <a:p>
             <a:fld id="{1160EA64-D806-43AC-9DF2-F8C432F32B4C}" type="datetimeFigureOut">
               <a:rPr lang="en-US" smtClean="0"/>
-              <a:t>10/11/20</a:t>
+              <a:t>10/12/2020</a:t>
             </a:fld>
             <a:endParaRPr lang="en-US" dirty="0"/>
           </a:p>
@@ -1569,7 +1569,7 @@
           <a:p>
             <a:fld id="{E9F9C37B-1D36-470B-8223-D6C91242EC14}" type="datetimeFigureOut">
               <a:rPr lang="en-US" smtClean="0"/>
-              <a:t>10/11/20</a:t>
+              <a:t>10/12/2020</a:t>
             </a:fld>
             <a:endParaRPr lang="en-US" dirty="0"/>
           </a:p>
@@ -1749,7 +1749,7 @@
           <a:p>
             <a:fld id="{67C6F52A-A82B-47A2-A83A-8C4C91F2D59F}" type="datetimeFigureOut">
               <a:rPr lang="en-US" smtClean="0"/>
-              <a:t>10/11/20</a:t>
+              <a:t>10/12/2020</a:t>
             </a:fld>
             <a:endParaRPr lang="en-US" dirty="0"/>
           </a:p>
@@ -1919,7 +1919,7 @@
           <a:p>
             <a:fld id="{F070A7B3-6521-4DCA-87E5-044747A908C1}" type="datetimeFigureOut">
               <a:rPr lang="en-US" smtClean="0"/>
-              <a:t>10/11/20</a:t>
+              <a:t>10/12/2020</a:t>
             </a:fld>
             <a:endParaRPr lang="en-US" dirty="0"/>
           </a:p>
@@ -2193,7 +2193,7 @@
           <a:p>
             <a:fld id="{1160EA64-D806-43AC-9DF2-F8C432F32B4C}" type="datetimeFigureOut">
               <a:rPr lang="en-US" smtClean="0"/>
-              <a:t>10/11/20</a:t>
+              <a:t>10/12/2020</a:t>
             </a:fld>
             <a:endParaRPr lang="en-US" dirty="0"/>
           </a:p>
@@ -3395,7 +3395,7 @@
           <a:p>
             <a:fld id="{AB134690-1557-4C89-A502-4959FE7FAD70}" type="datetimeFigureOut">
               <a:rPr lang="en-US" smtClean="0"/>
-              <a:t>10/11/20</a:t>
+              <a:t>10/12/2020</a:t>
             </a:fld>
             <a:endParaRPr lang="en-US" dirty="0"/>
           </a:p>
@@ -3785,7 +3785,7 @@
           <a:p>
             <a:fld id="{1160EA64-D806-43AC-9DF2-F8C432F32B4C}" type="datetimeFigureOut">
               <a:rPr lang="en-US" smtClean="0"/>
-              <a:t>10/11/20</a:t>
+              <a:t>10/12/2020</a:t>
             </a:fld>
             <a:endParaRPr lang="en-US" dirty="0"/>
           </a:p>
@@ -3910,7 +3910,7 @@
           <a:p>
             <a:fld id="{E1037C31-9E7A-4F99-8774-A0E530DE1A42}" type="datetimeFigureOut">
               <a:rPr lang="en-US" smtClean="0"/>
-              <a:t>10/11/20</a:t>
+              <a:t>10/12/2020</a:t>
             </a:fld>
             <a:endParaRPr lang="en-US" dirty="0"/>
           </a:p>
@@ -4005,7 +4005,7 @@
           <a:p>
             <a:fld id="{C278504F-A551-4DE0-9316-4DCD1D8CC752}" type="datetimeFigureOut">
               <a:rPr lang="en-US" smtClean="0"/>
-              <a:t>10/11/20</a:t>
+              <a:t>10/12/2020</a:t>
             </a:fld>
             <a:endParaRPr lang="en-US" dirty="0"/>
           </a:p>
@@ -4768,7 +4768,7 @@
           <a:p>
             <a:fld id="{D1BE4249-C0D0-4B06-8692-E8BB871AF643}" type="datetimeFigureOut">
               <a:rPr lang="en-US" smtClean="0"/>
-              <a:t>10/11/20</a:t>
+              <a:t>10/12/2020</a:t>
             </a:fld>
             <a:endParaRPr lang="en-US" dirty="0"/>
           </a:p>
@@ -5608,7 +5608,7 @@
           <a:p>
             <a:fld id="{042B0DB6-F5C7-45FB-8CF3-31B45F9C2DAC}" type="datetimeFigureOut">
               <a:rPr lang="en-US" smtClean="0"/>
-              <a:t>10/11/20</a:t>
+              <a:t>10/12/2020</a:t>
             </a:fld>
             <a:endParaRPr lang="en-US" dirty="0"/>
           </a:p>
@@ -5835,7 +5835,7 @@
           <a:p>
             <a:fld id="{1160EA64-D806-43AC-9DF2-F8C432F32B4C}" type="datetimeFigureOut">
               <a:rPr lang="en-US" smtClean="0"/>
-              <a:t>10/11/20</a:t>
+              <a:t>10/12/2020</a:t>
             </a:fld>
             <a:endParaRPr lang="en-US" dirty="0"/>
           </a:p>
@@ -7728,6 +7728,314 @@
   <p:clrMapOvr>
     <a:masterClrMapping/>
   </p:clrMapOvr>
+  <p:timing>
+    <p:tnLst>
+      <p:par>
+        <p:cTn id="1" dur="indefinite" restart="never" nodeType="tmRoot">
+          <p:childTnLst>
+            <p:seq concurrent="1" nextAc="seek">
+              <p:cTn id="2" dur="indefinite" nodeType="mainSeq">
+                <p:childTnLst>
+                  <p:par>
+                    <p:cTn id="3" fill="hold">
+                      <p:stCondLst>
+                        <p:cond delay="indefinite"/>
+                      </p:stCondLst>
+                      <p:childTnLst>
+                        <p:par>
+                          <p:cTn id="4" fill="hold">
+                            <p:stCondLst>
+                              <p:cond delay="0"/>
+                            </p:stCondLst>
+                            <p:childTnLst>
+                              <p:par>
+                                <p:cTn id="5" presetID="2" presetClass="entr" presetSubtype="4" fill="hold" grpId="0" nodeType="clickEffect">
+                                  <p:stCondLst>
+                                    <p:cond delay="0"/>
+                                  </p:stCondLst>
+                                  <p:childTnLst>
+                                    <p:set>
+                                      <p:cBhvr>
+                                        <p:cTn id="6" dur="1" fill="hold">
+                                          <p:stCondLst>
+                                            <p:cond delay="0"/>
+                                          </p:stCondLst>
+                                        </p:cTn>
+                                        <p:tgtEl>
+                                          <p:spTgt spid="7"/>
+                                        </p:tgtEl>
+                                        <p:attrNameLst>
+                                          <p:attrName>style.visibility</p:attrName>
+                                        </p:attrNameLst>
+                                      </p:cBhvr>
+                                      <p:to>
+                                        <p:strVal val="visible"/>
+                                      </p:to>
+                                    </p:set>
+                                    <p:anim calcmode="lin" valueType="num">
+                                      <p:cBhvr additive="base">
+                                        <p:cTn id="7" dur="500" fill="hold"/>
+                                        <p:tgtEl>
+                                          <p:spTgt spid="7"/>
+                                        </p:tgtEl>
+                                        <p:attrNameLst>
+                                          <p:attrName>ppt_x</p:attrName>
+                                        </p:attrNameLst>
+                                      </p:cBhvr>
+                                      <p:tavLst>
+                                        <p:tav tm="0">
+                                          <p:val>
+                                            <p:strVal val="#ppt_x"/>
+                                          </p:val>
+                                        </p:tav>
+                                        <p:tav tm="100000">
+                                          <p:val>
+                                            <p:strVal val="#ppt_x"/>
+                                          </p:val>
+                                        </p:tav>
+                                      </p:tavLst>
+                                    </p:anim>
+                                    <p:anim calcmode="lin" valueType="num">
+                                      <p:cBhvr additive="base">
+                                        <p:cTn id="8" dur="500" fill="hold"/>
+                                        <p:tgtEl>
+                                          <p:spTgt spid="7"/>
+                                        </p:tgtEl>
+                                        <p:attrNameLst>
+                                          <p:attrName>ppt_y</p:attrName>
+                                        </p:attrNameLst>
+                                      </p:cBhvr>
+                                      <p:tavLst>
+                                        <p:tav tm="0">
+                                          <p:val>
+                                            <p:strVal val="1+#ppt_h/2"/>
+                                          </p:val>
+                                        </p:tav>
+                                        <p:tav tm="100000">
+                                          <p:val>
+                                            <p:strVal val="#ppt_y"/>
+                                          </p:val>
+                                        </p:tav>
+                                      </p:tavLst>
+                                    </p:anim>
+                                  </p:childTnLst>
+                                </p:cTn>
+                              </p:par>
+                            </p:childTnLst>
+                          </p:cTn>
+                        </p:par>
+                      </p:childTnLst>
+                    </p:cTn>
+                  </p:par>
+                  <p:par>
+                    <p:cTn id="9" fill="hold">
+                      <p:stCondLst>
+                        <p:cond delay="indefinite"/>
+                      </p:stCondLst>
+                      <p:childTnLst>
+                        <p:par>
+                          <p:cTn id="10" fill="hold">
+                            <p:stCondLst>
+                              <p:cond delay="0"/>
+                            </p:stCondLst>
+                            <p:childTnLst>
+                              <p:par>
+                                <p:cTn id="11" presetID="1" presetClass="entr" presetSubtype="0" fill="hold" grpId="0" nodeType="clickEffect">
+                                  <p:stCondLst>
+                                    <p:cond delay="0"/>
+                                  </p:stCondLst>
+                                  <p:childTnLst>
+                                    <p:set>
+                                      <p:cBhvr>
+                                        <p:cTn id="12" dur="1" fill="hold">
+                                          <p:stCondLst>
+                                            <p:cond delay="0"/>
+                                          </p:stCondLst>
+                                        </p:cTn>
+                                        <p:tgtEl>
+                                          <p:spTgt spid="5"/>
+                                        </p:tgtEl>
+                                        <p:attrNameLst>
+                                          <p:attrName>style.visibility</p:attrName>
+                                        </p:attrNameLst>
+                                      </p:cBhvr>
+                                      <p:to>
+                                        <p:strVal val="visible"/>
+                                      </p:to>
+                                    </p:set>
+                                  </p:childTnLst>
+                                </p:cTn>
+                              </p:par>
+                            </p:childTnLst>
+                          </p:cTn>
+                        </p:par>
+                      </p:childTnLst>
+                    </p:cTn>
+                  </p:par>
+                  <p:par>
+                    <p:cTn id="13" fill="hold">
+                      <p:stCondLst>
+                        <p:cond delay="indefinite"/>
+                      </p:stCondLst>
+                      <p:childTnLst>
+                        <p:par>
+                          <p:cTn id="14" fill="hold">
+                            <p:stCondLst>
+                              <p:cond delay="0"/>
+                            </p:stCondLst>
+                            <p:childTnLst>
+                              <p:par>
+                                <p:cTn id="15" presetID="2" presetClass="entr" presetSubtype="4" fill="hold" grpId="0" nodeType="clickEffect">
+                                  <p:stCondLst>
+                                    <p:cond delay="0"/>
+                                  </p:stCondLst>
+                                  <p:childTnLst>
+                                    <p:set>
+                                      <p:cBhvr>
+                                        <p:cTn id="16" dur="1" fill="hold">
+                                          <p:stCondLst>
+                                            <p:cond delay="0"/>
+                                          </p:stCondLst>
+                                        </p:cTn>
+                                        <p:tgtEl>
+                                          <p:spTgt spid="9"/>
+                                        </p:tgtEl>
+                                        <p:attrNameLst>
+                                          <p:attrName>style.visibility</p:attrName>
+                                        </p:attrNameLst>
+                                      </p:cBhvr>
+                                      <p:to>
+                                        <p:strVal val="visible"/>
+                                      </p:to>
+                                    </p:set>
+                                    <p:anim calcmode="lin" valueType="num">
+                                      <p:cBhvr additive="base">
+                                        <p:cTn id="17" dur="500" fill="hold"/>
+                                        <p:tgtEl>
+                                          <p:spTgt spid="9"/>
+                                        </p:tgtEl>
+                                        <p:attrNameLst>
+                                          <p:attrName>ppt_x</p:attrName>
+                                        </p:attrNameLst>
+                                      </p:cBhvr>
+                                      <p:tavLst>
+                                        <p:tav tm="0">
+                                          <p:val>
+                                            <p:strVal val="#ppt_x"/>
+                                          </p:val>
+                                        </p:tav>
+                                        <p:tav tm="100000">
+                                          <p:val>
+                                            <p:strVal val="#ppt_x"/>
+                                          </p:val>
+                                        </p:tav>
+                                      </p:tavLst>
+                                    </p:anim>
+                                    <p:anim calcmode="lin" valueType="num">
+                                      <p:cBhvr additive="base">
+                                        <p:cTn id="18" dur="500" fill="hold"/>
+                                        <p:tgtEl>
+                                          <p:spTgt spid="9"/>
+                                        </p:tgtEl>
+                                        <p:attrNameLst>
+                                          <p:attrName>ppt_y</p:attrName>
+                                        </p:attrNameLst>
+                                      </p:cBhvr>
+                                      <p:tavLst>
+                                        <p:tav tm="0">
+                                          <p:val>
+                                            <p:strVal val="1+#ppt_h/2"/>
+                                          </p:val>
+                                        </p:tav>
+                                        <p:tav tm="100000">
+                                          <p:val>
+                                            <p:strVal val="#ppt_y"/>
+                                          </p:val>
+                                        </p:tav>
+                                      </p:tavLst>
+                                    </p:anim>
+                                  </p:childTnLst>
+                                </p:cTn>
+                              </p:par>
+                            </p:childTnLst>
+                          </p:cTn>
+                        </p:par>
+                      </p:childTnLst>
+                    </p:cTn>
+                  </p:par>
+                  <p:par>
+                    <p:cTn id="19" fill="hold">
+                      <p:stCondLst>
+                        <p:cond delay="indefinite"/>
+                      </p:stCondLst>
+                      <p:childTnLst>
+                        <p:par>
+                          <p:cTn id="20" fill="hold">
+                            <p:stCondLst>
+                              <p:cond delay="0"/>
+                            </p:stCondLst>
+                            <p:childTnLst>
+                              <p:par>
+                                <p:cTn id="21" presetID="1" presetClass="entr" presetSubtype="0" fill="hold" grpId="0" nodeType="clickEffect">
+                                  <p:stCondLst>
+                                    <p:cond delay="0"/>
+                                  </p:stCondLst>
+                                  <p:childTnLst>
+                                    <p:set>
+                                      <p:cBhvr>
+                                        <p:cTn id="22" dur="1" fill="hold">
+                                          <p:stCondLst>
+                                            <p:cond delay="0"/>
+                                          </p:stCondLst>
+                                        </p:cTn>
+                                        <p:tgtEl>
+                                          <p:spTgt spid="6"/>
+                                        </p:tgtEl>
+                                        <p:attrNameLst>
+                                          <p:attrName>style.visibility</p:attrName>
+                                        </p:attrNameLst>
+                                      </p:cBhvr>
+                                      <p:to>
+                                        <p:strVal val="visible"/>
+                                      </p:to>
+                                    </p:set>
+                                  </p:childTnLst>
+                                </p:cTn>
+                              </p:par>
+                            </p:childTnLst>
+                          </p:cTn>
+                        </p:par>
+                      </p:childTnLst>
+                    </p:cTn>
+                  </p:par>
+                </p:childTnLst>
+              </p:cTn>
+              <p:prevCondLst>
+                <p:cond evt="onPrev" delay="0">
+                  <p:tgtEl>
+                    <p:sldTgt/>
+                  </p:tgtEl>
+                </p:cond>
+              </p:prevCondLst>
+              <p:nextCondLst>
+                <p:cond evt="onNext" delay="0">
+                  <p:tgtEl>
+                    <p:sldTgt/>
+                  </p:tgtEl>
+                </p:cond>
+              </p:nextCondLst>
+            </p:seq>
+          </p:childTnLst>
+        </p:cTn>
+      </p:par>
+    </p:tnLst>
+    <p:bldLst>
+      <p:bldP spid="5" grpId="0"/>
+      <p:bldP spid="6" grpId="0"/>
+      <p:bldP spid="7" grpId="0" animBg="1"/>
+      <p:bldP spid="9" grpId="0" animBg="1"/>
+    </p:bldLst>
+  </p:timing>
 </p:sld>
 </file>
 
@@ -9245,35 +9553,6 @@
           </a:p>
         </p:txBody>
       </p:sp>
-      <p:pic>
-        <p:nvPicPr>
-          <p:cNvPr id="9" name="Picture 8">
-            <a:extLst>
-              <a:ext uri="{FF2B5EF4-FFF2-40B4-BE49-F238E27FC236}">
-                <a16:creationId xmlns:a16="http://schemas.microsoft.com/office/drawing/2014/main" id="{59B5250F-C5C7-45FF-AFFA-FD1C7875FBFF}"/>
-              </a:ext>
-            </a:extLst>
-          </p:cNvPr>
-          <p:cNvPicPr>
-            <a:picLocks noChangeAspect="1"/>
-          </p:cNvPicPr>
-          <p:nvPr/>
-        </p:nvPicPr>
-        <p:blipFill rotWithShape="1">
-          <a:blip r:embed="rId2"/>
-          <a:srcRect l="4776" b="9545"/>
-          <a:stretch/>
-        </p:blipFill>
-        <p:spPr>
-          <a:xfrm>
-            <a:off x="416028" y="116327"/>
-            <a:ext cx="5978273" cy="3312672"/>
-          </a:xfrm>
-          <a:prstGeom prst="rect">
-            <a:avLst/>
-          </a:prstGeom>
-        </p:spPr>
-      </p:pic>
       <p:sp>
         <p:nvSpPr>
           <p:cNvPr id="3" name="Content Placeholder 2">
@@ -9316,24 +9595,6 @@
                   <a:srgbClr val="FFFFFF"/>
                 </a:solidFill>
               </a:rPr>
-              <a:t>*Update after imputation</a:t>
-            </a:r>
-          </a:p>
-          <a:p>
-            <a:pPr indent="-228600">
-              <a:lnSpc>
-                <a:spcPct val="110000"/>
-              </a:lnSpc>
-              <a:spcBef>
-                <a:spcPts val="700"/>
-              </a:spcBef>
-            </a:pPr>
-            <a:r>
-              <a:rPr lang="en-US" dirty="0">
-                <a:solidFill>
-                  <a:srgbClr val="FFFFFF"/>
-                </a:solidFill>
-              </a:rPr>
               <a:t>Overall, most states have similar median values for ABV… except for Utah</a:t>
             </a:r>
           </a:p>
@@ -9359,10 +9620,10 @@
       </p:sp>
       <p:pic>
         <p:nvPicPr>
-          <p:cNvPr id="13" name="Picture 12">
+          <p:cNvPr id="4" name="Picture 3">
             <a:extLst>
               <a:ext uri="{FF2B5EF4-FFF2-40B4-BE49-F238E27FC236}">
-                <a16:creationId xmlns:a16="http://schemas.microsoft.com/office/drawing/2014/main" id="{E9217E8B-CA93-4039-89EB-3AEF1490615F}"/>
+                <a16:creationId xmlns:a16="http://schemas.microsoft.com/office/drawing/2014/main" id="{6E43013F-02F8-4273-989B-531F1EAD2BB3}"/>
               </a:ext>
             </a:extLst>
           </p:cNvPr>
@@ -9372,15 +9633,44 @@
           <p:nvPr/>
         </p:nvPicPr>
         <p:blipFill>
-          <a:blip r:embed="rId3"/>
+          <a:blip r:embed="rId2"/>
           <a:stretch>
             <a:fillRect/>
           </a:stretch>
         </p:blipFill>
         <p:spPr>
           <a:xfrm>
-            <a:off x="2686325" y="3545326"/>
-            <a:ext cx="4260656" cy="3194984"/>
+            <a:off x="2796708" y="3467213"/>
+            <a:ext cx="4512688" cy="3390787"/>
+          </a:xfrm>
+          <a:prstGeom prst="rect">
+            <a:avLst/>
+          </a:prstGeom>
+        </p:spPr>
+      </p:pic>
+      <p:pic>
+        <p:nvPicPr>
+          <p:cNvPr id="6" name="Picture 5">
+            <a:extLst>
+              <a:ext uri="{FF2B5EF4-FFF2-40B4-BE49-F238E27FC236}">
+                <a16:creationId xmlns:a16="http://schemas.microsoft.com/office/drawing/2014/main" id="{B3BCB77C-2454-4577-8FB7-9E58DDCC1692}"/>
+              </a:ext>
+            </a:extLst>
+          </p:cNvPr>
+          <p:cNvPicPr>
+            <a:picLocks noChangeAspect="1"/>
+          </p:cNvPicPr>
+          <p:nvPr/>
+        </p:nvPicPr>
+        <p:blipFill rotWithShape="1">
+          <a:blip r:embed="rId3"/>
+          <a:srcRect l="4857" b="8556"/>
+          <a:stretch/>
+        </p:blipFill>
+        <p:spPr>
+          <a:xfrm>
+            <a:off x="522732" y="96396"/>
+            <a:ext cx="6456784" cy="3294391"/>
           </a:xfrm>
           <a:prstGeom prst="rect">
             <a:avLst/>
@@ -11953,7 +12243,7 @@
         </p:spPr>
         <p:txBody>
           <a:bodyPr vert="horz" lIns="91440" tIns="45720" rIns="91440" bIns="45720" rtlCol="0" anchor="t">
-            <a:normAutofit fontScale="77500" lnSpcReduction="20000"/>
+            <a:normAutofit fontScale="92500" lnSpcReduction="20000"/>
           </a:bodyPr>
           <a:lstStyle/>
           <a:p>
@@ -11969,23 +12259,15 @@
             </a:pPr>
             <a:r>
               <a:rPr lang="en-US" b="1" cap="all" spc="400" dirty="0"/>
-              <a:t>Update after imputation</a:t>
+              <a:t>West </a:t>
             </a:r>
-          </a:p>
-          <a:p>
-            <a:pPr marL="285750" indent="-285750" algn="ctr">
-              <a:lnSpc>
-                <a:spcPct val="100000"/>
-              </a:lnSpc>
-              <a:spcBef>
-                <a:spcPts val="700"/>
-              </a:spcBef>
-              <a:buFont typeface="Arial" panose="020B0604020202020204" pitchFamily="34" charset="0"/>
-              <a:buChar char="•"/>
-            </a:pPr>
+            <a:r>
+              <a:rPr lang="en-US" b="1" cap="all" spc="400" dirty="0" err="1"/>
+              <a:t>virginia</a:t>
+            </a:r>
             <a:r>
               <a:rPr lang="en-US" b="1" cap="all" spc="400" dirty="0"/>
-              <a:t>Maine likes their beer very bitter, with the highest </a:t>
+              <a:t> likes their beer very bitter, with the highest </a:t>
             </a:r>
             <a:r>
               <a:rPr lang="en-US" b="1" cap="all" spc="400" dirty="0" err="1"/>
@@ -11993,70 +12275,11 @@
             </a:r>
             <a:r>
               <a:rPr lang="en-US" b="1" cap="all" spc="400" dirty="0"/>
-              <a:t> at 61</a:t>
+              <a:t> at 57.5</a:t>
             </a:r>
           </a:p>
         </p:txBody>
       </p:sp>
-      <p:pic>
-        <p:nvPicPr>
-          <p:cNvPr id="5" name="Picture 4">
-            <a:extLst>
-              <a:ext uri="{FF2B5EF4-FFF2-40B4-BE49-F238E27FC236}">
-                <a16:creationId xmlns:a16="http://schemas.microsoft.com/office/drawing/2014/main" id="{0BC28391-DAA7-45CA-BAF0-C962E60B0856}"/>
-              </a:ext>
-            </a:extLst>
-          </p:cNvPr>
-          <p:cNvPicPr>
-            <a:picLocks noChangeAspect="1"/>
-          </p:cNvPicPr>
-          <p:nvPr/>
-        </p:nvPicPr>
-        <p:blipFill rotWithShape="1">
-          <a:blip r:embed="rId2"/>
-          <a:srcRect l="4899" b="9029"/>
-          <a:stretch/>
-        </p:blipFill>
-        <p:spPr>
-          <a:xfrm>
-            <a:off x="4910076" y="135520"/>
-            <a:ext cx="6220332" cy="3470948"/>
-          </a:xfrm>
-          <a:prstGeom prst="rect">
-            <a:avLst/>
-          </a:prstGeom>
-        </p:spPr>
-      </p:pic>
-      <p:pic>
-        <p:nvPicPr>
-          <p:cNvPr id="15" name="Picture 14">
-            <a:extLst>
-              <a:ext uri="{FF2B5EF4-FFF2-40B4-BE49-F238E27FC236}">
-                <a16:creationId xmlns:a16="http://schemas.microsoft.com/office/drawing/2014/main" id="{A3D1A2E5-42D6-4372-811E-91503646E84F}"/>
-              </a:ext>
-            </a:extLst>
-          </p:cNvPr>
-          <p:cNvPicPr>
-            <a:picLocks noChangeAspect="1"/>
-          </p:cNvPicPr>
-          <p:nvPr/>
-        </p:nvPicPr>
-        <p:blipFill>
-          <a:blip r:embed="rId3"/>
-          <a:stretch>
-            <a:fillRect/>
-          </a:stretch>
-        </p:blipFill>
-        <p:spPr>
-          <a:xfrm>
-            <a:off x="7515682" y="3758253"/>
-            <a:ext cx="4031464" cy="3023118"/>
-          </a:xfrm>
-          <a:prstGeom prst="rect">
-            <a:avLst/>
-          </a:prstGeom>
-        </p:spPr>
-      </p:pic>
       <p:sp>
         <p:nvSpPr>
           <p:cNvPr id="6" name="Explosion: 14 Points 5">
@@ -12104,6 +12327,65 @@
       </p:sp>
       <p:pic>
         <p:nvPicPr>
+          <p:cNvPr id="2" name="Picture 1">
+            <a:extLst>
+              <a:ext uri="{FF2B5EF4-FFF2-40B4-BE49-F238E27FC236}">
+                <a16:creationId xmlns:a16="http://schemas.microsoft.com/office/drawing/2014/main" id="{E101020C-1A03-44DE-AD90-9D4B7A7D1099}"/>
+              </a:ext>
+            </a:extLst>
+          </p:cNvPr>
+          <p:cNvPicPr>
+            <a:picLocks noChangeAspect="1"/>
+          </p:cNvPicPr>
+          <p:nvPr/>
+        </p:nvPicPr>
+        <p:blipFill>
+          <a:blip r:embed="rId2"/>
+          <a:stretch>
+            <a:fillRect/>
+          </a:stretch>
+        </p:blipFill>
+        <p:spPr>
+          <a:xfrm>
+            <a:off x="7435689" y="3691356"/>
+            <a:ext cx="4191450" cy="3149412"/>
+          </a:xfrm>
+          <a:prstGeom prst="rect">
+            <a:avLst/>
+          </a:prstGeom>
+        </p:spPr>
+      </p:pic>
+      <p:pic>
+        <p:nvPicPr>
+          <p:cNvPr id="7" name="Picture 6">
+            <a:extLst>
+              <a:ext uri="{FF2B5EF4-FFF2-40B4-BE49-F238E27FC236}">
+                <a16:creationId xmlns:a16="http://schemas.microsoft.com/office/drawing/2014/main" id="{6C622044-B815-4036-ABDF-8ACFE78519EB}"/>
+              </a:ext>
+            </a:extLst>
+          </p:cNvPr>
+          <p:cNvPicPr>
+            <a:picLocks noChangeAspect="1"/>
+          </p:cNvPicPr>
+          <p:nvPr/>
+        </p:nvPicPr>
+        <p:blipFill rotWithShape="1">
+          <a:blip r:embed="rId3"/>
+          <a:srcRect b="8679"/>
+          <a:stretch/>
+        </p:blipFill>
+        <p:spPr>
+          <a:xfrm>
+            <a:off x="4885119" y="76630"/>
+            <a:ext cx="7117205" cy="3450342"/>
+          </a:xfrm>
+          <a:prstGeom prst="rect">
+            <a:avLst/>
+          </a:prstGeom>
+        </p:spPr>
+      </p:pic>
+      <p:pic>
+        <p:nvPicPr>
           <p:cNvPr id="13" name="Graphic 12">
             <a:extLst>
               <a:ext uri="{FF2B5EF4-FFF2-40B4-BE49-F238E27FC236}">
@@ -12133,8 +12415,8 @@
         </p:blipFill>
         <p:spPr>
           <a:xfrm rot="9194426">
-            <a:off x="7407644" y="1840819"/>
-            <a:ext cx="3414748" cy="1719944"/>
+            <a:off x="7515935" y="2332389"/>
+            <a:ext cx="2677672" cy="1348692"/>
           </a:xfrm>
           <a:prstGeom prst="rect">
             <a:avLst/>
@@ -12151,6 +12433,135 @@
   <p:clrMapOvr>
     <a:masterClrMapping/>
   </p:clrMapOvr>
+  <p:timing>
+    <p:tnLst>
+      <p:par>
+        <p:cTn id="1" dur="indefinite" restart="never" nodeType="tmRoot">
+          <p:childTnLst>
+            <p:seq concurrent="1" nextAc="seek">
+              <p:cTn id="2" dur="indefinite" nodeType="mainSeq">
+                <p:childTnLst>
+                  <p:par>
+                    <p:cTn id="3" fill="hold">
+                      <p:stCondLst>
+                        <p:cond delay="indefinite"/>
+                      </p:stCondLst>
+                      <p:childTnLst>
+                        <p:par>
+                          <p:cTn id="4" fill="hold">
+                            <p:stCondLst>
+                              <p:cond delay="0"/>
+                            </p:stCondLst>
+                            <p:childTnLst>
+                              <p:par>
+                                <p:cTn id="5" presetID="53" presetClass="entr" presetSubtype="16" fill="hold" nodeType="clickEffect">
+                                  <p:stCondLst>
+                                    <p:cond delay="0"/>
+                                  </p:stCondLst>
+                                  <p:childTnLst>
+                                    <p:set>
+                                      <p:cBhvr>
+                                        <p:cTn id="6" dur="1" fill="hold">
+                                          <p:stCondLst>
+                                            <p:cond delay="0"/>
+                                          </p:stCondLst>
+                                        </p:cTn>
+                                        <p:tgtEl>
+                                          <p:spTgt spid="13"/>
+                                        </p:tgtEl>
+                                        <p:attrNameLst>
+                                          <p:attrName>style.visibility</p:attrName>
+                                        </p:attrNameLst>
+                                      </p:cBhvr>
+                                      <p:to>
+                                        <p:strVal val="visible"/>
+                                      </p:to>
+                                    </p:set>
+                                    <p:anim calcmode="lin" valueType="num">
+                                      <p:cBhvr>
+                                        <p:cTn id="7" dur="500" fill="hold"/>
+                                        <p:tgtEl>
+                                          <p:spTgt spid="13"/>
+                                        </p:tgtEl>
+                                        <p:attrNameLst>
+                                          <p:attrName>ppt_w</p:attrName>
+                                        </p:attrNameLst>
+                                      </p:cBhvr>
+                                      <p:tavLst>
+                                        <p:tav tm="0">
+                                          <p:val>
+                                            <p:fltVal val="0"/>
+                                          </p:val>
+                                        </p:tav>
+                                        <p:tav tm="100000">
+                                          <p:val>
+                                            <p:strVal val="#ppt_w"/>
+                                          </p:val>
+                                        </p:tav>
+                                      </p:tavLst>
+                                    </p:anim>
+                                    <p:anim calcmode="lin" valueType="num">
+                                      <p:cBhvr>
+                                        <p:cTn id="8" dur="500" fill="hold"/>
+                                        <p:tgtEl>
+                                          <p:spTgt spid="13"/>
+                                        </p:tgtEl>
+                                        <p:attrNameLst>
+                                          <p:attrName>ppt_h</p:attrName>
+                                        </p:attrNameLst>
+                                      </p:cBhvr>
+                                      <p:tavLst>
+                                        <p:tav tm="0">
+                                          <p:val>
+                                            <p:fltVal val="0"/>
+                                          </p:val>
+                                        </p:tav>
+                                        <p:tav tm="100000">
+                                          <p:val>
+                                            <p:strVal val="#ppt_h"/>
+                                          </p:val>
+                                        </p:tav>
+                                      </p:tavLst>
+                                    </p:anim>
+                                    <p:animEffect transition="in" filter="fade">
+                                      <p:cBhvr>
+                                        <p:cTn id="9" dur="500"/>
+                                        <p:tgtEl>
+                                          <p:spTgt spid="13"/>
+                                        </p:tgtEl>
+                                      </p:cBhvr>
+                                    </p:animEffect>
+                                  </p:childTnLst>
+                                </p:cTn>
+                              </p:par>
+                            </p:childTnLst>
+                          </p:cTn>
+                        </p:par>
+                      </p:childTnLst>
+                    </p:cTn>
+                  </p:par>
+                </p:childTnLst>
+              </p:cTn>
+              <p:prevCondLst>
+                <p:cond evt="onPrev" delay="0">
+                  <p:tgtEl>
+                    <p:sldTgt/>
+                  </p:tgtEl>
+                </p:cond>
+              </p:prevCondLst>
+              <p:nextCondLst>
+                <p:cond evt="onNext" delay="0">
+                  <p:tgtEl>
+                    <p:sldTgt/>
+                  </p:tgtEl>
+                </p:cond>
+              </p:nextCondLst>
+            </p:seq>
+          </p:childTnLst>
+        </p:cTn>
+      </p:par>
+    </p:tnLst>
+  </p:timing>
 </p:sld>
 </file>
 
@@ -12422,6 +12833,390 @@
   <p:clrMapOvr>
     <a:masterClrMapping/>
   </p:clrMapOvr>
+  <p:timing>
+    <p:tnLst>
+      <p:par>
+        <p:cTn id="1" dur="indefinite" restart="never" nodeType="tmRoot">
+          <p:childTnLst>
+            <p:seq concurrent="1" nextAc="seek">
+              <p:cTn id="2" dur="indefinite" nodeType="mainSeq">
+                <p:childTnLst>
+                  <p:par>
+                    <p:cTn id="3" fill="hold">
+                      <p:stCondLst>
+                        <p:cond delay="indefinite"/>
+                      </p:stCondLst>
+                      <p:childTnLst>
+                        <p:par>
+                          <p:cTn id="4" fill="hold">
+                            <p:stCondLst>
+                              <p:cond delay="0"/>
+                            </p:stCondLst>
+                            <p:childTnLst>
+                              <p:par>
+                                <p:cTn id="5" presetID="14" presetClass="entr" presetSubtype="10" fill="hold" nodeType="clickEffect">
+                                  <p:stCondLst>
+                                    <p:cond delay="0"/>
+                                  </p:stCondLst>
+                                  <p:childTnLst>
+                                    <p:set>
+                                      <p:cBhvr>
+                                        <p:cTn id="6" dur="1" fill="hold">
+                                          <p:stCondLst>
+                                            <p:cond delay="0"/>
+                                          </p:stCondLst>
+                                        </p:cTn>
+                                        <p:tgtEl>
+                                          <p:spTgt spid="13"/>
+                                        </p:tgtEl>
+                                        <p:attrNameLst>
+                                          <p:attrName>style.visibility</p:attrName>
+                                        </p:attrNameLst>
+                                      </p:cBhvr>
+                                      <p:to>
+                                        <p:strVal val="visible"/>
+                                      </p:to>
+                                    </p:set>
+                                    <p:animEffect transition="in" filter="randombar(horizontal)">
+                                      <p:cBhvr>
+                                        <p:cTn id="7" dur="500"/>
+                                        <p:tgtEl>
+                                          <p:spTgt spid="13"/>
+                                        </p:tgtEl>
+                                      </p:cBhvr>
+                                    </p:animEffect>
+                                  </p:childTnLst>
+                                </p:cTn>
+                              </p:par>
+                            </p:childTnLst>
+                          </p:cTn>
+                        </p:par>
+                      </p:childTnLst>
+                    </p:cTn>
+                  </p:par>
+                  <p:par>
+                    <p:cTn id="8" fill="hold">
+                      <p:stCondLst>
+                        <p:cond delay="indefinite"/>
+                      </p:stCondLst>
+                      <p:childTnLst>
+                        <p:par>
+                          <p:cTn id="9" fill="hold">
+                            <p:stCondLst>
+                              <p:cond delay="0"/>
+                            </p:stCondLst>
+                            <p:childTnLst>
+                              <p:par>
+                                <p:cTn id="10" presetID="42" presetClass="entr" presetSubtype="0" fill="hold" grpId="0" nodeType="clickEffect">
+                                  <p:stCondLst>
+                                    <p:cond delay="0"/>
+                                  </p:stCondLst>
+                                  <p:childTnLst>
+                                    <p:set>
+                                      <p:cBhvr>
+                                        <p:cTn id="11" dur="1" fill="hold">
+                                          <p:stCondLst>
+                                            <p:cond delay="0"/>
+                                          </p:stCondLst>
+                                        </p:cTn>
+                                        <p:tgtEl>
+                                          <p:spTgt spid="2"/>
+                                        </p:tgtEl>
+                                        <p:attrNameLst>
+                                          <p:attrName>style.visibility</p:attrName>
+                                        </p:attrNameLst>
+                                      </p:cBhvr>
+                                      <p:to>
+                                        <p:strVal val="visible"/>
+                                      </p:to>
+                                    </p:set>
+                                    <p:animEffect transition="in" filter="fade">
+                                      <p:cBhvr>
+                                        <p:cTn id="12" dur="1000"/>
+                                        <p:tgtEl>
+                                          <p:spTgt spid="2"/>
+                                        </p:tgtEl>
+                                      </p:cBhvr>
+                                    </p:animEffect>
+                                    <p:anim calcmode="lin" valueType="num">
+                                      <p:cBhvr>
+                                        <p:cTn id="13" dur="1000" fill="hold"/>
+                                        <p:tgtEl>
+                                          <p:spTgt spid="2"/>
+                                        </p:tgtEl>
+                                        <p:attrNameLst>
+                                          <p:attrName>ppt_x</p:attrName>
+                                        </p:attrNameLst>
+                                      </p:cBhvr>
+                                      <p:tavLst>
+                                        <p:tav tm="0">
+                                          <p:val>
+                                            <p:strVal val="#ppt_x"/>
+                                          </p:val>
+                                        </p:tav>
+                                        <p:tav tm="100000">
+                                          <p:val>
+                                            <p:strVal val="#ppt_x"/>
+                                          </p:val>
+                                        </p:tav>
+                                      </p:tavLst>
+                                    </p:anim>
+                                    <p:anim calcmode="lin" valueType="num">
+                                      <p:cBhvr>
+                                        <p:cTn id="14" dur="1000" fill="hold"/>
+                                        <p:tgtEl>
+                                          <p:spTgt spid="2"/>
+                                        </p:tgtEl>
+                                        <p:attrNameLst>
+                                          <p:attrName>ppt_y</p:attrName>
+                                        </p:attrNameLst>
+                                      </p:cBhvr>
+                                      <p:tavLst>
+                                        <p:tav tm="0">
+                                          <p:val>
+                                            <p:strVal val="#ppt_y+.1"/>
+                                          </p:val>
+                                        </p:tav>
+                                        <p:tav tm="100000">
+                                          <p:val>
+                                            <p:strVal val="#ppt_y"/>
+                                          </p:val>
+                                        </p:tav>
+                                      </p:tavLst>
+                                    </p:anim>
+                                  </p:childTnLst>
+                                </p:cTn>
+                              </p:par>
+                            </p:childTnLst>
+                          </p:cTn>
+                        </p:par>
+                      </p:childTnLst>
+                    </p:cTn>
+                  </p:par>
+                  <p:par>
+                    <p:cTn id="15" fill="hold">
+                      <p:stCondLst>
+                        <p:cond delay="indefinite"/>
+                      </p:stCondLst>
+                      <p:childTnLst>
+                        <p:par>
+                          <p:cTn id="16" fill="hold">
+                            <p:stCondLst>
+                              <p:cond delay="0"/>
+                            </p:stCondLst>
+                            <p:childTnLst>
+                              <p:par>
+                                <p:cTn id="17" presetID="53" presetClass="entr" presetSubtype="16" fill="hold" nodeType="clickEffect">
+                                  <p:stCondLst>
+                                    <p:cond delay="0"/>
+                                  </p:stCondLst>
+                                  <p:childTnLst>
+                                    <p:set>
+                                      <p:cBhvr>
+                                        <p:cTn id="18" dur="1" fill="hold">
+                                          <p:stCondLst>
+                                            <p:cond delay="0"/>
+                                          </p:stCondLst>
+                                        </p:cTn>
+                                        <p:tgtEl>
+                                          <p:spTgt spid="11"/>
+                                        </p:tgtEl>
+                                        <p:attrNameLst>
+                                          <p:attrName>style.visibility</p:attrName>
+                                        </p:attrNameLst>
+                                      </p:cBhvr>
+                                      <p:to>
+                                        <p:strVal val="visible"/>
+                                      </p:to>
+                                    </p:set>
+                                    <p:anim calcmode="lin" valueType="num">
+                                      <p:cBhvr>
+                                        <p:cTn id="19" dur="500" fill="hold"/>
+                                        <p:tgtEl>
+                                          <p:spTgt spid="11"/>
+                                        </p:tgtEl>
+                                        <p:attrNameLst>
+                                          <p:attrName>ppt_w</p:attrName>
+                                        </p:attrNameLst>
+                                      </p:cBhvr>
+                                      <p:tavLst>
+                                        <p:tav tm="0">
+                                          <p:val>
+                                            <p:fltVal val="0"/>
+                                          </p:val>
+                                        </p:tav>
+                                        <p:tav tm="100000">
+                                          <p:val>
+                                            <p:strVal val="#ppt_w"/>
+                                          </p:val>
+                                        </p:tav>
+                                      </p:tavLst>
+                                    </p:anim>
+                                    <p:anim calcmode="lin" valueType="num">
+                                      <p:cBhvr>
+                                        <p:cTn id="20" dur="500" fill="hold"/>
+                                        <p:tgtEl>
+                                          <p:spTgt spid="11"/>
+                                        </p:tgtEl>
+                                        <p:attrNameLst>
+                                          <p:attrName>ppt_h</p:attrName>
+                                        </p:attrNameLst>
+                                      </p:cBhvr>
+                                      <p:tavLst>
+                                        <p:tav tm="0">
+                                          <p:val>
+                                            <p:fltVal val="0"/>
+                                          </p:val>
+                                        </p:tav>
+                                        <p:tav tm="100000">
+                                          <p:val>
+                                            <p:strVal val="#ppt_h"/>
+                                          </p:val>
+                                        </p:tav>
+                                      </p:tavLst>
+                                    </p:anim>
+                                    <p:animEffect transition="in" filter="fade">
+                                      <p:cBhvr>
+                                        <p:cTn id="21" dur="500"/>
+                                        <p:tgtEl>
+                                          <p:spTgt spid="11"/>
+                                        </p:tgtEl>
+                                      </p:cBhvr>
+                                    </p:animEffect>
+                                  </p:childTnLst>
+                                </p:cTn>
+                              </p:par>
+                            </p:childTnLst>
+                          </p:cTn>
+                        </p:par>
+                      </p:childTnLst>
+                    </p:cTn>
+                  </p:par>
+                  <p:par>
+                    <p:cTn id="22" fill="hold">
+                      <p:stCondLst>
+                        <p:cond delay="indefinite"/>
+                      </p:stCondLst>
+                      <p:childTnLst>
+                        <p:par>
+                          <p:cTn id="23" fill="hold">
+                            <p:stCondLst>
+                              <p:cond delay="0"/>
+                            </p:stCondLst>
+                            <p:childTnLst>
+                              <p:par>
+                                <p:cTn id="24" presetID="42" presetClass="entr" presetSubtype="0" fill="hold" grpId="0" nodeType="clickEffect">
+                                  <p:stCondLst>
+                                    <p:cond delay="0"/>
+                                  </p:stCondLst>
+                                  <p:childTnLst>
+                                    <p:set>
+                                      <p:cBhvr>
+                                        <p:cTn id="25" dur="1" fill="hold">
+                                          <p:stCondLst>
+                                            <p:cond delay="0"/>
+                                          </p:stCondLst>
+                                        </p:cTn>
+                                        <p:tgtEl>
+                                          <p:spTgt spid="9"/>
+                                        </p:tgtEl>
+                                        <p:attrNameLst>
+                                          <p:attrName>style.visibility</p:attrName>
+                                        </p:attrNameLst>
+                                      </p:cBhvr>
+                                      <p:to>
+                                        <p:strVal val="visible"/>
+                                      </p:to>
+                                    </p:set>
+                                    <p:animEffect transition="in" filter="fade">
+                                      <p:cBhvr>
+                                        <p:cTn id="26" dur="1000"/>
+                                        <p:tgtEl>
+                                          <p:spTgt spid="9"/>
+                                        </p:tgtEl>
+                                      </p:cBhvr>
+                                    </p:animEffect>
+                                    <p:anim calcmode="lin" valueType="num">
+                                      <p:cBhvr>
+                                        <p:cTn id="27" dur="1000" fill="hold"/>
+                                        <p:tgtEl>
+                                          <p:spTgt spid="9"/>
+                                        </p:tgtEl>
+                                        <p:attrNameLst>
+                                          <p:attrName>ppt_x</p:attrName>
+                                        </p:attrNameLst>
+                                      </p:cBhvr>
+                                      <p:tavLst>
+                                        <p:tav tm="0">
+                                          <p:val>
+                                            <p:strVal val="#ppt_x"/>
+                                          </p:val>
+                                        </p:tav>
+                                        <p:tav tm="100000">
+                                          <p:val>
+                                            <p:strVal val="#ppt_x"/>
+                                          </p:val>
+                                        </p:tav>
+                                      </p:tavLst>
+                                    </p:anim>
+                                    <p:anim calcmode="lin" valueType="num">
+                                      <p:cBhvr>
+                                        <p:cTn id="28" dur="1000" fill="hold"/>
+                                        <p:tgtEl>
+                                          <p:spTgt spid="9"/>
+                                        </p:tgtEl>
+                                        <p:attrNameLst>
+                                          <p:attrName>ppt_y</p:attrName>
+                                        </p:attrNameLst>
+                                      </p:cBhvr>
+                                      <p:tavLst>
+                                        <p:tav tm="0">
+                                          <p:val>
+                                            <p:strVal val="#ppt_y+.1"/>
+                                          </p:val>
+                                        </p:tav>
+                                        <p:tav tm="100000">
+                                          <p:val>
+                                            <p:strVal val="#ppt_y"/>
+                                          </p:val>
+                                        </p:tav>
+                                      </p:tavLst>
+                                    </p:anim>
+                                  </p:childTnLst>
+                                </p:cTn>
+                              </p:par>
+                            </p:childTnLst>
+                          </p:cTn>
+                        </p:par>
+                      </p:childTnLst>
+                    </p:cTn>
+                  </p:par>
+                </p:childTnLst>
+              </p:cTn>
+              <p:prevCondLst>
+                <p:cond evt="onPrev" delay="0">
+                  <p:tgtEl>
+                    <p:sldTgt/>
+                  </p:tgtEl>
+                </p:cond>
+              </p:prevCondLst>
+              <p:nextCondLst>
+                <p:cond evt="onNext" delay="0">
+                  <p:tgtEl>
+                    <p:sldTgt/>
+                  </p:tgtEl>
+                </p:cond>
+              </p:nextCondLst>
+            </p:seq>
+          </p:childTnLst>
+        </p:cTn>
+      </p:par>
+    </p:tnLst>
+    <p:bldLst>
+      <p:bldP spid="2" grpId="0"/>
+      <p:bldP spid="9" grpId="0"/>
+    </p:bldLst>
+  </p:timing>
 </p:sld>
 </file>
 

</xml_diff>

<commit_message>
Added number of observations to data dictionary
</commit_message>
<xml_diff>
--- a/docs/Matt_Farrow_Megan_Ball_DS6306_EDA.pptx
+++ b/docs/Matt_Farrow_Megan_Ball_DS6306_EDA.pptx
@@ -1331,7 +1331,7 @@
           <a:p>
             <a:fld id="{1160EA64-D806-43AC-9DF2-F8C432F32B4C}" type="datetimeFigureOut">
               <a:rPr lang="en-US" smtClean="0"/>
-              <a:t>10/12/2020</a:t>
+              <a:t>10/13/20</a:t>
             </a:fld>
             <a:endParaRPr lang="en-US" dirty="0"/>
           </a:p>
@@ -1570,7 +1570,7 @@
           <a:p>
             <a:fld id="{E9F9C37B-1D36-470B-8223-D6C91242EC14}" type="datetimeFigureOut">
               <a:rPr lang="en-US" smtClean="0"/>
-              <a:t>10/12/2020</a:t>
+              <a:t>10/13/20</a:t>
             </a:fld>
             <a:endParaRPr lang="en-US" dirty="0"/>
           </a:p>
@@ -1750,7 +1750,7 @@
           <a:p>
             <a:fld id="{67C6F52A-A82B-47A2-A83A-8C4C91F2D59F}" type="datetimeFigureOut">
               <a:rPr lang="en-US" smtClean="0"/>
-              <a:t>10/12/2020</a:t>
+              <a:t>10/13/20</a:t>
             </a:fld>
             <a:endParaRPr lang="en-US" dirty="0"/>
           </a:p>
@@ -1920,7 +1920,7 @@
           <a:p>
             <a:fld id="{F070A7B3-6521-4DCA-87E5-044747A908C1}" type="datetimeFigureOut">
               <a:rPr lang="en-US" smtClean="0"/>
-              <a:t>10/12/2020</a:t>
+              <a:t>10/13/20</a:t>
             </a:fld>
             <a:endParaRPr lang="en-US" dirty="0"/>
           </a:p>
@@ -2194,7 +2194,7 @@
           <a:p>
             <a:fld id="{1160EA64-D806-43AC-9DF2-F8C432F32B4C}" type="datetimeFigureOut">
               <a:rPr lang="en-US" smtClean="0"/>
-              <a:t>10/12/2020</a:t>
+              <a:t>10/13/20</a:t>
             </a:fld>
             <a:endParaRPr lang="en-US" dirty="0"/>
           </a:p>
@@ -3396,7 +3396,7 @@
           <a:p>
             <a:fld id="{AB134690-1557-4C89-A502-4959FE7FAD70}" type="datetimeFigureOut">
               <a:rPr lang="en-US" smtClean="0"/>
-              <a:t>10/12/2020</a:t>
+              <a:t>10/13/20</a:t>
             </a:fld>
             <a:endParaRPr lang="en-US" dirty="0"/>
           </a:p>
@@ -3786,7 +3786,7 @@
           <a:p>
             <a:fld id="{1160EA64-D806-43AC-9DF2-F8C432F32B4C}" type="datetimeFigureOut">
               <a:rPr lang="en-US" smtClean="0"/>
-              <a:t>10/12/2020</a:t>
+              <a:t>10/13/20</a:t>
             </a:fld>
             <a:endParaRPr lang="en-US" dirty="0"/>
           </a:p>
@@ -3911,7 +3911,7 @@
           <a:p>
             <a:fld id="{E1037C31-9E7A-4F99-8774-A0E530DE1A42}" type="datetimeFigureOut">
               <a:rPr lang="en-US" smtClean="0"/>
-              <a:t>10/12/2020</a:t>
+              <a:t>10/13/20</a:t>
             </a:fld>
             <a:endParaRPr lang="en-US" dirty="0"/>
           </a:p>
@@ -4006,7 +4006,7 @@
           <a:p>
             <a:fld id="{C278504F-A551-4DE0-9316-4DCD1D8CC752}" type="datetimeFigureOut">
               <a:rPr lang="en-US" smtClean="0"/>
-              <a:t>10/12/2020</a:t>
+              <a:t>10/13/20</a:t>
             </a:fld>
             <a:endParaRPr lang="en-US" dirty="0"/>
           </a:p>
@@ -4769,7 +4769,7 @@
           <a:p>
             <a:fld id="{D1BE4249-C0D0-4B06-8692-E8BB871AF643}" type="datetimeFigureOut">
               <a:rPr lang="en-US" smtClean="0"/>
-              <a:t>10/12/2020</a:t>
+              <a:t>10/13/20</a:t>
             </a:fld>
             <a:endParaRPr lang="en-US" dirty="0"/>
           </a:p>
@@ -5609,7 +5609,7 @@
           <a:p>
             <a:fld id="{042B0DB6-F5C7-45FB-8CF3-31B45F9C2DAC}" type="datetimeFigureOut">
               <a:rPr lang="en-US" smtClean="0"/>
-              <a:t>10/12/2020</a:t>
+              <a:t>10/13/20</a:t>
             </a:fld>
             <a:endParaRPr lang="en-US" dirty="0"/>
           </a:p>
@@ -5836,7 +5836,7 @@
           <a:p>
             <a:fld id="{1160EA64-D806-43AC-9DF2-F8C432F32B4C}" type="datetimeFigureOut">
               <a:rPr lang="en-US" smtClean="0"/>
-              <a:t>10/12/2020</a:t>
+              <a:t>10/13/20</a:t>
             </a:fld>
             <a:endParaRPr lang="en-US" dirty="0"/>
           </a:p>
@@ -7143,7 +7143,7 @@
         <p:spPr>
           <a:xfrm>
             <a:off x="1251678" y="1688757"/>
-            <a:ext cx="1048685" cy="523220"/>
+            <a:ext cx="2076338" cy="523220"/>
           </a:xfrm>
           <a:prstGeom prst="rect">
             <a:avLst/>
@@ -7160,7 +7160,7 @@
               <a:rPr lang="en-US" sz="2800" dirty="0">
                 <a:latin typeface="+mj-lt"/>
               </a:rPr>
-              <a:t>Beers</a:t>
+              <a:t>Beers (2,410)</a:t>
             </a:r>
           </a:p>
         </p:txBody>
@@ -7180,7 +7180,7 @@
         <p:spPr>
           <a:xfrm>
             <a:off x="6647796" y="1688757"/>
-            <a:ext cx="1699504" cy="523220"/>
+            <a:ext cx="2563522" cy="523220"/>
           </a:xfrm>
           <a:prstGeom prst="rect">
             <a:avLst/>
@@ -7197,7 +7197,7 @@
               <a:rPr lang="en-US" sz="2800" dirty="0">
                 <a:latin typeface="+mj-lt"/>
               </a:rPr>
-              <a:t>Breweries</a:t>
+              <a:t>Breweries (558)</a:t>
             </a:r>
           </a:p>
         </p:txBody>

</xml_diff>

<commit_message>
Clean up formatting, add higher res images, add question 9 slide
</commit_message>
<xml_diff>
--- a/docs/Matt_Farrow_Megan_Ball_DS6306_EDA.pptx
+++ b/docs/Matt_Farrow_Megan_Ball_DS6306_EDA.pptx
@@ -12,8 +12,10 @@
     <p:sldId id="258" r:id="rId6"/>
     <p:sldId id="263" r:id="rId7"/>
     <p:sldId id="259" r:id="rId8"/>
-    <p:sldId id="260" r:id="rId9"/>
-    <p:sldId id="264" r:id="rId10"/>
+    <p:sldId id="265" r:id="rId9"/>
+    <p:sldId id="260" r:id="rId10"/>
+    <p:sldId id="264" r:id="rId11"/>
+    <p:sldId id="266" r:id="rId12"/>
   </p:sldIdLst>
   <p:sldSz cx="12192000" cy="6858000"/>
   <p:notesSz cx="6858000" cy="9144000"/>
@@ -1331,7 +1333,7 @@
           <a:p>
             <a:fld id="{1160EA64-D806-43AC-9DF2-F8C432F32B4C}" type="datetimeFigureOut">
               <a:rPr lang="en-US" smtClean="0"/>
-              <a:t>10/13/2020</a:t>
+              <a:t>10/19/20</a:t>
             </a:fld>
             <a:endParaRPr lang="en-US" dirty="0"/>
           </a:p>
@@ -1570,7 +1572,7 @@
           <a:p>
             <a:fld id="{E9F9C37B-1D36-470B-8223-D6C91242EC14}" type="datetimeFigureOut">
               <a:rPr lang="en-US" smtClean="0"/>
-              <a:t>10/13/2020</a:t>
+              <a:t>10/19/20</a:t>
             </a:fld>
             <a:endParaRPr lang="en-US" dirty="0"/>
           </a:p>
@@ -1750,7 +1752,7 @@
           <a:p>
             <a:fld id="{67C6F52A-A82B-47A2-A83A-8C4C91F2D59F}" type="datetimeFigureOut">
               <a:rPr lang="en-US" smtClean="0"/>
-              <a:t>10/13/2020</a:t>
+              <a:t>10/19/20</a:t>
             </a:fld>
             <a:endParaRPr lang="en-US" dirty="0"/>
           </a:p>
@@ -1920,7 +1922,7 @@
           <a:p>
             <a:fld id="{F070A7B3-6521-4DCA-87E5-044747A908C1}" type="datetimeFigureOut">
               <a:rPr lang="en-US" smtClean="0"/>
-              <a:t>10/13/2020</a:t>
+              <a:t>10/19/20</a:t>
             </a:fld>
             <a:endParaRPr lang="en-US" dirty="0"/>
           </a:p>
@@ -2194,7 +2196,7 @@
           <a:p>
             <a:fld id="{1160EA64-D806-43AC-9DF2-F8C432F32B4C}" type="datetimeFigureOut">
               <a:rPr lang="en-US" smtClean="0"/>
-              <a:t>10/13/2020</a:t>
+              <a:t>10/19/20</a:t>
             </a:fld>
             <a:endParaRPr lang="en-US" dirty="0"/>
           </a:p>
@@ -3396,7 +3398,7 @@
           <a:p>
             <a:fld id="{AB134690-1557-4C89-A502-4959FE7FAD70}" type="datetimeFigureOut">
               <a:rPr lang="en-US" smtClean="0"/>
-              <a:t>10/13/2020</a:t>
+              <a:t>10/19/20</a:t>
             </a:fld>
             <a:endParaRPr lang="en-US" dirty="0"/>
           </a:p>
@@ -3786,7 +3788,7 @@
           <a:p>
             <a:fld id="{1160EA64-D806-43AC-9DF2-F8C432F32B4C}" type="datetimeFigureOut">
               <a:rPr lang="en-US" smtClean="0"/>
-              <a:t>10/13/2020</a:t>
+              <a:t>10/19/20</a:t>
             </a:fld>
             <a:endParaRPr lang="en-US" dirty="0"/>
           </a:p>
@@ -3911,7 +3913,7 @@
           <a:p>
             <a:fld id="{E1037C31-9E7A-4F99-8774-A0E530DE1A42}" type="datetimeFigureOut">
               <a:rPr lang="en-US" smtClean="0"/>
-              <a:t>10/13/2020</a:t>
+              <a:t>10/19/20</a:t>
             </a:fld>
             <a:endParaRPr lang="en-US" dirty="0"/>
           </a:p>
@@ -4006,7 +4008,7 @@
           <a:p>
             <a:fld id="{C278504F-A551-4DE0-9316-4DCD1D8CC752}" type="datetimeFigureOut">
               <a:rPr lang="en-US" smtClean="0"/>
-              <a:t>10/13/2020</a:t>
+              <a:t>10/19/20</a:t>
             </a:fld>
             <a:endParaRPr lang="en-US" dirty="0"/>
           </a:p>
@@ -4769,7 +4771,7 @@
           <a:p>
             <a:fld id="{D1BE4249-C0D0-4B06-8692-E8BB871AF643}" type="datetimeFigureOut">
               <a:rPr lang="en-US" smtClean="0"/>
-              <a:t>10/13/2020</a:t>
+              <a:t>10/19/20</a:t>
             </a:fld>
             <a:endParaRPr lang="en-US" dirty="0"/>
           </a:p>
@@ -5609,7 +5611,7 @@
           <a:p>
             <a:fld id="{042B0DB6-F5C7-45FB-8CF3-31B45F9C2DAC}" type="datetimeFigureOut">
               <a:rPr lang="en-US" smtClean="0"/>
-              <a:t>10/13/2020</a:t>
+              <a:t>10/19/20</a:t>
             </a:fld>
             <a:endParaRPr lang="en-US" dirty="0"/>
           </a:p>
@@ -5836,7 +5838,7 @@
           <a:p>
             <a:fld id="{1160EA64-D806-43AC-9DF2-F8C432F32B4C}" type="datetimeFigureOut">
               <a:rPr lang="en-US" smtClean="0"/>
-              <a:t>10/13/2020</a:t>
+              <a:t>10/19/20</a:t>
             </a:fld>
             <a:endParaRPr lang="en-US" dirty="0"/>
           </a:p>
@@ -6914,6 +6916,420 @@
 </p:sld>
 </file>
 
+<file path=ppt/slides/slide10.xml><?xml version="1.0" encoding="utf-8"?>
+<p:sld xmlns:a="http://schemas.openxmlformats.org/drawingml/2006/main" xmlns:r="http://schemas.openxmlformats.org/officeDocument/2006/relationships" xmlns:p="http://schemas.openxmlformats.org/presentationml/2006/main">
+  <p:cSld>
+    <p:spTree>
+      <p:nvGrpSpPr>
+        <p:cNvPr id="1" name=""/>
+        <p:cNvGrpSpPr/>
+        <p:nvPr/>
+      </p:nvGrpSpPr>
+      <p:grpSpPr>
+        <a:xfrm>
+          <a:off x="0" y="0"/>
+          <a:ext cx="0" cy="0"/>
+          <a:chOff x="0" y="0"/>
+          <a:chExt cx="0" cy="0"/>
+        </a:xfrm>
+      </p:grpSpPr>
+      <p:sp>
+        <p:nvSpPr>
+          <p:cNvPr id="2" name="Title 1">
+            <a:extLst>
+              <a:ext uri="{FF2B5EF4-FFF2-40B4-BE49-F238E27FC236}">
+                <a16:creationId xmlns:a16="http://schemas.microsoft.com/office/drawing/2014/main" id="{D48EB158-C9D6-47C5-AABF-BA03D72DFC9A}"/>
+              </a:ext>
+            </a:extLst>
+          </p:cNvPr>
+          <p:cNvSpPr>
+            <a:spLocks noGrp="1"/>
+          </p:cNvSpPr>
+          <p:nvPr>
+            <p:ph type="title"/>
+          </p:nvPr>
+        </p:nvSpPr>
+        <p:spPr/>
+        <p:txBody>
+          <a:bodyPr/>
+          <a:lstStyle/>
+          <a:p>
+            <a:r>
+              <a:rPr lang="en-US" dirty="0"/>
+              <a:t>Relationship between bitter &amp; boozy</a:t>
+            </a:r>
+          </a:p>
+        </p:txBody>
+      </p:sp>
+      <p:sp>
+        <p:nvSpPr>
+          <p:cNvPr id="11" name="Text Placeholder 10">
+            <a:extLst>
+              <a:ext uri="{FF2B5EF4-FFF2-40B4-BE49-F238E27FC236}">
+                <a16:creationId xmlns:a16="http://schemas.microsoft.com/office/drawing/2014/main" id="{9C3C278C-10AC-41C2-9073-4DE0E3C14519}"/>
+              </a:ext>
+            </a:extLst>
+          </p:cNvPr>
+          <p:cNvSpPr>
+            <a:spLocks noGrp="1"/>
+          </p:cNvSpPr>
+          <p:nvPr>
+            <p:ph type="body" sz="half" idx="2"/>
+          </p:nvPr>
+        </p:nvSpPr>
+        <p:spPr/>
+        <p:txBody>
+          <a:bodyPr/>
+          <a:lstStyle/>
+          <a:p>
+            <a:endParaRPr lang="en-US" dirty="0"/>
+          </a:p>
+          <a:p>
+            <a:endParaRPr lang="en-US" dirty="0"/>
+          </a:p>
+          <a:p>
+            <a:r>
+              <a:rPr lang="en-US" dirty="0"/>
+              <a:t>In general, there appears to be a relationship between IBU and ABV.</a:t>
+            </a:r>
+          </a:p>
+          <a:p>
+            <a:endParaRPr lang="en-US" dirty="0"/>
+          </a:p>
+          <a:p>
+            <a:r>
+              <a:rPr lang="en-US" dirty="0"/>
+              <a:t>Based on our assessment, we may be able to predict ABV based on IBU along with style and other variables of interest.</a:t>
+            </a:r>
+          </a:p>
+        </p:txBody>
+      </p:sp>
+      <p:sp>
+        <p:nvSpPr>
+          <p:cNvPr id="5" name="TextBox 4">
+            <a:extLst>
+              <a:ext uri="{FF2B5EF4-FFF2-40B4-BE49-F238E27FC236}">
+                <a16:creationId xmlns:a16="http://schemas.microsoft.com/office/drawing/2014/main" id="{27618A4E-9FF7-1C41-92F5-1C0E9DE85F28}"/>
+              </a:ext>
+            </a:extLst>
+          </p:cNvPr>
+          <p:cNvSpPr txBox="1"/>
+          <p:nvPr/>
+        </p:nvSpPr>
+        <p:spPr>
+          <a:xfrm>
+            <a:off x="9667389" y="6604084"/>
+            <a:ext cx="2244524" cy="253916"/>
+          </a:xfrm>
+          <a:prstGeom prst="rect">
+            <a:avLst/>
+          </a:prstGeom>
+          <a:noFill/>
+        </p:spPr>
+        <p:txBody>
+          <a:bodyPr wrap="none" rtlCol="0">
+            <a:spAutoFit/>
+          </a:bodyPr>
+          <a:lstStyle/>
+          <a:p>
+            <a:pPr algn="r"/>
+            <a:r>
+              <a:rPr lang="en-US" sz="1000" dirty="0">
+                <a:solidFill>
+                  <a:schemeClr val="bg1"/>
+                </a:solidFill>
+              </a:rPr>
+              <a:t>Confidential — For Internal Use Only</a:t>
+            </a:r>
+          </a:p>
+        </p:txBody>
+      </p:sp>
+      <p:pic>
+        <p:nvPicPr>
+          <p:cNvPr id="4" name="Picture 3">
+            <a:extLst>
+              <a:ext uri="{FF2B5EF4-FFF2-40B4-BE49-F238E27FC236}">
+                <a16:creationId xmlns:a16="http://schemas.microsoft.com/office/drawing/2014/main" id="{E8F66A1D-45C4-F74F-B243-84CBD704383F}"/>
+              </a:ext>
+            </a:extLst>
+          </p:cNvPr>
+          <p:cNvPicPr>
+            <a:picLocks noChangeAspect="1"/>
+          </p:cNvPicPr>
+          <p:nvPr/>
+        </p:nvPicPr>
+        <p:blipFill>
+          <a:blip r:embed="rId2"/>
+          <a:stretch>
+            <a:fillRect/>
+          </a:stretch>
+        </p:blipFill>
+        <p:spPr>
+          <a:xfrm>
+            <a:off x="280087" y="0"/>
+            <a:ext cx="6858000" cy="6858000"/>
+          </a:xfrm>
+          <a:prstGeom prst="rect">
+            <a:avLst/>
+          </a:prstGeom>
+        </p:spPr>
+      </p:pic>
+    </p:spTree>
+    <p:extLst>
+      <p:ext uri="{BB962C8B-B14F-4D97-AF65-F5344CB8AC3E}">
+        <p14:creationId xmlns:p14="http://schemas.microsoft.com/office/powerpoint/2010/main" val="662711705"/>
+      </p:ext>
+    </p:extLst>
+  </p:cSld>
+  <p:clrMapOvr>
+    <a:masterClrMapping/>
+  </p:clrMapOvr>
+</p:sld>
+</file>
+
+<file path=ppt/slides/slide11.xml><?xml version="1.0" encoding="utf-8"?>
+<p:sld xmlns:a="http://schemas.openxmlformats.org/drawingml/2006/main" xmlns:r="http://schemas.openxmlformats.org/officeDocument/2006/relationships" xmlns:p="http://schemas.openxmlformats.org/presentationml/2006/main">
+  <p:cSld>
+    <p:spTree>
+      <p:nvGrpSpPr>
+        <p:cNvPr id="1" name=""/>
+        <p:cNvGrpSpPr/>
+        <p:nvPr/>
+      </p:nvGrpSpPr>
+      <p:grpSpPr>
+        <a:xfrm>
+          <a:off x="0" y="0"/>
+          <a:ext cx="0" cy="0"/>
+          <a:chOff x="0" y="0"/>
+          <a:chExt cx="0" cy="0"/>
+        </a:xfrm>
+      </p:grpSpPr>
+      <p:pic>
+        <p:nvPicPr>
+          <p:cNvPr id="3" name="Picture 2">
+            <a:extLst>
+              <a:ext uri="{FF2B5EF4-FFF2-40B4-BE49-F238E27FC236}">
+                <a16:creationId xmlns:a16="http://schemas.microsoft.com/office/drawing/2014/main" id="{193C21E6-2E56-C642-B653-F014AFBD0937}"/>
+              </a:ext>
+            </a:extLst>
+          </p:cNvPr>
+          <p:cNvPicPr>
+            <a:picLocks noChangeAspect="1"/>
+          </p:cNvPicPr>
+          <p:nvPr/>
+        </p:nvPicPr>
+        <p:blipFill rotWithShape="1">
+          <a:blip r:embed="rId2"/>
+          <a:srcRect l="3059" t="26067" r="3159" b="22997"/>
+          <a:stretch/>
+        </p:blipFill>
+        <p:spPr>
+          <a:xfrm>
+            <a:off x="2140449" y="1609387"/>
+            <a:ext cx="7911101" cy="4296766"/>
+          </a:xfrm>
+          <a:prstGeom prst="rect">
+            <a:avLst/>
+          </a:prstGeom>
+        </p:spPr>
+      </p:pic>
+      <p:sp>
+        <p:nvSpPr>
+          <p:cNvPr id="4" name="Title 4">
+            <a:extLst>
+              <a:ext uri="{FF2B5EF4-FFF2-40B4-BE49-F238E27FC236}">
+                <a16:creationId xmlns:a16="http://schemas.microsoft.com/office/drawing/2014/main" id="{883C88DB-409A-7A42-8CD4-E37DF76F1BF3}"/>
+              </a:ext>
+            </a:extLst>
+          </p:cNvPr>
+          <p:cNvSpPr txBox="1">
+            <a:spLocks/>
+          </p:cNvSpPr>
+          <p:nvPr/>
+        </p:nvSpPr>
+        <p:spPr>
+          <a:xfrm>
+            <a:off x="1252728" y="381000"/>
+            <a:ext cx="10172700" cy="1493517"/>
+          </a:xfrm>
+          <a:prstGeom prst="rect">
+            <a:avLst/>
+          </a:prstGeom>
+        </p:spPr>
+        <p:txBody>
+          <a:bodyPr/>
+          <a:lstStyle>
+            <a:lvl1pPr algn="l" defTabSz="914400" rtl="0" eaLnBrk="1" latinLnBrk="0" hangingPunct="1">
+              <a:lnSpc>
+                <a:spcPct val="90000"/>
+              </a:lnSpc>
+              <a:spcBef>
+                <a:spcPct val="0"/>
+              </a:spcBef>
+              <a:buNone/>
+              <a:defRPr sz="5100" kern="1200" cap="all" spc="200" baseline="0">
+                <a:solidFill>
+                  <a:schemeClr val="tx2"/>
+                </a:solidFill>
+                <a:latin typeface="+mj-lt"/>
+                <a:ea typeface="+mj-ea"/>
+                <a:cs typeface="+mj-cs"/>
+              </a:defRPr>
+            </a:lvl1pPr>
+          </a:lstStyle>
+          <a:p>
+            <a:pPr algn="ctr"/>
+            <a:r>
+              <a:rPr lang="en-US" sz="4000" dirty="0"/>
+              <a:t>Middle America offers untapped potential for Ipa</a:t>
+            </a:r>
+            <a:r>
+              <a:rPr lang="en-US" sz="2800" dirty="0"/>
+              <a:t>s</a:t>
+            </a:r>
+            <a:endParaRPr lang="en-US" sz="4000" dirty="0"/>
+          </a:p>
+        </p:txBody>
+      </p:sp>
+      <p:sp>
+        <p:nvSpPr>
+          <p:cNvPr id="5" name="Freeform 4">
+            <a:extLst>
+              <a:ext uri="{FF2B5EF4-FFF2-40B4-BE49-F238E27FC236}">
+                <a16:creationId xmlns:a16="http://schemas.microsoft.com/office/drawing/2014/main" id="{B2F618C9-0A43-594B-BA82-A92372DAE689}"/>
+              </a:ext>
+            </a:extLst>
+          </p:cNvPr>
+          <p:cNvSpPr/>
+          <p:nvPr/>
+        </p:nvSpPr>
+        <p:spPr>
+          <a:xfrm>
+            <a:off x="1507788" y="2938409"/>
+            <a:ext cx="3228599" cy="2866490"/>
+          </a:xfrm>
+          <a:custGeom>
+            <a:avLst/>
+            <a:gdLst>
+              <a:gd name="connsiteX0" fmla="*/ 3228599 w 3228599"/>
+              <a:gd name="connsiteY0" fmla="*/ 0 h 2506894"/>
+              <a:gd name="connsiteX1" fmla="*/ 64158 w 3228599"/>
+              <a:gd name="connsiteY1" fmla="*/ 647272 h 2506894"/>
+              <a:gd name="connsiteX2" fmla="*/ 1410073 w 3228599"/>
+              <a:gd name="connsiteY2" fmla="*/ 2506894 h 2506894"/>
+            </a:gdLst>
+            <a:ahLst/>
+            <a:cxnLst>
+              <a:cxn ang="0">
+                <a:pos x="connsiteX0" y="connsiteY0"/>
+              </a:cxn>
+              <a:cxn ang="0">
+                <a:pos x="connsiteX1" y="connsiteY1"/>
+              </a:cxn>
+              <a:cxn ang="0">
+                <a:pos x="connsiteX2" y="connsiteY2"/>
+              </a:cxn>
+            </a:cxnLst>
+            <a:rect l="l" t="t" r="r" b="b"/>
+            <a:pathLst>
+              <a:path w="3228599" h="2506894">
+                <a:moveTo>
+                  <a:pt x="3228599" y="0"/>
+                </a:moveTo>
+                <a:cubicBezTo>
+                  <a:pt x="1797922" y="114728"/>
+                  <a:pt x="367246" y="229456"/>
+                  <a:pt x="64158" y="647272"/>
+                </a:cubicBezTo>
+                <a:cubicBezTo>
+                  <a:pt x="-238930" y="1065088"/>
+                  <a:pt x="585571" y="1785991"/>
+                  <a:pt x="1410073" y="2506894"/>
+                </a:cubicBezTo>
+              </a:path>
+            </a:pathLst>
+          </a:custGeom>
+          <a:noFill/>
+          <a:ln w="57150">
+            <a:solidFill>
+              <a:srgbClr val="044389"/>
+            </a:solidFill>
+            <a:headEnd type="triangle"/>
+          </a:ln>
+        </p:spPr>
+        <p:style>
+          <a:lnRef idx="2">
+            <a:schemeClr val="accent1">
+              <a:shade val="50000"/>
+            </a:schemeClr>
+          </a:lnRef>
+          <a:fillRef idx="1">
+            <a:schemeClr val="accent1"/>
+          </a:fillRef>
+          <a:effectRef idx="0">
+            <a:schemeClr val="accent1"/>
+          </a:effectRef>
+          <a:fontRef idx="minor">
+            <a:schemeClr val="lt1"/>
+          </a:fontRef>
+        </p:style>
+        <p:txBody>
+          <a:bodyPr rtlCol="0" anchor="ctr"/>
+          <a:lstStyle/>
+          <a:p>
+            <a:pPr algn="ctr"/>
+            <a:endParaRPr lang="en-US"/>
+          </a:p>
+        </p:txBody>
+      </p:sp>
+      <p:sp>
+        <p:nvSpPr>
+          <p:cNvPr id="6" name="TextBox 5">
+            <a:extLst>
+              <a:ext uri="{FF2B5EF4-FFF2-40B4-BE49-F238E27FC236}">
+                <a16:creationId xmlns:a16="http://schemas.microsoft.com/office/drawing/2014/main" id="{F803358F-04D6-9541-B201-B4E5F9FF5E5D}"/>
+              </a:ext>
+            </a:extLst>
+          </p:cNvPr>
+          <p:cNvSpPr txBox="1"/>
+          <p:nvPr/>
+        </p:nvSpPr>
+        <p:spPr>
+          <a:xfrm>
+            <a:off x="1335640" y="5951912"/>
+            <a:ext cx="5625258" cy="369332"/>
+          </a:xfrm>
+          <a:prstGeom prst="rect">
+            <a:avLst/>
+          </a:prstGeom>
+          <a:noFill/>
+        </p:spPr>
+        <p:txBody>
+          <a:bodyPr wrap="none" rtlCol="0">
+            <a:spAutoFit/>
+          </a:bodyPr>
+          <a:lstStyle/>
+          <a:p>
+            <a:r>
+              <a:rPr lang="en-US" dirty="0"/>
+              <a:t>Red states have fewer than 10 IPAs available to consumers</a:t>
+            </a:r>
+          </a:p>
+        </p:txBody>
+      </p:sp>
+    </p:spTree>
+    <p:extLst>
+      <p:ext uri="{BB962C8B-B14F-4D97-AF65-F5344CB8AC3E}">
+        <p14:creationId xmlns:p14="http://schemas.microsoft.com/office/powerpoint/2010/main" val="253003441"/>
+      </p:ext>
+    </p:extLst>
+  </p:cSld>
+  <p:clrMapOvr>
+    <a:masterClrMapping/>
+  </p:clrMapOvr>
+</p:sld>
+</file>
+
 <file path=ppt/slides/slide2.xml><?xml version="1.0" encoding="utf-8"?>
 <p:sld xmlns:a="http://schemas.openxmlformats.org/drawingml/2006/main" xmlns:r="http://schemas.openxmlformats.org/officeDocument/2006/relationships" xmlns:p="http://schemas.openxmlformats.org/presentationml/2006/main">
   <p:cSld>
@@ -7202,6 +7618,42 @@
           </a:p>
         </p:txBody>
       </p:sp>
+      <p:sp>
+        <p:nvSpPr>
+          <p:cNvPr id="3" name="TextBox 2">
+            <a:extLst>
+              <a:ext uri="{FF2B5EF4-FFF2-40B4-BE49-F238E27FC236}">
+                <a16:creationId xmlns:a16="http://schemas.microsoft.com/office/drawing/2014/main" id="{11657664-8B3E-AD48-AF81-B2BF46313340}"/>
+              </a:ext>
+            </a:extLst>
+          </p:cNvPr>
+          <p:cNvSpPr txBox="1"/>
+          <p:nvPr/>
+        </p:nvSpPr>
+        <p:spPr>
+          <a:xfrm>
+            <a:off x="9667389" y="6604084"/>
+            <a:ext cx="2244524" cy="253916"/>
+          </a:xfrm>
+          <a:prstGeom prst="rect">
+            <a:avLst/>
+          </a:prstGeom>
+          <a:noFill/>
+        </p:spPr>
+        <p:txBody>
+          <a:bodyPr wrap="none" rtlCol="0">
+            <a:spAutoFit/>
+          </a:bodyPr>
+          <a:lstStyle/>
+          <a:p>
+            <a:pPr algn="r"/>
+            <a:r>
+              <a:rPr lang="en-US" sz="1000" dirty="0"/>
+              <a:t>Confidential — For Internal Use Only</a:t>
+            </a:r>
+          </a:p>
+        </p:txBody>
+      </p:sp>
     </p:spTree>
     <p:extLst>
       <p:ext uri="{BB962C8B-B14F-4D97-AF65-F5344CB8AC3E}">
@@ -7716,6 +8168,42 @@
           <a:p>
             <a:pPr algn="ctr"/>
             <a:endParaRPr lang="en-US"/>
+          </a:p>
+        </p:txBody>
+      </p:sp>
+      <p:sp>
+        <p:nvSpPr>
+          <p:cNvPr id="8" name="TextBox 7">
+            <a:extLst>
+              <a:ext uri="{FF2B5EF4-FFF2-40B4-BE49-F238E27FC236}">
+                <a16:creationId xmlns:a16="http://schemas.microsoft.com/office/drawing/2014/main" id="{D261E038-E48F-854A-9A54-3EA5F0FFB3F7}"/>
+              </a:ext>
+            </a:extLst>
+          </p:cNvPr>
+          <p:cNvSpPr txBox="1"/>
+          <p:nvPr/>
+        </p:nvSpPr>
+        <p:spPr>
+          <a:xfrm>
+            <a:off x="9667389" y="6604084"/>
+            <a:ext cx="2244524" cy="253916"/>
+          </a:xfrm>
+          <a:prstGeom prst="rect">
+            <a:avLst/>
+          </a:prstGeom>
+          <a:noFill/>
+        </p:spPr>
+        <p:txBody>
+          <a:bodyPr wrap="none" rtlCol="0">
+            <a:spAutoFit/>
+          </a:bodyPr>
+          <a:lstStyle/>
+          <a:p>
+            <a:pPr algn="r"/>
+            <a:r>
+              <a:rPr lang="en-US" sz="1000" dirty="0"/>
+              <a:t>Confidential — For Internal Use Only</a:t>
+            </a:r>
           </a:p>
         </p:txBody>
       </p:sp>
@@ -8113,18 +8601,28 @@
           </a:bodyPr>
           <a:lstStyle/>
           <a:p>
+            <a:pPr>
+              <a:lnSpc>
+                <a:spcPct val="130000"/>
+              </a:lnSpc>
+              <a:spcBef>
+                <a:spcPts val="1800"/>
+              </a:spcBef>
+            </a:pPr>
             <a:r>
               <a:rPr lang="en-US" dirty="0"/>
-              <a:t>First – let’s take a look at which states have the highest concentration of breweries</a:t>
+              <a:t>Colorado is a clear outlier with 47 breweries</a:t>
             </a:r>
           </a:p>
           <a:p>
-            <a:r>
-              <a:rPr lang="en-US" dirty="0"/>
-              <a:t>We have a clear outlier in Colorado with a total of 47 breweries!</a:t>
-            </a:r>
-          </a:p>
-          <a:p>
+            <a:pPr>
+              <a:lnSpc>
+                <a:spcPct val="130000"/>
+              </a:lnSpc>
+              <a:spcBef>
+                <a:spcPts val="1800"/>
+              </a:spcBef>
+            </a:pPr>
             <a:r>
               <a:rPr lang="en-US" dirty="0"/>
               <a:t>North Dakota, South Dakota, and West Virginia all tie with only one brewery per state</a:t>
@@ -8132,38 +8630,6 @@
           </a:p>
         </p:txBody>
       </p:sp>
-      <p:pic>
-        <p:nvPicPr>
-          <p:cNvPr id="10" name="Content Placeholder 9">
-            <a:extLst>
-              <a:ext uri="{FF2B5EF4-FFF2-40B4-BE49-F238E27FC236}">
-                <a16:creationId xmlns:a16="http://schemas.microsoft.com/office/drawing/2014/main" id="{D2D24557-9DBB-4A4D-9596-11EB6148ABF7}"/>
-              </a:ext>
-            </a:extLst>
-          </p:cNvPr>
-          <p:cNvPicPr>
-            <a:picLocks noGrp="1" noChangeAspect="1"/>
-          </p:cNvPicPr>
-          <p:nvPr>
-            <p:ph sz="half" idx="2"/>
-          </p:nvPr>
-        </p:nvPicPr>
-        <p:blipFill>
-          <a:blip r:embed="rId2"/>
-          <a:stretch>
-            <a:fillRect/>
-          </a:stretch>
-        </p:blipFill>
-        <p:spPr>
-          <a:xfrm>
-            <a:off x="1663465" y="3730625"/>
-            <a:ext cx="5602203" cy="2975180"/>
-          </a:xfrm>
-          <a:prstGeom prst="rect">
-            <a:avLst/>
-          </a:prstGeom>
-        </p:spPr>
-      </p:pic>
       <p:pic>
         <p:nvPicPr>
           <p:cNvPr id="6" name="Picture 5">
@@ -8179,7 +8645,7 @@
           <p:nvPr/>
         </p:nvPicPr>
         <p:blipFill>
-          <a:blip r:embed="rId3"/>
+          <a:blip r:embed="rId2"/>
           <a:stretch>
             <a:fillRect/>
           </a:stretch>
@@ -8246,6 +8712,100 @@
           </a:p>
         </p:txBody>
       </p:sp>
+      <p:sp>
+        <p:nvSpPr>
+          <p:cNvPr id="7" name="TextBox 6">
+            <a:extLst>
+              <a:ext uri="{FF2B5EF4-FFF2-40B4-BE49-F238E27FC236}">
+                <a16:creationId xmlns:a16="http://schemas.microsoft.com/office/drawing/2014/main" id="{EF8018CE-C344-E242-8897-09330AC29E0E}"/>
+              </a:ext>
+            </a:extLst>
+          </p:cNvPr>
+          <p:cNvSpPr txBox="1"/>
+          <p:nvPr/>
+        </p:nvSpPr>
+        <p:spPr>
+          <a:xfrm>
+            <a:off x="9667389" y="6604084"/>
+            <a:ext cx="2244524" cy="253916"/>
+          </a:xfrm>
+          <a:prstGeom prst="rect">
+            <a:avLst/>
+          </a:prstGeom>
+          <a:noFill/>
+        </p:spPr>
+        <p:txBody>
+          <a:bodyPr wrap="none" rtlCol="0">
+            <a:spAutoFit/>
+          </a:bodyPr>
+          <a:lstStyle/>
+          <a:p>
+            <a:pPr algn="r"/>
+            <a:r>
+              <a:rPr lang="en-US" sz="1000" dirty="0"/>
+              <a:t>Confidential — For Internal Use Only</a:t>
+            </a:r>
+          </a:p>
+        </p:txBody>
+      </p:sp>
+      <p:pic>
+        <p:nvPicPr>
+          <p:cNvPr id="15" name="Picture 14">
+            <a:extLst>
+              <a:ext uri="{FF2B5EF4-FFF2-40B4-BE49-F238E27FC236}">
+                <a16:creationId xmlns:a16="http://schemas.microsoft.com/office/drawing/2014/main" id="{7D9F4736-89C2-1445-89D0-1FFCB365B6EE}"/>
+              </a:ext>
+            </a:extLst>
+          </p:cNvPr>
+          <p:cNvPicPr>
+            <a:picLocks noChangeAspect="1"/>
+          </p:cNvPicPr>
+          <p:nvPr/>
+        </p:nvPicPr>
+        <p:blipFill rotWithShape="1">
+          <a:blip r:embed="rId3"/>
+          <a:srcRect l="2673" t="29189" r="10841" b="24445"/>
+          <a:stretch/>
+        </p:blipFill>
+        <p:spPr>
+          <a:xfrm>
+            <a:off x="1147117" y="2990335"/>
+            <a:ext cx="5931243" cy="3179806"/>
+          </a:xfrm>
+          <a:prstGeom prst="rect">
+            <a:avLst/>
+          </a:prstGeom>
+        </p:spPr>
+      </p:pic>
+      <p:pic>
+        <p:nvPicPr>
+          <p:cNvPr id="17" name="Picture 16">
+            <a:extLst>
+              <a:ext uri="{FF2B5EF4-FFF2-40B4-BE49-F238E27FC236}">
+                <a16:creationId xmlns:a16="http://schemas.microsoft.com/office/drawing/2014/main" id="{612AE178-CBB1-914A-8229-CF80D43F26CB}"/>
+              </a:ext>
+            </a:extLst>
+          </p:cNvPr>
+          <p:cNvPicPr>
+            <a:picLocks noChangeAspect="1"/>
+          </p:cNvPicPr>
+          <p:nvPr/>
+        </p:nvPicPr>
+        <p:blipFill rotWithShape="1">
+          <a:blip r:embed="rId3"/>
+          <a:srcRect l="93123" t="44324" b="37418"/>
+          <a:stretch/>
+        </p:blipFill>
+        <p:spPr>
+          <a:xfrm>
+            <a:off x="6842552" y="4773420"/>
+            <a:ext cx="471616" cy="1252152"/>
+          </a:xfrm>
+          <a:prstGeom prst="rect">
+            <a:avLst/>
+          </a:prstGeom>
+        </p:spPr>
+      </p:pic>
     </p:spTree>
     <p:extLst>
       <p:ext uri="{BB962C8B-B14F-4D97-AF65-F5344CB8AC3E}">
@@ -9530,8 +10090,8 @@
         </p:nvSpPr>
         <p:spPr>
           <a:xfrm>
-            <a:off x="8339328" y="457200"/>
-            <a:ext cx="3090672" cy="1197864"/>
+            <a:off x="8339328" y="457199"/>
+            <a:ext cx="3090672" cy="1197865"/>
           </a:xfrm>
         </p:spPr>
         <p:txBody>
@@ -9546,10 +10106,10 @@
               </a:lnSpc>
             </a:pPr>
             <a:r>
-              <a:rPr lang="en-US" spc="200">
+              <a:rPr lang="en-US" sz="4000" dirty="0">
                 <a:latin typeface="+mj-lt"/>
               </a:rPr>
-              <a:t>Alcohol by volume</a:t>
+              <a:t>ABV for each state</a:t>
             </a:r>
           </a:p>
         </p:txBody>
@@ -9572,8 +10132,8 @@
         </p:nvSpPr>
         <p:spPr>
           <a:xfrm>
-            <a:off x="8339328" y="1655065"/>
-            <a:ext cx="3090672" cy="4224528"/>
+            <a:off x="8339328" y="2112263"/>
+            <a:ext cx="3090672" cy="3767330"/>
           </a:xfrm>
         </p:spPr>
         <p:txBody>
@@ -9584,10 +10144,10 @@
           <a:p>
             <a:pPr indent="-228600">
               <a:lnSpc>
-                <a:spcPct val="110000"/>
+                <a:spcPct val="130000"/>
               </a:lnSpc>
               <a:spcBef>
-                <a:spcPts val="700"/>
+                <a:spcPts val="1800"/>
               </a:spcBef>
             </a:pPr>
             <a:r>
@@ -9602,10 +10162,10 @@
           <a:p>
             <a:pPr indent="-228600">
               <a:lnSpc>
-                <a:spcPct val="110000"/>
+                <a:spcPct val="130000"/>
               </a:lnSpc>
               <a:spcBef>
-                <a:spcPts val="700"/>
+                <a:spcPts val="1800"/>
               </a:spcBef>
             </a:pPr>
             <a:r>
@@ -9619,12 +10179,52 @@
           </a:p>
         </p:txBody>
       </p:sp>
+      <p:sp>
+        <p:nvSpPr>
+          <p:cNvPr id="11" name="TextBox 10">
+            <a:extLst>
+              <a:ext uri="{FF2B5EF4-FFF2-40B4-BE49-F238E27FC236}">
+                <a16:creationId xmlns:a16="http://schemas.microsoft.com/office/drawing/2014/main" id="{8D2F9C33-428F-BB41-B052-9AAF4AA23BF0}"/>
+              </a:ext>
+            </a:extLst>
+          </p:cNvPr>
+          <p:cNvSpPr txBox="1"/>
+          <p:nvPr/>
+        </p:nvSpPr>
+        <p:spPr>
+          <a:xfrm>
+            <a:off x="9667389" y="6604084"/>
+            <a:ext cx="2244524" cy="253916"/>
+          </a:xfrm>
+          <a:prstGeom prst="rect">
+            <a:avLst/>
+          </a:prstGeom>
+          <a:noFill/>
+        </p:spPr>
+        <p:txBody>
+          <a:bodyPr wrap="none" rtlCol="0">
+            <a:spAutoFit/>
+          </a:bodyPr>
+          <a:lstStyle/>
+          <a:p>
+            <a:pPr algn="r"/>
+            <a:r>
+              <a:rPr lang="en-US" sz="1000" dirty="0">
+                <a:solidFill>
+                  <a:schemeClr val="bg1"/>
+                </a:solidFill>
+              </a:rPr>
+              <a:t>Confidential — For Internal Use Only</a:t>
+            </a:r>
+          </a:p>
+        </p:txBody>
+      </p:sp>
       <p:pic>
         <p:nvPicPr>
-          <p:cNvPr id="4" name="Picture 3">
+          <p:cNvPr id="12" name="Picture 11">
             <a:extLst>
               <a:ext uri="{FF2B5EF4-FFF2-40B4-BE49-F238E27FC236}">
-                <a16:creationId xmlns:a16="http://schemas.microsoft.com/office/drawing/2014/main" id="{6E43013F-02F8-4273-989B-531F1EAD2BB3}"/>
+                <a16:creationId xmlns:a16="http://schemas.microsoft.com/office/drawing/2014/main" id="{876833C3-BC55-2F4E-B3E8-77BB4BE2167C}"/>
               </a:ext>
             </a:extLst>
           </p:cNvPr>
@@ -9641,8 +10241,8 @@
         </p:blipFill>
         <p:spPr>
           <a:xfrm>
-            <a:off x="2796708" y="3467213"/>
-            <a:ext cx="4512688" cy="3390787"/>
+            <a:off x="500451" y="4390767"/>
+            <a:ext cx="6569677" cy="1970903"/>
           </a:xfrm>
           <a:prstGeom prst="rect">
             <a:avLst/>
@@ -9651,10 +10251,10 @@
       </p:pic>
       <p:pic>
         <p:nvPicPr>
-          <p:cNvPr id="5" name="Picture 4">
+          <p:cNvPr id="16" name="Picture 15">
             <a:extLst>
               <a:ext uri="{FF2B5EF4-FFF2-40B4-BE49-F238E27FC236}">
-                <a16:creationId xmlns:a16="http://schemas.microsoft.com/office/drawing/2014/main" id="{7F7783B7-6C98-4414-ACC6-18792F1D46C0}"/>
+                <a16:creationId xmlns:a16="http://schemas.microsoft.com/office/drawing/2014/main" id="{44488DA7-4AFE-2947-AA46-2101B12323C2}"/>
               </a:ext>
             </a:extLst>
           </p:cNvPr>
@@ -9663,16 +10263,15 @@
           </p:cNvPicPr>
           <p:nvPr/>
         </p:nvPicPr>
-        <p:blipFill>
+        <p:blipFill rotWithShape="1">
           <a:blip r:embed="rId3"/>
-          <a:stretch>
-            <a:fillRect/>
-          </a:stretch>
+          <a:srcRect t="19775" b="19700"/>
+          <a:stretch/>
         </p:blipFill>
         <p:spPr>
           <a:xfrm>
-            <a:off x="331185" y="89903"/>
-            <a:ext cx="6113158" cy="3499202"/>
+            <a:off x="500963" y="120004"/>
+            <a:ext cx="6858000" cy="4150760"/>
           </a:xfrm>
           <a:prstGeom prst="rect">
             <a:avLst/>
@@ -12210,7 +12809,7 @@
               </a:lnSpc>
             </a:pPr>
             <a:r>
-              <a:rPr lang="en-US" sz="6000" spc="800">
+              <a:rPr lang="en-US" sz="6000" spc="800" dirty="0">
                 <a:solidFill>
                   <a:schemeClr val="tx2"/>
                 </a:solidFill>
@@ -12239,55 +12838,89 @@
         </p:nvSpPr>
         <p:spPr>
           <a:xfrm>
-            <a:off x="644854" y="5338354"/>
-            <a:ext cx="3437290" cy="1076114"/>
+            <a:off x="644854" y="4931596"/>
+            <a:ext cx="3437290" cy="1482872"/>
           </a:xfrm>
         </p:spPr>
         <p:txBody>
           <a:bodyPr vert="horz" lIns="91440" tIns="45720" rIns="91440" bIns="45720" rtlCol="0" anchor="t">
-            <a:normAutofit fontScale="92500" lnSpcReduction="20000"/>
+            <a:normAutofit lnSpcReduction="10000"/>
           </a:bodyPr>
           <a:lstStyle/>
           <a:p>
-            <a:pPr marL="285750" indent="-285750" algn="ctr">
+            <a:pPr algn="ctr">
               <a:lnSpc>
-                <a:spcPct val="100000"/>
+                <a:spcPct val="150000"/>
               </a:lnSpc>
               <a:spcBef>
-                <a:spcPts val="700"/>
+                <a:spcPts val="600"/>
               </a:spcBef>
-              <a:buFont typeface="Arial" panose="020B0604020202020204" pitchFamily="34" charset="0"/>
-              <a:buChar char="•"/>
             </a:pPr>
             <a:r>
-              <a:rPr lang="en-US" b="1" cap="all" spc="400" dirty="0"/>
+              <a:rPr lang="en-US" cap="all" spc="400" dirty="0"/>
               <a:t>West </a:t>
             </a:r>
             <a:r>
-              <a:rPr lang="en-US" b="1" cap="all" spc="400" dirty="0" err="1"/>
+              <a:rPr lang="en-US" cap="all" spc="400" dirty="0" err="1"/>
               <a:t>virginia</a:t>
             </a:r>
             <a:r>
-              <a:rPr lang="en-US" b="1" cap="all" spc="400" dirty="0"/>
+              <a:rPr lang="en-US" cap="all" spc="400" dirty="0"/>
               <a:t> likes their beer very bitter, with the highest </a:t>
             </a:r>
             <a:r>
-              <a:rPr lang="en-US" b="1" cap="all" spc="400" dirty="0" err="1"/>
+              <a:rPr lang="en-US" cap="all" spc="400" dirty="0" err="1"/>
               <a:t>ibu</a:t>
             </a:r>
             <a:r>
-              <a:rPr lang="en-US" b="1" cap="all" spc="400" dirty="0"/>
+              <a:rPr lang="en-US" cap="all" spc="400" dirty="0"/>
               <a:t> at 57.5</a:t>
+            </a:r>
+          </a:p>
+        </p:txBody>
+      </p:sp>
+      <p:sp>
+        <p:nvSpPr>
+          <p:cNvPr id="10" name="TextBox 9">
+            <a:extLst>
+              <a:ext uri="{FF2B5EF4-FFF2-40B4-BE49-F238E27FC236}">
+                <a16:creationId xmlns:a16="http://schemas.microsoft.com/office/drawing/2014/main" id="{11EE3640-FDE7-6C44-8A69-792CD471C28B}"/>
+              </a:ext>
+            </a:extLst>
+          </p:cNvPr>
+          <p:cNvSpPr txBox="1"/>
+          <p:nvPr/>
+        </p:nvSpPr>
+        <p:spPr>
+          <a:xfrm>
+            <a:off x="9667389" y="6604084"/>
+            <a:ext cx="2244524" cy="253916"/>
+          </a:xfrm>
+          <a:prstGeom prst="rect">
+            <a:avLst/>
+          </a:prstGeom>
+          <a:noFill/>
+        </p:spPr>
+        <p:txBody>
+          <a:bodyPr wrap="none" rtlCol="0">
+            <a:spAutoFit/>
+          </a:bodyPr>
+          <a:lstStyle/>
+          <a:p>
+            <a:pPr algn="r"/>
+            <a:r>
+              <a:rPr lang="en-US" sz="1000" dirty="0"/>
+              <a:t>Confidential — For Internal Use Only</a:t>
             </a:r>
           </a:p>
         </p:txBody>
       </p:sp>
       <p:pic>
         <p:nvPicPr>
-          <p:cNvPr id="8" name="Picture 7">
+          <p:cNvPr id="6" name="Picture 5">
             <a:extLst>
               <a:ext uri="{FF2B5EF4-FFF2-40B4-BE49-F238E27FC236}">
-                <a16:creationId xmlns:a16="http://schemas.microsoft.com/office/drawing/2014/main" id="{93748BA1-46E5-4726-A20B-FA45CA7C1172}"/>
+                <a16:creationId xmlns:a16="http://schemas.microsoft.com/office/drawing/2014/main" id="{47722E33-3216-974A-83ED-1CC634E4A2AB}"/>
               </a:ext>
             </a:extLst>
           </p:cNvPr>
@@ -12304,8 +12937,8 @@
         </p:blipFill>
         <p:spPr>
           <a:xfrm>
-            <a:off x="4974329" y="0"/>
-            <a:ext cx="6938785" cy="3971795"/>
+            <a:off x="4973128" y="4332832"/>
+            <a:ext cx="6938785" cy="2081636"/>
           </a:xfrm>
           <a:prstGeom prst="rect">
             <a:avLst/>
@@ -12314,10 +12947,10 @@
       </p:pic>
       <p:pic>
         <p:nvPicPr>
-          <p:cNvPr id="2" name="Picture 1">
+          <p:cNvPr id="9" name="Picture 8">
             <a:extLst>
               <a:ext uri="{FF2B5EF4-FFF2-40B4-BE49-F238E27FC236}">
-                <a16:creationId xmlns:a16="http://schemas.microsoft.com/office/drawing/2014/main" id="{E101020C-1A03-44DE-AD90-9D4B7A7D1099}"/>
+                <a16:creationId xmlns:a16="http://schemas.microsoft.com/office/drawing/2014/main" id="{B396994C-24B6-654B-BA38-BA365224DE54}"/>
               </a:ext>
             </a:extLst>
           </p:cNvPr>
@@ -12326,16 +12959,15 @@
           </p:cNvPicPr>
           <p:nvPr/>
         </p:nvPicPr>
-        <p:blipFill>
+        <p:blipFill rotWithShape="1">
           <a:blip r:embed="rId3"/>
-          <a:stretch>
-            <a:fillRect/>
-          </a:stretch>
+          <a:srcRect t="20375" b="20450"/>
+          <a:stretch/>
         </p:blipFill>
         <p:spPr>
           <a:xfrm>
-            <a:off x="7290584" y="3782389"/>
-            <a:ext cx="4191450" cy="3149412"/>
+            <a:off x="5056834" y="49874"/>
+            <a:ext cx="6858000" cy="4058294"/>
           </a:xfrm>
           <a:prstGeom prst="rect">
             <a:avLst/>
@@ -12356,7 +12988,7 @@
 </file>
 
 <file path=ppt/slides/slide7.xml><?xml version="1.0" encoding="utf-8"?>
-<p:sld xmlns:a="http://schemas.openxmlformats.org/drawingml/2006/main" xmlns:r="http://schemas.openxmlformats.org/officeDocument/2006/relationships" xmlns:p="http://schemas.openxmlformats.org/presentationml/2006/main">
+<p:sld xmlns:a="http://schemas.openxmlformats.org/drawingml/2006/main" xmlns:r="http://schemas.openxmlformats.org/officeDocument/2006/relationships" xmlns:p="http://schemas.openxmlformats.org/presentationml/2006/main" show="0">
   <p:cSld>
     <p:spTree>
       <p:nvGrpSpPr>
@@ -12609,6 +13241,42 @@
             <a:r>
               <a:rPr lang="en-US" dirty="0"/>
               <a:t>Astoria Brewing Co., Astoria, OR</a:t>
+            </a:r>
+          </a:p>
+        </p:txBody>
+      </p:sp>
+      <p:sp>
+        <p:nvSpPr>
+          <p:cNvPr id="10" name="TextBox 9">
+            <a:extLst>
+              <a:ext uri="{FF2B5EF4-FFF2-40B4-BE49-F238E27FC236}">
+                <a16:creationId xmlns:a16="http://schemas.microsoft.com/office/drawing/2014/main" id="{9A4080B4-9544-2B4D-9F00-6D8EBB37C802}"/>
+              </a:ext>
+            </a:extLst>
+          </p:cNvPr>
+          <p:cNvSpPr txBox="1"/>
+          <p:nvPr/>
+        </p:nvSpPr>
+        <p:spPr>
+          <a:xfrm>
+            <a:off x="9667389" y="6604084"/>
+            <a:ext cx="2244524" cy="253916"/>
+          </a:xfrm>
+          <a:prstGeom prst="rect">
+            <a:avLst/>
+          </a:prstGeom>
+          <a:noFill/>
+        </p:spPr>
+        <p:txBody>
+          <a:bodyPr wrap="none" rtlCol="0">
+            <a:spAutoFit/>
+          </a:bodyPr>
+          <a:lstStyle/>
+          <a:p>
+            <a:pPr algn="r"/>
+            <a:r>
+              <a:rPr lang="en-US" sz="1000" dirty="0"/>
+              <a:t>Confidential — For Internal Use Only</a:t>
             </a:r>
           </a:p>
         </p:txBody>
@@ -13011,6 +13679,600 @@
 </file>
 
 <file path=ppt/slides/slide8.xml><?xml version="1.0" encoding="utf-8"?>
+<p:sld xmlns:a="http://schemas.openxmlformats.org/drawingml/2006/main" xmlns:r="http://schemas.openxmlformats.org/officeDocument/2006/relationships" xmlns:p="http://schemas.openxmlformats.org/presentationml/2006/main">
+  <p:cSld>
+    <p:spTree>
+      <p:nvGrpSpPr>
+        <p:cNvPr id="1" name=""/>
+        <p:cNvGrpSpPr/>
+        <p:nvPr/>
+      </p:nvGrpSpPr>
+      <p:grpSpPr>
+        <a:xfrm>
+          <a:off x="0" y="0"/>
+          <a:ext cx="0" cy="0"/>
+          <a:chOff x="0" y="0"/>
+          <a:chExt cx="0" cy="0"/>
+        </a:xfrm>
+      </p:grpSpPr>
+      <p:sp>
+        <p:nvSpPr>
+          <p:cNvPr id="5" name="Title 4">
+            <a:extLst>
+              <a:ext uri="{FF2B5EF4-FFF2-40B4-BE49-F238E27FC236}">
+                <a16:creationId xmlns:a16="http://schemas.microsoft.com/office/drawing/2014/main" id="{B8132E9D-BFE1-46A0-9A17-5C94C1892823}"/>
+              </a:ext>
+            </a:extLst>
+          </p:cNvPr>
+          <p:cNvSpPr>
+            <a:spLocks noGrp="1"/>
+          </p:cNvSpPr>
+          <p:nvPr>
+            <p:ph type="title"/>
+          </p:nvPr>
+        </p:nvSpPr>
+        <p:spPr/>
+        <p:txBody>
+          <a:bodyPr/>
+          <a:lstStyle/>
+          <a:p>
+            <a:pPr algn="ctr"/>
+            <a:r>
+              <a:rPr lang="en-US" dirty="0"/>
+              <a:t>Which state has the beer with highest abv? </a:t>
+            </a:r>
+            <a:r>
+              <a:rPr lang="en-US" dirty="0" err="1"/>
+              <a:t>Ibu</a:t>
+            </a:r>
+            <a:r>
+              <a:rPr lang="en-US" dirty="0"/>
+              <a:t>?</a:t>
+            </a:r>
+          </a:p>
+        </p:txBody>
+      </p:sp>
+      <p:sp>
+        <p:nvSpPr>
+          <p:cNvPr id="6" name="Text Placeholder 5">
+            <a:extLst>
+              <a:ext uri="{FF2B5EF4-FFF2-40B4-BE49-F238E27FC236}">
+                <a16:creationId xmlns:a16="http://schemas.microsoft.com/office/drawing/2014/main" id="{A5304EE2-5635-49E0-A79C-FA4AF1EB80CD}"/>
+              </a:ext>
+            </a:extLst>
+          </p:cNvPr>
+          <p:cNvSpPr>
+            <a:spLocks noGrp="1"/>
+          </p:cNvSpPr>
+          <p:nvPr>
+            <p:ph type="body" idx="1"/>
+          </p:nvPr>
+        </p:nvSpPr>
+        <p:spPr>
+          <a:xfrm>
+            <a:off x="1251678" y="1946991"/>
+            <a:ext cx="4800600" cy="432025"/>
+          </a:xfrm>
+        </p:spPr>
+        <p:txBody>
+          <a:bodyPr/>
+          <a:lstStyle/>
+          <a:p>
+            <a:pPr algn="ctr"/>
+            <a:r>
+              <a:rPr lang="en-US" dirty="0"/>
+              <a:t>Most alcoholic – </a:t>
+            </a:r>
+            <a:r>
+              <a:rPr lang="en-US" dirty="0">
+                <a:solidFill>
+                  <a:srgbClr val="C00000"/>
+                </a:solidFill>
+              </a:rPr>
+              <a:t>12.8%</a:t>
+            </a:r>
+          </a:p>
+        </p:txBody>
+      </p:sp>
+      <p:sp>
+        <p:nvSpPr>
+          <p:cNvPr id="8" name="Text Placeholder 7">
+            <a:extLst>
+              <a:ext uri="{FF2B5EF4-FFF2-40B4-BE49-F238E27FC236}">
+                <a16:creationId xmlns:a16="http://schemas.microsoft.com/office/drawing/2014/main" id="{31775982-443D-4D42-B9FC-C878058CAA29}"/>
+              </a:ext>
+            </a:extLst>
+          </p:cNvPr>
+          <p:cNvSpPr>
+            <a:spLocks noGrp="1"/>
+          </p:cNvSpPr>
+          <p:nvPr>
+            <p:ph type="body" sz="quarter" idx="3"/>
+          </p:nvPr>
+        </p:nvSpPr>
+        <p:spPr>
+          <a:xfrm>
+            <a:off x="6634162" y="1946991"/>
+            <a:ext cx="4800600" cy="432025"/>
+          </a:xfrm>
+        </p:spPr>
+        <p:txBody>
+          <a:bodyPr/>
+          <a:lstStyle/>
+          <a:p>
+            <a:pPr algn="ctr"/>
+            <a:r>
+              <a:rPr lang="en-US" dirty="0"/>
+              <a:t>Most bitter – </a:t>
+            </a:r>
+            <a:r>
+              <a:rPr lang="en-US" dirty="0">
+                <a:solidFill>
+                  <a:srgbClr val="C00000"/>
+                </a:solidFill>
+              </a:rPr>
+              <a:t>138 IBU</a:t>
+            </a:r>
+          </a:p>
+        </p:txBody>
+      </p:sp>
+      <p:sp>
+        <p:nvSpPr>
+          <p:cNvPr id="2" name="TextBox 1">
+            <a:extLst>
+              <a:ext uri="{FF2B5EF4-FFF2-40B4-BE49-F238E27FC236}">
+                <a16:creationId xmlns:a16="http://schemas.microsoft.com/office/drawing/2014/main" id="{8EAB9A6E-7374-44DB-88F6-0FAA28381BC2}"/>
+              </a:ext>
+            </a:extLst>
+          </p:cNvPr>
+          <p:cNvSpPr txBox="1"/>
+          <p:nvPr/>
+        </p:nvSpPr>
+        <p:spPr>
+          <a:xfrm>
+            <a:off x="2316705" y="5835562"/>
+            <a:ext cx="2670547" cy="954107"/>
+          </a:xfrm>
+          <a:prstGeom prst="rect">
+            <a:avLst/>
+          </a:prstGeom>
+          <a:noFill/>
+        </p:spPr>
+        <p:txBody>
+          <a:bodyPr wrap="square" rtlCol="0">
+            <a:spAutoFit/>
+          </a:bodyPr>
+          <a:lstStyle/>
+          <a:p>
+            <a:pPr algn="ctr"/>
+            <a:r>
+              <a:rPr lang="en-US" sz="1400" b="1" dirty="0"/>
+              <a:t>Lee Hill Series Vol. 5</a:t>
+            </a:r>
+          </a:p>
+          <a:p>
+            <a:pPr algn="ctr"/>
+            <a:r>
+              <a:rPr lang="en-US" sz="1400" dirty="0"/>
+              <a:t>Belgian Style </a:t>
+            </a:r>
+            <a:r>
+              <a:rPr lang="en-US" sz="1400" dirty="0" err="1"/>
+              <a:t>Quadrupel</a:t>
+            </a:r>
+            <a:r>
+              <a:rPr lang="en-US" sz="1400" dirty="0"/>
+              <a:t> Ale</a:t>
+            </a:r>
+          </a:p>
+          <a:p>
+            <a:pPr algn="ctr"/>
+            <a:r>
+              <a:rPr lang="en-US" sz="1400" dirty="0"/>
+              <a:t>Upslope Brewing Co.</a:t>
+            </a:r>
+          </a:p>
+          <a:p>
+            <a:pPr algn="ctr"/>
+            <a:r>
+              <a:rPr lang="en-US" sz="1400" dirty="0"/>
+              <a:t>Boulder, CO</a:t>
+            </a:r>
+          </a:p>
+        </p:txBody>
+      </p:sp>
+      <p:sp>
+        <p:nvSpPr>
+          <p:cNvPr id="9" name="TextBox 8">
+            <a:extLst>
+              <a:ext uri="{FF2B5EF4-FFF2-40B4-BE49-F238E27FC236}">
+                <a16:creationId xmlns:a16="http://schemas.microsoft.com/office/drawing/2014/main" id="{85E7F0ED-8977-4206-B68E-3DF0B363820E}"/>
+              </a:ext>
+            </a:extLst>
+          </p:cNvPr>
+          <p:cNvSpPr txBox="1"/>
+          <p:nvPr/>
+        </p:nvSpPr>
+        <p:spPr>
+          <a:xfrm>
+            <a:off x="7874171" y="5835562"/>
+            <a:ext cx="2320583" cy="738664"/>
+          </a:xfrm>
+          <a:prstGeom prst="rect">
+            <a:avLst/>
+          </a:prstGeom>
+          <a:noFill/>
+        </p:spPr>
+        <p:txBody>
+          <a:bodyPr wrap="square" rtlCol="0">
+            <a:spAutoFit/>
+          </a:bodyPr>
+          <a:lstStyle/>
+          <a:p>
+            <a:pPr algn="ctr"/>
+            <a:r>
+              <a:rPr lang="en-US" sz="1400" b="1" dirty="0"/>
+              <a:t>Bitter Bitch Imperial IPA</a:t>
+            </a:r>
+          </a:p>
+          <a:p>
+            <a:pPr algn="ctr"/>
+            <a:r>
+              <a:rPr lang="en-US" sz="1400" dirty="0"/>
+              <a:t>Astoria Brewing Co.</a:t>
+            </a:r>
+          </a:p>
+          <a:p>
+            <a:pPr algn="ctr"/>
+            <a:r>
+              <a:rPr lang="en-US" sz="1400" dirty="0"/>
+              <a:t>Astoria, OR</a:t>
+            </a:r>
+          </a:p>
+        </p:txBody>
+      </p:sp>
+      <p:sp>
+        <p:nvSpPr>
+          <p:cNvPr id="10" name="TextBox 9">
+            <a:extLst>
+              <a:ext uri="{FF2B5EF4-FFF2-40B4-BE49-F238E27FC236}">
+                <a16:creationId xmlns:a16="http://schemas.microsoft.com/office/drawing/2014/main" id="{9A4080B4-9544-2B4D-9F00-6D8EBB37C802}"/>
+              </a:ext>
+            </a:extLst>
+          </p:cNvPr>
+          <p:cNvSpPr txBox="1"/>
+          <p:nvPr/>
+        </p:nvSpPr>
+        <p:spPr>
+          <a:xfrm>
+            <a:off x="9667389" y="6604084"/>
+            <a:ext cx="2244524" cy="253916"/>
+          </a:xfrm>
+          <a:prstGeom prst="rect">
+            <a:avLst/>
+          </a:prstGeom>
+          <a:noFill/>
+        </p:spPr>
+        <p:txBody>
+          <a:bodyPr wrap="none" rtlCol="0">
+            <a:spAutoFit/>
+          </a:bodyPr>
+          <a:lstStyle/>
+          <a:p>
+            <a:pPr algn="r"/>
+            <a:r>
+              <a:rPr lang="en-US" sz="1000" dirty="0"/>
+              <a:t>Confidential — For Internal Use Only</a:t>
+            </a:r>
+          </a:p>
+        </p:txBody>
+      </p:sp>
+      <p:pic>
+        <p:nvPicPr>
+          <p:cNvPr id="15" name="Picture 14">
+            <a:extLst>
+              <a:ext uri="{FF2B5EF4-FFF2-40B4-BE49-F238E27FC236}">
+                <a16:creationId xmlns:a16="http://schemas.microsoft.com/office/drawing/2014/main" id="{BA1660E4-92D6-CD41-9C09-2E8403674B6F}"/>
+              </a:ext>
+            </a:extLst>
+          </p:cNvPr>
+          <p:cNvPicPr>
+            <a:picLocks noChangeAspect="1"/>
+          </p:cNvPicPr>
+          <p:nvPr/>
+        </p:nvPicPr>
+        <p:blipFill>
+          <a:blip r:embed="rId2"/>
+          <a:stretch>
+            <a:fillRect/>
+          </a:stretch>
+        </p:blipFill>
+        <p:spPr>
+          <a:xfrm>
+            <a:off x="2893938" y="2336553"/>
+            <a:ext cx="1516081" cy="3546389"/>
+          </a:xfrm>
+          <a:prstGeom prst="rect">
+            <a:avLst/>
+          </a:prstGeom>
+        </p:spPr>
+      </p:pic>
+      <p:pic>
+        <p:nvPicPr>
+          <p:cNvPr id="19" name="Picture 18">
+            <a:extLst>
+              <a:ext uri="{FF2B5EF4-FFF2-40B4-BE49-F238E27FC236}">
+                <a16:creationId xmlns:a16="http://schemas.microsoft.com/office/drawing/2014/main" id="{991FCD68-1007-5841-8F32-3FD67731CB24}"/>
+              </a:ext>
+            </a:extLst>
+          </p:cNvPr>
+          <p:cNvPicPr>
+            <a:picLocks noChangeAspect="1"/>
+          </p:cNvPicPr>
+          <p:nvPr/>
+        </p:nvPicPr>
+        <p:blipFill>
+          <a:blip r:embed="rId3"/>
+          <a:stretch>
+            <a:fillRect/>
+          </a:stretch>
+        </p:blipFill>
+        <p:spPr>
+          <a:xfrm>
+            <a:off x="7601360" y="2676645"/>
+            <a:ext cx="2866204" cy="2866204"/>
+          </a:xfrm>
+          <a:prstGeom prst="rect">
+            <a:avLst/>
+          </a:prstGeom>
+        </p:spPr>
+      </p:pic>
+    </p:spTree>
+    <p:extLst>
+      <p:ext uri="{BB962C8B-B14F-4D97-AF65-F5344CB8AC3E}">
+        <p14:creationId xmlns:p14="http://schemas.microsoft.com/office/powerpoint/2010/main" val="3674204221"/>
+      </p:ext>
+    </p:extLst>
+  </p:cSld>
+  <p:clrMapOvr>
+    <a:masterClrMapping/>
+  </p:clrMapOvr>
+  <p:timing>
+    <p:tnLst>
+      <p:par>
+        <p:cTn id="1" dur="indefinite" restart="never" nodeType="tmRoot">
+          <p:childTnLst>
+            <p:seq concurrent="1" nextAc="seek">
+              <p:cTn id="2" dur="indefinite" nodeType="mainSeq">
+                <p:childTnLst>
+                  <p:par>
+                    <p:cTn id="3" fill="hold">
+                      <p:stCondLst>
+                        <p:cond delay="indefinite"/>
+                      </p:stCondLst>
+                      <p:childTnLst>
+                        <p:par>
+                          <p:cTn id="4" fill="hold">
+                            <p:stCondLst>
+                              <p:cond delay="0"/>
+                            </p:stCondLst>
+                            <p:childTnLst>
+                              <p:par>
+                                <p:cTn id="5" presetID="42" presetClass="entr" presetSubtype="0" fill="hold" grpId="0" nodeType="clickEffect">
+                                  <p:stCondLst>
+                                    <p:cond delay="0"/>
+                                  </p:stCondLst>
+                                  <p:childTnLst>
+                                    <p:set>
+                                      <p:cBhvr>
+                                        <p:cTn id="6" dur="1" fill="hold">
+                                          <p:stCondLst>
+                                            <p:cond delay="0"/>
+                                          </p:stCondLst>
+                                        </p:cTn>
+                                        <p:tgtEl>
+                                          <p:spTgt spid="2"/>
+                                        </p:tgtEl>
+                                        <p:attrNameLst>
+                                          <p:attrName>style.visibility</p:attrName>
+                                        </p:attrNameLst>
+                                      </p:cBhvr>
+                                      <p:to>
+                                        <p:strVal val="visible"/>
+                                      </p:to>
+                                    </p:set>
+                                    <p:animEffect transition="in" filter="fade">
+                                      <p:cBhvr>
+                                        <p:cTn id="7" dur="1000"/>
+                                        <p:tgtEl>
+                                          <p:spTgt spid="2"/>
+                                        </p:tgtEl>
+                                      </p:cBhvr>
+                                    </p:animEffect>
+                                    <p:anim calcmode="lin" valueType="num">
+                                      <p:cBhvr>
+                                        <p:cTn id="8" dur="1000" fill="hold"/>
+                                        <p:tgtEl>
+                                          <p:spTgt spid="2"/>
+                                        </p:tgtEl>
+                                        <p:attrNameLst>
+                                          <p:attrName>ppt_x</p:attrName>
+                                        </p:attrNameLst>
+                                      </p:cBhvr>
+                                      <p:tavLst>
+                                        <p:tav tm="0">
+                                          <p:val>
+                                            <p:strVal val="#ppt_x"/>
+                                          </p:val>
+                                        </p:tav>
+                                        <p:tav tm="100000">
+                                          <p:val>
+                                            <p:strVal val="#ppt_x"/>
+                                          </p:val>
+                                        </p:tav>
+                                      </p:tavLst>
+                                    </p:anim>
+                                    <p:anim calcmode="lin" valueType="num">
+                                      <p:cBhvr>
+                                        <p:cTn id="9" dur="1000" fill="hold"/>
+                                        <p:tgtEl>
+                                          <p:spTgt spid="2"/>
+                                        </p:tgtEl>
+                                        <p:attrNameLst>
+                                          <p:attrName>ppt_y</p:attrName>
+                                        </p:attrNameLst>
+                                      </p:cBhvr>
+                                      <p:tavLst>
+                                        <p:tav tm="0">
+                                          <p:val>
+                                            <p:strVal val="#ppt_y+.1"/>
+                                          </p:val>
+                                        </p:tav>
+                                        <p:tav tm="100000">
+                                          <p:val>
+                                            <p:strVal val="#ppt_y"/>
+                                          </p:val>
+                                        </p:tav>
+                                      </p:tavLst>
+                                    </p:anim>
+                                  </p:childTnLst>
+                                </p:cTn>
+                              </p:par>
+                            </p:childTnLst>
+                          </p:cTn>
+                        </p:par>
+                      </p:childTnLst>
+                    </p:cTn>
+                  </p:par>
+                  <p:par>
+                    <p:cTn id="10" fill="hold">
+                      <p:stCondLst>
+                        <p:cond delay="indefinite"/>
+                      </p:stCondLst>
+                      <p:childTnLst>
+                        <p:par>
+                          <p:cTn id="11" fill="hold">
+                            <p:stCondLst>
+                              <p:cond delay="0"/>
+                            </p:stCondLst>
+                            <p:childTnLst>
+                              <p:par>
+                                <p:cTn id="12" presetID="42" presetClass="entr" presetSubtype="0" fill="hold" grpId="0" nodeType="clickEffect">
+                                  <p:stCondLst>
+                                    <p:cond delay="0"/>
+                                  </p:stCondLst>
+                                  <p:childTnLst>
+                                    <p:set>
+                                      <p:cBhvr>
+                                        <p:cTn id="13" dur="1" fill="hold">
+                                          <p:stCondLst>
+                                            <p:cond delay="0"/>
+                                          </p:stCondLst>
+                                        </p:cTn>
+                                        <p:tgtEl>
+                                          <p:spTgt spid="9"/>
+                                        </p:tgtEl>
+                                        <p:attrNameLst>
+                                          <p:attrName>style.visibility</p:attrName>
+                                        </p:attrNameLst>
+                                      </p:cBhvr>
+                                      <p:to>
+                                        <p:strVal val="visible"/>
+                                      </p:to>
+                                    </p:set>
+                                    <p:animEffect transition="in" filter="fade">
+                                      <p:cBhvr>
+                                        <p:cTn id="14" dur="1000"/>
+                                        <p:tgtEl>
+                                          <p:spTgt spid="9"/>
+                                        </p:tgtEl>
+                                      </p:cBhvr>
+                                    </p:animEffect>
+                                    <p:anim calcmode="lin" valueType="num">
+                                      <p:cBhvr>
+                                        <p:cTn id="15" dur="1000" fill="hold"/>
+                                        <p:tgtEl>
+                                          <p:spTgt spid="9"/>
+                                        </p:tgtEl>
+                                        <p:attrNameLst>
+                                          <p:attrName>ppt_x</p:attrName>
+                                        </p:attrNameLst>
+                                      </p:cBhvr>
+                                      <p:tavLst>
+                                        <p:tav tm="0">
+                                          <p:val>
+                                            <p:strVal val="#ppt_x"/>
+                                          </p:val>
+                                        </p:tav>
+                                        <p:tav tm="100000">
+                                          <p:val>
+                                            <p:strVal val="#ppt_x"/>
+                                          </p:val>
+                                        </p:tav>
+                                      </p:tavLst>
+                                    </p:anim>
+                                    <p:anim calcmode="lin" valueType="num">
+                                      <p:cBhvr>
+                                        <p:cTn id="16" dur="1000" fill="hold"/>
+                                        <p:tgtEl>
+                                          <p:spTgt spid="9"/>
+                                        </p:tgtEl>
+                                        <p:attrNameLst>
+                                          <p:attrName>ppt_y</p:attrName>
+                                        </p:attrNameLst>
+                                      </p:cBhvr>
+                                      <p:tavLst>
+                                        <p:tav tm="0">
+                                          <p:val>
+                                            <p:strVal val="#ppt_y+.1"/>
+                                          </p:val>
+                                        </p:tav>
+                                        <p:tav tm="100000">
+                                          <p:val>
+                                            <p:strVal val="#ppt_y"/>
+                                          </p:val>
+                                        </p:tav>
+                                      </p:tavLst>
+                                    </p:anim>
+                                  </p:childTnLst>
+                                </p:cTn>
+                              </p:par>
+                            </p:childTnLst>
+                          </p:cTn>
+                        </p:par>
+                      </p:childTnLst>
+                    </p:cTn>
+                  </p:par>
+                </p:childTnLst>
+              </p:cTn>
+              <p:prevCondLst>
+                <p:cond evt="onPrev" delay="0">
+                  <p:tgtEl>
+                    <p:sldTgt/>
+                  </p:tgtEl>
+                </p:cond>
+              </p:prevCondLst>
+              <p:nextCondLst>
+                <p:cond evt="onNext" delay="0">
+                  <p:tgtEl>
+                    <p:sldTgt/>
+                  </p:tgtEl>
+                </p:cond>
+              </p:nextCondLst>
+            </p:seq>
+          </p:childTnLst>
+        </p:cTn>
+      </p:par>
+    </p:tnLst>
+    <p:bldLst>
+      <p:bldP spid="2" grpId="0"/>
+      <p:bldP spid="9" grpId="0"/>
+    </p:bldLst>
+  </p:timing>
+</p:sld>
+</file>
+
+<file path=ppt/slides/slide9.xml><?xml version="1.0" encoding="utf-8"?>
 <p:sld xmlns:a="http://schemas.openxmlformats.org/drawingml/2006/main" xmlns:r="http://schemas.openxmlformats.org/officeDocument/2006/relationships" xmlns:p="http://schemas.openxmlformats.org/presentationml/2006/main">
   <p:cSld>
     <p:bg>
@@ -15651,8 +16913,8 @@
         </p:nvSpPr>
         <p:spPr>
           <a:xfrm>
-            <a:off x="9132848" y="4841966"/>
-            <a:ext cx="2763061" cy="1297578"/>
+            <a:off x="9132848" y="5018314"/>
+            <a:ext cx="2988411" cy="1121229"/>
           </a:xfrm>
           <a:prstGeom prst="rect">
             <a:avLst/>
@@ -15678,46 +16940,112 @@
           <a:bodyPr rtlCol="0" anchor="ctr"/>
           <a:lstStyle/>
           <a:p>
-            <a:pPr marL="285750" indent="-285750" algn="ctr">
-              <a:buFontTx/>
-              <a:buChar char="-"/>
+            <a:pPr>
+              <a:lnSpc>
+                <a:spcPct val="150000"/>
+              </a:lnSpc>
             </a:pPr>
             <a:r>
-              <a:rPr lang="en-US" sz="1600" dirty="0"/>
+              <a:rPr lang="en-US" sz="1600" dirty="0">
+                <a:solidFill>
+                  <a:srgbClr val="044389"/>
+                </a:solidFill>
+              </a:rPr>
               <a:t>Belgian Style </a:t>
             </a:r>
             <a:r>
-              <a:rPr lang="en-US" sz="1600" dirty="0" err="1"/>
+              <a:rPr lang="en-US" sz="1600" dirty="0" err="1">
+                <a:solidFill>
+                  <a:srgbClr val="044389"/>
+                </a:solidFill>
+              </a:rPr>
               <a:t>Quadrupel</a:t>
             </a:r>
             <a:r>
-              <a:rPr lang="en-US" sz="1600" dirty="0"/>
-              <a:t> Ale at 12.8%</a:t>
+              <a:rPr lang="en-US" sz="1600" dirty="0">
+                <a:solidFill>
+                  <a:srgbClr val="044389"/>
+                </a:solidFill>
+              </a:rPr>
+              <a:t> Ale </a:t>
             </a:r>
+            <a:r>
+              <a:rPr lang="en-US" sz="1200" dirty="0">
+                <a:solidFill>
+                  <a:srgbClr val="044389"/>
+                </a:solidFill>
+              </a:rPr>
+              <a:t>(12.8%)</a:t>
+            </a:r>
+            <a:endParaRPr lang="en-US" sz="1600" dirty="0">
+              <a:solidFill>
+                <a:srgbClr val="044389"/>
+              </a:solidFill>
+            </a:endParaRPr>
           </a:p>
           <a:p>
-            <a:pPr marL="285750" indent="-285750" algn="ctr">
-              <a:buFontTx/>
-              <a:buChar char="-"/>
+            <a:pPr>
+              <a:lnSpc>
+                <a:spcPct val="150000"/>
+              </a:lnSpc>
             </a:pPr>
             <a:r>
-              <a:rPr lang="en-US" sz="1600" dirty="0"/>
-              <a:t>London Balling at 12.5%</a:t>
+              <a:rPr lang="en-US" sz="1600" dirty="0">
+                <a:solidFill>
+                  <a:srgbClr val="044389"/>
+                </a:solidFill>
+              </a:rPr>
+              <a:t>London Balling </a:t>
             </a:r>
+            <a:r>
+              <a:rPr lang="en-US" sz="1200" dirty="0">
+                <a:solidFill>
+                  <a:srgbClr val="044389"/>
+                </a:solidFill>
+              </a:rPr>
+              <a:t>(12.5%)</a:t>
+            </a:r>
+            <a:endParaRPr lang="en-US" sz="1600" dirty="0">
+              <a:solidFill>
+                <a:srgbClr val="044389"/>
+              </a:solidFill>
+            </a:endParaRPr>
           </a:p>
           <a:p>
-            <a:pPr marL="285750" indent="-285750" algn="ctr">
-              <a:buFontTx/>
-              <a:buChar char="-"/>
+            <a:pPr>
+              <a:lnSpc>
+                <a:spcPct val="150000"/>
+              </a:lnSpc>
             </a:pPr>
             <a:r>
-              <a:rPr lang="en-US" sz="1600" dirty="0" err="1"/>
+              <a:rPr lang="en-US" sz="1600" dirty="0" err="1">
+                <a:solidFill>
+                  <a:srgbClr val="044389"/>
+                </a:solidFill>
+              </a:rPr>
               <a:t>Csar</a:t>
             </a:r>
             <a:r>
-              <a:rPr lang="en-US" sz="1600" dirty="0"/>
-              <a:t> at 12%</a:t>
+              <a:rPr lang="en-US" sz="1600" dirty="0">
+                <a:solidFill>
+                  <a:srgbClr val="044389"/>
+                </a:solidFill>
+              </a:rPr>
+              <a:t> </a:t>
             </a:r>
+            <a:r>
+              <a:rPr lang="en-US" sz="1200" dirty="0">
+                <a:solidFill>
+                  <a:srgbClr val="044389"/>
+                </a:solidFill>
+              </a:rPr>
+              <a:t>(12%)</a:t>
+            </a:r>
+            <a:endParaRPr lang="en-US" sz="1600" dirty="0">
+              <a:solidFill>
+                <a:srgbClr val="044389"/>
+              </a:solidFill>
+            </a:endParaRPr>
           </a:p>
         </p:txBody>
       </p:sp>
@@ -15762,6 +17090,42 @@
           </a:fontRef>
         </p:style>
       </p:cxnSp>
+      <p:sp>
+        <p:nvSpPr>
+          <p:cNvPr id="16" name="TextBox 15">
+            <a:extLst>
+              <a:ext uri="{FF2B5EF4-FFF2-40B4-BE49-F238E27FC236}">
+                <a16:creationId xmlns:a16="http://schemas.microsoft.com/office/drawing/2014/main" id="{EA666200-FAF1-524F-8C43-2AF6D2E83554}"/>
+              </a:ext>
+            </a:extLst>
+          </p:cNvPr>
+          <p:cNvSpPr txBox="1"/>
+          <p:nvPr/>
+        </p:nvSpPr>
+        <p:spPr>
+          <a:xfrm>
+            <a:off x="9667389" y="6604084"/>
+            <a:ext cx="2244524" cy="253916"/>
+          </a:xfrm>
+          <a:prstGeom prst="rect">
+            <a:avLst/>
+          </a:prstGeom>
+          <a:noFill/>
+        </p:spPr>
+        <p:txBody>
+          <a:bodyPr wrap="none" rtlCol="0">
+            <a:spAutoFit/>
+          </a:bodyPr>
+          <a:lstStyle/>
+          <a:p>
+            <a:pPr algn="r"/>
+            <a:r>
+              <a:rPr lang="en-US" sz="1000" dirty="0"/>
+              <a:t>Confidential — For Internal Use Only</a:t>
+            </a:r>
+          </a:p>
+        </p:txBody>
+      </p:sp>
     </p:spTree>
     <p:extLst>
       <p:ext uri="{BB962C8B-B14F-4D97-AF65-F5344CB8AC3E}">
@@ -15949,137 +17313,6 @@
       <p:bldP spid="18" grpId="0" animBg="1"/>
     </p:bldLst>
   </p:timing>
-</p:sld>
-</file>
-
-<file path=ppt/slides/slide9.xml><?xml version="1.0" encoding="utf-8"?>
-<p:sld xmlns:a="http://schemas.openxmlformats.org/drawingml/2006/main" xmlns:r="http://schemas.openxmlformats.org/officeDocument/2006/relationships" xmlns:p="http://schemas.openxmlformats.org/presentationml/2006/main">
-  <p:cSld>
-    <p:spTree>
-      <p:nvGrpSpPr>
-        <p:cNvPr id="1" name=""/>
-        <p:cNvGrpSpPr/>
-        <p:nvPr/>
-      </p:nvGrpSpPr>
-      <p:grpSpPr>
-        <a:xfrm>
-          <a:off x="0" y="0"/>
-          <a:ext cx="0" cy="0"/>
-          <a:chOff x="0" y="0"/>
-          <a:chExt cx="0" cy="0"/>
-        </a:xfrm>
-      </p:grpSpPr>
-      <p:sp>
-        <p:nvSpPr>
-          <p:cNvPr id="2" name="Title 1">
-            <a:extLst>
-              <a:ext uri="{FF2B5EF4-FFF2-40B4-BE49-F238E27FC236}">
-                <a16:creationId xmlns:a16="http://schemas.microsoft.com/office/drawing/2014/main" id="{D48EB158-C9D6-47C5-AABF-BA03D72DFC9A}"/>
-              </a:ext>
-            </a:extLst>
-          </p:cNvPr>
-          <p:cNvSpPr>
-            <a:spLocks noGrp="1"/>
-          </p:cNvSpPr>
-          <p:nvPr>
-            <p:ph type="title"/>
-          </p:nvPr>
-        </p:nvSpPr>
-        <p:spPr/>
-        <p:txBody>
-          <a:bodyPr/>
-          <a:lstStyle/>
-          <a:p>
-            <a:r>
-              <a:rPr lang="en-US" dirty="0"/>
-              <a:t>Relationship between bitter &amp; boozy</a:t>
-            </a:r>
-          </a:p>
-        </p:txBody>
-      </p:sp>
-      <p:sp>
-        <p:nvSpPr>
-          <p:cNvPr id="11" name="Text Placeholder 10">
-            <a:extLst>
-              <a:ext uri="{FF2B5EF4-FFF2-40B4-BE49-F238E27FC236}">
-                <a16:creationId xmlns:a16="http://schemas.microsoft.com/office/drawing/2014/main" id="{9C3C278C-10AC-41C2-9073-4DE0E3C14519}"/>
-              </a:ext>
-            </a:extLst>
-          </p:cNvPr>
-          <p:cNvSpPr>
-            <a:spLocks noGrp="1"/>
-          </p:cNvSpPr>
-          <p:nvPr>
-            <p:ph type="body" sz="half" idx="2"/>
-          </p:nvPr>
-        </p:nvSpPr>
-        <p:spPr/>
-        <p:txBody>
-          <a:bodyPr/>
-          <a:lstStyle/>
-          <a:p>
-            <a:endParaRPr lang="en-US" dirty="0"/>
-          </a:p>
-          <a:p>
-            <a:endParaRPr lang="en-US" dirty="0"/>
-          </a:p>
-          <a:p>
-            <a:r>
-              <a:rPr lang="en-US" dirty="0"/>
-              <a:t>In general, there appears to be a relationship between IBU and ABV.</a:t>
-            </a:r>
-          </a:p>
-          <a:p>
-            <a:endParaRPr lang="en-US" dirty="0"/>
-          </a:p>
-          <a:p>
-            <a:r>
-              <a:rPr lang="en-US" dirty="0"/>
-              <a:t>Based on our assessment, we may be able to predict ABV based on IBU along with style and other variables of interest.</a:t>
-            </a:r>
-          </a:p>
-        </p:txBody>
-      </p:sp>
-      <p:pic>
-        <p:nvPicPr>
-          <p:cNvPr id="16" name="Picture 15">
-            <a:extLst>
-              <a:ext uri="{FF2B5EF4-FFF2-40B4-BE49-F238E27FC236}">
-                <a16:creationId xmlns:a16="http://schemas.microsoft.com/office/drawing/2014/main" id="{C5CD34EE-38E7-4B7A-BFB2-3678DCCFEA05}"/>
-              </a:ext>
-            </a:extLst>
-          </p:cNvPr>
-          <p:cNvPicPr>
-            <a:picLocks noChangeAspect="1"/>
-          </p:cNvPicPr>
-          <p:nvPr/>
-        </p:nvPicPr>
-        <p:blipFill>
-          <a:blip r:embed="rId2"/>
-          <a:stretch>
-            <a:fillRect/>
-          </a:stretch>
-        </p:blipFill>
-        <p:spPr>
-          <a:xfrm>
-            <a:off x="552755" y="905070"/>
-            <a:ext cx="6602723" cy="4560214"/>
-          </a:xfrm>
-          <a:prstGeom prst="rect">
-            <a:avLst/>
-          </a:prstGeom>
-        </p:spPr>
-      </p:pic>
-    </p:spTree>
-    <p:extLst>
-      <p:ext uri="{BB962C8B-B14F-4D97-AF65-F5344CB8AC3E}">
-        <p14:creationId xmlns:p14="http://schemas.microsoft.com/office/powerpoint/2010/main" val="662711705"/>
-      </p:ext>
-    </p:extLst>
-  </p:cSld>
-  <p:clrMapOvr>
-    <a:masterClrMapping/>
-  </p:clrMapOvr>
 </p:sld>
 </file>
 

</xml_diff>